<commit_message>
Final Report and Presentation
</commit_message>
<xml_diff>
--- a/documents/presentation drafts/2605549_presentation.pptx
+++ b/documents/presentation drafts/2605549_presentation.pptx
@@ -5,22 +5,31 @@
     <p:sldMasterId id="2147483648" r:id="rId1"/>
   </p:sldMasterIdLst>
   <p:notesMasterIdLst>
-    <p:notesMasterId r:id="rId15"/>
+    <p:notesMasterId r:id="rId24"/>
   </p:notesMasterIdLst>
   <p:sldIdLst>
     <p:sldId id="257" r:id="rId2"/>
     <p:sldId id="279" r:id="rId3"/>
-    <p:sldId id="261" r:id="rId4"/>
-    <p:sldId id="298" r:id="rId5"/>
-    <p:sldId id="299" r:id="rId6"/>
-    <p:sldId id="297" r:id="rId7"/>
-    <p:sldId id="301" r:id="rId8"/>
-    <p:sldId id="296" r:id="rId9"/>
-    <p:sldId id="292" r:id="rId10"/>
+    <p:sldId id="310" r:id="rId4"/>
+    <p:sldId id="261" r:id="rId5"/>
+    <p:sldId id="298" r:id="rId6"/>
+    <p:sldId id="299" r:id="rId7"/>
+    <p:sldId id="297" r:id="rId8"/>
+    <p:sldId id="309" r:id="rId9"/>
+    <p:sldId id="308" r:id="rId10"/>
     <p:sldId id="294" r:id="rId11"/>
-    <p:sldId id="295" r:id="rId12"/>
-    <p:sldId id="300" r:id="rId13"/>
-    <p:sldId id="263" r:id="rId14"/>
+    <p:sldId id="302" r:id="rId12"/>
+    <p:sldId id="296" r:id="rId13"/>
+    <p:sldId id="303" r:id="rId14"/>
+    <p:sldId id="304" r:id="rId15"/>
+    <p:sldId id="306" r:id="rId16"/>
+    <p:sldId id="305" r:id="rId17"/>
+    <p:sldId id="311" r:id="rId18"/>
+    <p:sldId id="295" r:id="rId19"/>
+    <p:sldId id="312" r:id="rId20"/>
+    <p:sldId id="307" r:id="rId21"/>
+    <p:sldId id="300" r:id="rId22"/>
+    <p:sldId id="263" r:id="rId23"/>
   </p:sldIdLst>
   <p:sldSz cx="12192000" cy="6858000"/>
   <p:notesSz cx="6858000" cy="9144000"/>
@@ -130,7 +139,7 @@
 <file path=ppt/revisionInfo.xml><?xml version="1.0" encoding="utf-8"?>
 <p1510:revInfo xmlns:a="http://schemas.openxmlformats.org/drawingml/2006/main" xmlns:r="http://schemas.openxmlformats.org/officeDocument/2006/relationships" xmlns:p1510="http://schemas.microsoft.com/office/powerpoint/2015/10/main">
   <p1510:revLst>
-    <p1510:client id="{85FD14C2-DAEF-4D2D-9A2A-265CFD17ABB8}" v="36" dt="2025-08-15T06:45:21.751"/>
+    <p1510:client id="{85FD14C2-DAEF-4D2D-9A2A-265CFD17ABB8}" v="59" dt="2025-08-28T15:10:20.912"/>
   </p1510:revLst>
 </p1510:revInfo>
 </file>
@@ -140,18 +149,18 @@
   <pc:docChgLst>
     <pc:chgData name="Ali Suhail" userId="425b9db2548ee741" providerId="LiveId" clId="{85FD14C2-DAEF-4D2D-9A2A-265CFD17ABB8}"/>
     <pc:docChg chg="undo redo custSel addSld delSld modSld sldOrd">
-      <pc:chgData name="Ali Suhail" userId="425b9db2548ee741" providerId="LiveId" clId="{85FD14C2-DAEF-4D2D-9A2A-265CFD17ABB8}" dt="2025-08-15T06:45:25.694" v="1396" actId="20577"/>
+      <pc:chgData name="Ali Suhail" userId="425b9db2548ee741" providerId="LiveId" clId="{85FD14C2-DAEF-4D2D-9A2A-265CFD17ABB8}" dt="2025-08-28T15:10:22.348" v="2436" actId="20577"/>
       <pc:docMkLst>
         <pc:docMk/>
       </pc:docMkLst>
       <pc:sldChg chg="modSp mod">
-        <pc:chgData name="Ali Suhail" userId="425b9db2548ee741" providerId="LiveId" clId="{85FD14C2-DAEF-4D2D-9A2A-265CFD17ABB8}" dt="2025-08-15T05:53:16.946" v="1" actId="20577"/>
+        <pc:chgData name="Ali Suhail" userId="425b9db2548ee741" providerId="LiveId" clId="{85FD14C2-DAEF-4D2D-9A2A-265CFD17ABB8}" dt="2025-08-28T15:10:22.348" v="2436" actId="20577"/>
         <pc:sldMkLst>
           <pc:docMk/>
           <pc:sldMk cId="0" sldId="257"/>
         </pc:sldMkLst>
         <pc:spChg chg="mod">
-          <ac:chgData name="Ali Suhail" userId="425b9db2548ee741" providerId="LiveId" clId="{85FD14C2-DAEF-4D2D-9A2A-265CFD17ABB8}" dt="2025-08-15T05:53:16.946" v="1" actId="20577"/>
+          <ac:chgData name="Ali Suhail" userId="425b9db2548ee741" providerId="LiveId" clId="{85FD14C2-DAEF-4D2D-9A2A-265CFD17ABB8}" dt="2025-08-28T15:10:22.348" v="2436" actId="20577"/>
           <ac:spMkLst>
             <pc:docMk/>
             <pc:sldMk cId="0" sldId="257"/>
@@ -160,7 +169,7 @@
         </pc:spChg>
       </pc:sldChg>
       <pc:sldChg chg="addSp modSp mod ord">
-        <pc:chgData name="Ali Suhail" userId="425b9db2548ee741" providerId="LiveId" clId="{85FD14C2-DAEF-4D2D-9A2A-265CFD17ABB8}" dt="2025-08-15T06:25:03.838" v="236" actId="20577"/>
+        <pc:chgData name="Ali Suhail" userId="425b9db2548ee741" providerId="LiveId" clId="{85FD14C2-DAEF-4D2D-9A2A-265CFD17ABB8}" dt="2025-08-18T02:46:14.425" v="1529" actId="20577"/>
         <pc:sldMkLst>
           <pc:docMk/>
           <pc:sldMk cId="0" sldId="261"/>
@@ -174,27 +183,26 @@
           </ac:spMkLst>
         </pc:spChg>
         <pc:spChg chg="mod">
-          <ac:chgData name="Ali Suhail" userId="425b9db2548ee741" providerId="LiveId" clId="{85FD14C2-DAEF-4D2D-9A2A-265CFD17ABB8}" dt="2025-08-15T06:25:03.838" v="236" actId="20577"/>
+          <ac:chgData name="Ali Suhail" userId="425b9db2548ee741" providerId="LiveId" clId="{85FD14C2-DAEF-4D2D-9A2A-265CFD17ABB8}" dt="2025-08-18T02:46:14.425" v="1529" actId="20577"/>
           <ac:spMkLst>
             <pc:docMk/>
             <pc:sldMk cId="0" sldId="261"/>
             <ac:spMk id="3" creationId="{00000000-0000-0000-0000-000000000000}"/>
           </ac:spMkLst>
         </pc:spChg>
-        <pc:spChg chg="add">
-          <ac:chgData name="Ali Suhail" userId="425b9db2548ee741" providerId="LiveId" clId="{85FD14C2-DAEF-4D2D-9A2A-265CFD17ABB8}" dt="2025-08-15T06:17:01.455" v="113"/>
+      </pc:sldChg>
+      <pc:sldChg chg="modSp mod">
+        <pc:chgData name="Ali Suhail" userId="425b9db2548ee741" providerId="LiveId" clId="{85FD14C2-DAEF-4D2D-9A2A-265CFD17ABB8}" dt="2025-08-18T02:48:34.007" v="1791" actId="27636"/>
+        <pc:sldMkLst>
+          <pc:docMk/>
+          <pc:sldMk cId="2381684282" sldId="279"/>
+        </pc:sldMkLst>
+        <pc:spChg chg="mod">
+          <ac:chgData name="Ali Suhail" userId="425b9db2548ee741" providerId="LiveId" clId="{85FD14C2-DAEF-4D2D-9A2A-265CFD17ABB8}" dt="2025-08-18T02:48:34.007" v="1791" actId="27636"/>
           <ac:spMkLst>
             <pc:docMk/>
-            <pc:sldMk cId="0" sldId="261"/>
-            <ac:spMk id="5" creationId="{4ADC99DF-FBEC-1787-B097-744EB2A6AADD}"/>
-          </ac:spMkLst>
-        </pc:spChg>
-        <pc:spChg chg="add">
-          <ac:chgData name="Ali Suhail" userId="425b9db2548ee741" providerId="LiveId" clId="{85FD14C2-DAEF-4D2D-9A2A-265CFD17ABB8}" dt="2025-08-15T06:18:29.460" v="169"/>
-          <ac:spMkLst>
-            <pc:docMk/>
-            <pc:sldMk cId="0" sldId="261"/>
-            <ac:spMk id="6" creationId="{1EA9A3D6-DD62-DCD6-1AAC-BF1CCAB6C85E}"/>
+            <pc:sldMk cId="2381684282" sldId="279"/>
+            <ac:spMk id="3" creationId="{1955A851-9907-3BDF-131D-468419074A29}"/>
           </ac:spMkLst>
         </pc:spChg>
       </pc:sldChg>
@@ -205,21 +213,44 @@
           <pc:sldMk cId="2461531019" sldId="280"/>
         </pc:sldMkLst>
       </pc:sldChg>
-      <pc:sldChg chg="add ord">
-        <pc:chgData name="Ali Suhail" userId="425b9db2548ee741" providerId="LiveId" clId="{85FD14C2-DAEF-4D2D-9A2A-265CFD17ABB8}" dt="2025-08-15T05:53:45.932" v="4"/>
+      <pc:sldChg chg="modSp mod">
+        <pc:chgData name="Ali Suhail" userId="425b9db2548ee741" providerId="LiveId" clId="{85FD14C2-DAEF-4D2D-9A2A-265CFD17ABB8}" dt="2025-08-25T04:16:28.480" v="2361" actId="20577"/>
+        <pc:sldMkLst>
+          <pc:docMk/>
+          <pc:sldMk cId="1658314820" sldId="295"/>
+        </pc:sldMkLst>
+        <pc:spChg chg="mod">
+          <ac:chgData name="Ali Suhail" userId="425b9db2548ee741" providerId="LiveId" clId="{85FD14C2-DAEF-4D2D-9A2A-265CFD17ABB8}" dt="2025-08-25T04:16:28.480" v="2361" actId="20577"/>
+          <ac:spMkLst>
+            <pc:docMk/>
+            <pc:sldMk cId="1658314820" sldId="295"/>
+            <ac:spMk id="3" creationId="{7D88ADD5-EE13-B17E-B6D6-48F44DA9CAC9}"/>
+          </ac:spMkLst>
+        </pc:spChg>
+      </pc:sldChg>
+      <pc:sldChg chg="modSp add mod ord">
+        <pc:chgData name="Ali Suhail" userId="425b9db2548ee741" providerId="LiveId" clId="{85FD14C2-DAEF-4D2D-9A2A-265CFD17ABB8}" dt="2025-08-18T03:13:31.690" v="2342" actId="20577"/>
         <pc:sldMkLst>
           <pc:docMk/>
           <pc:sldMk cId="3719682602" sldId="296"/>
         </pc:sldMkLst>
+        <pc:spChg chg="mod">
+          <ac:chgData name="Ali Suhail" userId="425b9db2548ee741" providerId="LiveId" clId="{85FD14C2-DAEF-4D2D-9A2A-265CFD17ABB8}" dt="2025-08-18T03:13:31.690" v="2342" actId="20577"/>
+          <ac:spMkLst>
+            <pc:docMk/>
+            <pc:sldMk cId="3719682602" sldId="296"/>
+            <ac:spMk id="2" creationId="{42C52BE8-D389-6C0D-B851-8761F5F124BE}"/>
+          </ac:spMkLst>
+        </pc:spChg>
       </pc:sldChg>
       <pc:sldChg chg="addSp modSp add mod">
-        <pc:chgData name="Ali Suhail" userId="425b9db2548ee741" providerId="LiveId" clId="{85FD14C2-DAEF-4D2D-9A2A-265CFD17ABB8}" dt="2025-08-15T06:40:36.046" v="1337" actId="20577"/>
+        <pc:chgData name="Ali Suhail" userId="425b9db2548ee741" providerId="LiveId" clId="{85FD14C2-DAEF-4D2D-9A2A-265CFD17ABB8}" dt="2025-08-25T04:31:02.236" v="2390" actId="20577"/>
         <pc:sldMkLst>
           <pc:docMk/>
           <pc:sldMk cId="3629784974" sldId="297"/>
         </pc:sldMkLst>
         <pc:spChg chg="add mod">
-          <ac:chgData name="Ali Suhail" userId="425b9db2548ee741" providerId="LiveId" clId="{85FD14C2-DAEF-4D2D-9A2A-265CFD17ABB8}" dt="2025-08-15T06:40:36.046" v="1337" actId="20577"/>
+          <ac:chgData name="Ali Suhail" userId="425b9db2548ee741" providerId="LiveId" clId="{85FD14C2-DAEF-4D2D-9A2A-265CFD17ABB8}" dt="2025-08-25T04:31:02.236" v="2390" actId="20577"/>
           <ac:spMkLst>
             <pc:docMk/>
             <pc:sldMk cId="3629784974" sldId="297"/>
@@ -232,22 +263,6 @@
             <pc:docMk/>
             <pc:sldMk cId="3629784974" sldId="297"/>
             <ac:spMk id="3" creationId="{2F9860F2-74FE-AA23-EA90-6F5B28A36D21}"/>
-          </ac:spMkLst>
-        </pc:spChg>
-        <pc:spChg chg="add mod">
-          <ac:chgData name="Ali Suhail" userId="425b9db2548ee741" providerId="LiveId" clId="{85FD14C2-DAEF-4D2D-9A2A-265CFD17ABB8}" dt="2025-08-15T06:00:43.710" v="52"/>
-          <ac:spMkLst>
-            <pc:docMk/>
-            <pc:sldMk cId="3629784974" sldId="297"/>
-            <ac:spMk id="5" creationId="{7023F363-8FBE-325A-51EB-83BAE8384A62}"/>
-          </ac:spMkLst>
-        </pc:spChg>
-        <pc:spChg chg="add">
-          <ac:chgData name="Ali Suhail" userId="425b9db2548ee741" providerId="LiveId" clId="{85FD14C2-DAEF-4D2D-9A2A-265CFD17ABB8}" dt="2025-08-15T06:07:17.966" v="60"/>
-          <ac:spMkLst>
-            <pc:docMk/>
-            <pc:sldMk cId="3629784974" sldId="297"/>
-            <ac:spMk id="6" creationId="{88DEFBD8-D380-0B9E-C96F-D92ADC263B2C}"/>
           </ac:spMkLst>
         </pc:spChg>
       </pc:sldChg>
@@ -295,17 +310,9 @@
             <ac:spMk id="3" creationId="{36A13CFE-F63D-B94C-F53F-F7DD883932DD}"/>
           </ac:spMkLst>
         </pc:spChg>
-        <pc:spChg chg="add">
-          <ac:chgData name="Ali Suhail" userId="425b9db2548ee741" providerId="LiveId" clId="{85FD14C2-DAEF-4D2D-9A2A-265CFD17ABB8}" dt="2025-08-15T06:39:21.044" v="1312"/>
-          <ac:spMkLst>
-            <pc:docMk/>
-            <pc:sldMk cId="3653582992" sldId="299"/>
-            <ac:spMk id="5" creationId="{4D88B299-035F-4C0A-B5B7-20B6A27CE707}"/>
-          </ac:spMkLst>
-        </pc:spChg>
       </pc:sldChg>
       <pc:sldChg chg="modSp add mod">
-        <pc:chgData name="Ali Suhail" userId="425b9db2548ee741" providerId="LiveId" clId="{85FD14C2-DAEF-4D2D-9A2A-265CFD17ABB8}" dt="2025-08-15T06:45:25.694" v="1396" actId="20577"/>
+        <pc:chgData name="Ali Suhail" userId="425b9db2548ee741" providerId="LiveId" clId="{85FD14C2-DAEF-4D2D-9A2A-265CFD17ABB8}" dt="2025-08-25T04:30:28.889" v="2386" actId="6549"/>
         <pc:sldMkLst>
           <pc:docMk/>
           <pc:sldMk cId="2221085332" sldId="300"/>
@@ -319,7 +326,7 @@
           </ac:spMkLst>
         </pc:spChg>
         <pc:spChg chg="mod">
-          <ac:chgData name="Ali Suhail" userId="425b9db2548ee741" providerId="LiveId" clId="{85FD14C2-DAEF-4D2D-9A2A-265CFD17ABB8}" dt="2025-08-15T06:45:25.694" v="1396" actId="20577"/>
+          <ac:chgData name="Ali Suhail" userId="425b9db2548ee741" providerId="LiveId" clId="{85FD14C2-DAEF-4D2D-9A2A-265CFD17ABB8}" dt="2025-08-25T04:30:28.889" v="2386" actId="6549"/>
           <ac:spMkLst>
             <pc:docMk/>
             <pc:sldMk cId="2221085332" sldId="300"/>
@@ -333,6 +340,127 @@
           <pc:docMk/>
           <pc:sldMk cId="88742420" sldId="301"/>
         </pc:sldMkLst>
+      </pc:sldChg>
+      <pc:sldChg chg="modSp mod">
+        <pc:chgData name="Ali Suhail" userId="425b9db2548ee741" providerId="LiveId" clId="{85FD14C2-DAEF-4D2D-9A2A-265CFD17ABB8}" dt="2025-08-18T02:43:35.143" v="1462" actId="20577"/>
+        <pc:sldMkLst>
+          <pc:docMk/>
+          <pc:sldMk cId="2074208732" sldId="305"/>
+        </pc:sldMkLst>
+        <pc:spChg chg="mod">
+          <ac:chgData name="Ali Suhail" userId="425b9db2548ee741" providerId="LiveId" clId="{85FD14C2-DAEF-4D2D-9A2A-265CFD17ABB8}" dt="2025-08-18T02:43:35.143" v="1462" actId="20577"/>
+          <ac:spMkLst>
+            <pc:docMk/>
+            <pc:sldMk cId="2074208732" sldId="305"/>
+            <ac:spMk id="14" creationId="{EA02883C-B8D5-A904-B212-01410129DDCA}"/>
+          </ac:spMkLst>
+        </pc:spChg>
+      </pc:sldChg>
+      <pc:sldChg chg="modSp mod">
+        <pc:chgData name="Ali Suhail" userId="425b9db2548ee741" providerId="LiveId" clId="{85FD14C2-DAEF-4D2D-9A2A-265CFD17ABB8}" dt="2025-08-18T03:00:16.661" v="2334" actId="14100"/>
+        <pc:sldMkLst>
+          <pc:docMk/>
+          <pc:sldMk cId="2963995971" sldId="307"/>
+        </pc:sldMkLst>
+        <pc:spChg chg="mod">
+          <ac:chgData name="Ali Suhail" userId="425b9db2548ee741" providerId="LiveId" clId="{85FD14C2-DAEF-4D2D-9A2A-265CFD17ABB8}" dt="2025-08-18T03:00:14.572" v="2333" actId="14100"/>
+          <ac:spMkLst>
+            <pc:docMk/>
+            <pc:sldMk cId="2963995971" sldId="307"/>
+            <ac:spMk id="2" creationId="{8C8C4C86-D4B9-D4F7-E371-03CC508AC5B2}"/>
+          </ac:spMkLst>
+        </pc:spChg>
+        <pc:spChg chg="mod">
+          <ac:chgData name="Ali Suhail" userId="425b9db2548ee741" providerId="LiveId" clId="{85FD14C2-DAEF-4D2D-9A2A-265CFD17ABB8}" dt="2025-08-18T03:00:16.661" v="2334" actId="14100"/>
+          <ac:spMkLst>
+            <pc:docMk/>
+            <pc:sldMk cId="2963995971" sldId="307"/>
+            <ac:spMk id="3" creationId="{5B7403BE-DBED-55D8-5244-6AE355977BC3}"/>
+          </ac:spMkLst>
+        </pc:spChg>
+      </pc:sldChg>
+      <pc:sldChg chg="modSp new mod">
+        <pc:chgData name="Ali Suhail" userId="425b9db2548ee741" providerId="LiveId" clId="{85FD14C2-DAEF-4D2D-9A2A-265CFD17ABB8}" dt="2025-08-18T02:58:07.876" v="2213" actId="14100"/>
+        <pc:sldMkLst>
+          <pc:docMk/>
+          <pc:sldMk cId="2079853093" sldId="308"/>
+        </pc:sldMkLst>
+        <pc:spChg chg="mod">
+          <ac:chgData name="Ali Suhail" userId="425b9db2548ee741" providerId="LiveId" clId="{85FD14C2-DAEF-4D2D-9A2A-265CFD17ABB8}" dt="2025-08-18T02:57:06.715" v="2197" actId="14100"/>
+          <ac:spMkLst>
+            <pc:docMk/>
+            <pc:sldMk cId="2079853093" sldId="308"/>
+            <ac:spMk id="2" creationId="{1E6BE49B-8215-5999-6764-A5AB11913D5A}"/>
+          </ac:spMkLst>
+        </pc:spChg>
+        <pc:spChg chg="mod">
+          <ac:chgData name="Ali Suhail" userId="425b9db2548ee741" providerId="LiveId" clId="{85FD14C2-DAEF-4D2D-9A2A-265CFD17ABB8}" dt="2025-08-18T02:58:07.876" v="2213" actId="14100"/>
+          <ac:spMkLst>
+            <pc:docMk/>
+            <pc:sldMk cId="2079853093" sldId="308"/>
+            <ac:spMk id="3" creationId="{6B62E942-F32A-825F-1DC1-FEC0909FBDE4}"/>
+          </ac:spMkLst>
+        </pc:spChg>
+      </pc:sldChg>
+      <pc:sldChg chg="delSp modSp new mod">
+        <pc:chgData name="Ali Suhail" userId="425b9db2548ee741" providerId="LiveId" clId="{85FD14C2-DAEF-4D2D-9A2A-265CFD17ABB8}" dt="2025-08-18T02:59:24.775" v="2284" actId="20577"/>
+        <pc:sldMkLst>
+          <pc:docMk/>
+          <pc:sldMk cId="522651291" sldId="309"/>
+        </pc:sldMkLst>
+        <pc:spChg chg="mod">
+          <ac:chgData name="Ali Suhail" userId="425b9db2548ee741" providerId="LiveId" clId="{85FD14C2-DAEF-4D2D-9A2A-265CFD17ABB8}" dt="2025-08-18T02:59:24.775" v="2284" actId="20577"/>
+          <ac:spMkLst>
+            <pc:docMk/>
+            <pc:sldMk cId="522651291" sldId="309"/>
+            <ac:spMk id="2" creationId="{38C2E06D-C442-8912-7CF3-B16B15537CF9}"/>
+          </ac:spMkLst>
+        </pc:spChg>
+      </pc:sldChg>
+      <pc:sldChg chg="modSp add mod">
+        <pc:chgData name="Ali Suhail" userId="425b9db2548ee741" providerId="LiveId" clId="{85FD14C2-DAEF-4D2D-9A2A-265CFD17ABB8}" dt="2025-08-18T02:59:17.025" v="2283" actId="20577"/>
+        <pc:sldMkLst>
+          <pc:docMk/>
+          <pc:sldMk cId="2861683200" sldId="310"/>
+        </pc:sldMkLst>
+        <pc:spChg chg="mod">
+          <ac:chgData name="Ali Suhail" userId="425b9db2548ee741" providerId="LiveId" clId="{85FD14C2-DAEF-4D2D-9A2A-265CFD17ABB8}" dt="2025-08-18T02:59:17.025" v="2283" actId="20577"/>
+          <ac:spMkLst>
+            <pc:docMk/>
+            <pc:sldMk cId="2861683200" sldId="310"/>
+            <ac:spMk id="2" creationId="{D00C636F-1E09-C668-DC8A-E083090A963E}"/>
+          </ac:spMkLst>
+        </pc:spChg>
+      </pc:sldChg>
+      <pc:sldChg chg="modSp add mod">
+        <pc:chgData name="Ali Suhail" userId="425b9db2548ee741" providerId="LiveId" clId="{85FD14C2-DAEF-4D2D-9A2A-265CFD17ABB8}" dt="2025-08-18T02:59:48.032" v="2313" actId="20577"/>
+        <pc:sldMkLst>
+          <pc:docMk/>
+          <pc:sldMk cId="1149168141" sldId="311"/>
+        </pc:sldMkLst>
+        <pc:spChg chg="mod">
+          <ac:chgData name="Ali Suhail" userId="425b9db2548ee741" providerId="LiveId" clId="{85FD14C2-DAEF-4D2D-9A2A-265CFD17ABB8}" dt="2025-08-18T02:59:48.032" v="2313" actId="20577"/>
+          <ac:spMkLst>
+            <pc:docMk/>
+            <pc:sldMk cId="1149168141" sldId="311"/>
+            <ac:spMk id="2" creationId="{0EC9C6E2-E6DA-A0B1-E60A-0E0C2ABA3AB7}"/>
+          </ac:spMkLst>
+        </pc:spChg>
+      </pc:sldChg>
+      <pc:sldChg chg="modSp add mod">
+        <pc:chgData name="Ali Suhail" userId="425b9db2548ee741" providerId="LiveId" clId="{85FD14C2-DAEF-4D2D-9A2A-265CFD17ABB8}" dt="2025-08-18T03:00:06.331" v="2332" actId="20577"/>
+        <pc:sldMkLst>
+          <pc:docMk/>
+          <pc:sldMk cId="12380241" sldId="312"/>
+        </pc:sldMkLst>
+        <pc:spChg chg="mod">
+          <ac:chgData name="Ali Suhail" userId="425b9db2548ee741" providerId="LiveId" clId="{85FD14C2-DAEF-4D2D-9A2A-265CFD17ABB8}" dt="2025-08-18T03:00:06.331" v="2332" actId="20577"/>
+          <ac:spMkLst>
+            <pc:docMk/>
+            <pc:sldMk cId="12380241" sldId="312"/>
+            <ac:spMk id="2" creationId="{DCFDF1DE-EEA3-4E98-E355-C92C20175BA8}"/>
+          </ac:spMkLst>
+        </pc:spChg>
       </pc:sldChg>
     </pc:docChg>
   </pc:docChgLst>
@@ -421,7 +549,7 @@
           <a:p>
             <a:fld id="{BEF1AB8B-2150-40B0-A429-0DC62361296A}" type="datetimeFigureOut">
               <a:rPr lang="en-US" smtClean="0"/>
-              <a:t>8/15/2025</a:t>
+              <a:t>8/25/2025</a:t>
             </a:fld>
             <a:endParaRPr lang="en-US"/>
           </a:p>
@@ -812,7 +940,7 @@
           <a:p>
             <a:fld id="{3CB69C41-EB32-4225-BCA3-42882E910320}" type="datetime1">
               <a:rPr lang="en-US" smtClean="0"/>
-              <a:t>8/15/2025</a:t>
+              <a:t>8/25/2025</a:t>
             </a:fld>
             <a:endParaRPr lang="en-US"/>
           </a:p>
@@ -975,7 +1103,7 @@
           <a:p>
             <a:fld id="{2D806A48-80B8-4B0D-BB54-EB82B750AEBC}" type="datetime1">
               <a:rPr lang="en-US" smtClean="0"/>
-              <a:t>8/15/2025</a:t>
+              <a:t>8/25/2025</a:t>
             </a:fld>
             <a:endParaRPr lang="en-US"/>
           </a:p>
@@ -1148,7 +1276,7 @@
           <a:p>
             <a:fld id="{0811AA4A-A897-4C78-B3BA-BADAD056D0FE}" type="datetime1">
               <a:rPr lang="en-US" smtClean="0"/>
-              <a:t>8/15/2025</a:t>
+              <a:t>8/25/2025</a:t>
             </a:fld>
             <a:endParaRPr lang="en-US"/>
           </a:p>
@@ -1311,7 +1439,7 @@
           <a:p>
             <a:fld id="{5FB4196B-E120-4518-861A-9AA8640278B1}" type="datetime1">
               <a:rPr lang="en-US" smtClean="0"/>
-              <a:t>8/15/2025</a:t>
+              <a:t>8/25/2025</a:t>
             </a:fld>
             <a:endParaRPr lang="en-US"/>
           </a:p>
@@ -1551,7 +1679,7 @@
           <a:p>
             <a:fld id="{900AD0FF-FA21-471A-A1CF-5754611F81B3}" type="datetime1">
               <a:rPr lang="en-US" smtClean="0"/>
-              <a:t>8/15/2025</a:t>
+              <a:t>8/25/2025</a:t>
             </a:fld>
             <a:endParaRPr lang="en-US"/>
           </a:p>
@@ -1775,7 +1903,7 @@
           <a:p>
             <a:fld id="{2F244E27-FDE9-407C-9C92-1BBAF1D81A20}" type="datetime1">
               <a:rPr lang="en-US" smtClean="0"/>
-              <a:t>8/15/2025</a:t>
+              <a:t>8/25/2025</a:t>
             </a:fld>
             <a:endParaRPr lang="en-US"/>
           </a:p>
@@ -2134,7 +2262,7 @@
           <a:p>
             <a:fld id="{65CB81C4-4FF0-4EF1-841A-11E6574A4906}" type="datetime1">
               <a:rPr lang="en-US" smtClean="0"/>
-              <a:t>8/15/2025</a:t>
+              <a:t>8/25/2025</a:t>
             </a:fld>
             <a:endParaRPr lang="en-US"/>
           </a:p>
@@ -2246,7 +2374,7 @@
           <a:p>
             <a:fld id="{DA8037CC-DC2C-42A8-8BA5-6AA6F5B85A0C}" type="datetime1">
               <a:rPr lang="en-US" smtClean="0"/>
-              <a:t>8/15/2025</a:t>
+              <a:t>8/25/2025</a:t>
             </a:fld>
             <a:endParaRPr lang="en-US"/>
           </a:p>
@@ -2336,7 +2464,7 @@
           <a:p>
             <a:fld id="{70DD3E54-051F-4714-8069-F39F61E67854}" type="datetime1">
               <a:rPr lang="en-US" smtClean="0"/>
-              <a:t>8/15/2025</a:t>
+              <a:t>8/25/2025</a:t>
             </a:fld>
             <a:endParaRPr lang="en-US"/>
           </a:p>
@@ -2606,7 +2734,7 @@
           <a:p>
             <a:fld id="{5EFB1A03-EC3F-492F-91E9-9AA1D744377F}" type="datetime1">
               <a:rPr lang="en-US" smtClean="0"/>
-              <a:t>8/15/2025</a:t>
+              <a:t>8/25/2025</a:t>
             </a:fld>
             <a:endParaRPr lang="en-US"/>
           </a:p>
@@ -2853,7 +2981,7 @@
           <a:p>
             <a:fld id="{889B7DB2-78F3-4CD6-AA57-F1E2F60407FB}" type="datetime1">
               <a:rPr lang="en-US" smtClean="0"/>
-              <a:t>8/15/2025</a:t>
+              <a:t>8/25/2025</a:t>
             </a:fld>
             <a:endParaRPr lang="en-US"/>
           </a:p>
@@ -3059,7 +3187,7 @@
           <a:p>
             <a:fld id="{EFEE7049-C146-4123-B1B0-5ED48ECC200B}" type="datetime1">
               <a:rPr lang="en-US" smtClean="0"/>
-              <a:t>8/15/2025</a:t>
+              <a:t>8/25/2025</a:t>
             </a:fld>
             <a:endParaRPr lang="en-US"/>
           </a:p>
@@ -3627,15 +3755,46 @@
             </a:pPr>
             <a:r>
               <a:rPr lang="en-US" dirty="0"/>
-              <a:t>Ali Suhail: </a:t>
+              <a:t>GitHub: </a:t>
             </a:r>
             <a:r>
               <a:rPr lang="en-US" dirty="0">
                 <a:hlinkClick r:id="rId2"/>
               </a:rPr>
+              <a:t>https://github.com/MScProjs/MScProject2025-Ali-Suhail</a:t>
+            </a:r>
+            <a:endParaRPr lang="en-US" dirty="0"/>
+          </a:p>
+          <a:p>
+            <a:pPr marL="0" indent="0">
+              <a:buNone/>
+            </a:pPr>
+            <a:endParaRPr lang="en-US" dirty="0"/>
+          </a:p>
+          <a:p>
+            <a:pPr marL="0" indent="0">
+              <a:buNone/>
+            </a:pPr>
+            <a:r>
+              <a:rPr lang="en-US" dirty="0"/>
+              <a:t>Ali Suhail: </a:t>
+            </a:r>
+            <a:r>
+              <a:rPr lang="en-US" dirty="0">
+                <a:hlinkClick r:id="rId3"/>
+              </a:rPr>
               <a:t>dy24009@bristol.ac.uk</a:t>
             </a:r>
             <a:endParaRPr lang="en-US" dirty="0"/>
+          </a:p>
+          <a:p>
+            <a:pPr marL="0" indent="0">
+              <a:buNone/>
+            </a:pPr>
+            <a:r>
+              <a:rPr lang="en-US" dirty="0"/>
+              <a:t>Student ID: 2606649</a:t>
+            </a:r>
           </a:p>
           <a:p>
             <a:pPr marL="0" indent="0">
@@ -3723,7 +3882,7 @@
           <a:p>
             <a:r>
               <a:rPr lang="en-GB" b="1" dirty="0"/>
-              <a:t>Model F1 Scores Across Phases</a:t>
+              <a:t>Model Macro F1 Scores Across Phases</a:t>
             </a:r>
           </a:p>
         </p:txBody>
@@ -3775,7 +3934,7 @@
         </p:nvSpPr>
         <p:spPr>
           <a:xfrm>
-            <a:off x="739140" y="3576321"/>
+            <a:off x="838200" y="4061460"/>
             <a:ext cx="10515600" cy="1974849"/>
           </a:xfrm>
         </p:spPr>
@@ -3787,7 +3946,13 @@
           <a:p>
             <a:r>
               <a:rPr lang="en-US" sz="2000" dirty="0"/>
-              <a:t>LR outperforms the other models in terms of macro F1 score across all phases, with SVMs ranking second and MLP showing the lowest overall performance.</a:t>
+              <a:t>For Early and Midpoint phases, SVM achieved the best macro F1 scores (65% Early, 67% Midpoint), followed by LR (56–64%). </a:t>
+            </a:r>
+          </a:p>
+          <a:p>
+            <a:r>
+              <a:rPr lang="en-US" sz="2000" dirty="0"/>
+              <a:t>RF ranked third with 48–59%, while MLP had the lowest performance (43–47%).</a:t>
             </a:r>
             <a:endParaRPr lang="en-GB" sz="2000" dirty="0"/>
           </a:p>
@@ -3808,14 +3973,14 @@
           <p:nvPr>
             <p:extLst>
               <p:ext uri="{D42A27DB-BD31-4B8C-83A1-F6EECF244321}">
-                <p14:modId xmlns:p14="http://schemas.microsoft.com/office/powerpoint/2010/main" val="2756232545"/>
+                <p14:modId xmlns:p14="http://schemas.microsoft.com/office/powerpoint/2010/main" val="2429710334"/>
               </p:ext>
             </p:extLst>
           </p:nvPr>
         </p:nvGraphicFramePr>
         <p:xfrm>
           <a:off x="838200" y="1856740"/>
-          <a:ext cx="10515600" cy="1513840"/>
+          <a:ext cx="10515600" cy="1884680"/>
         </p:xfrm>
         <a:graphic>
           <a:graphicData uri="http://schemas.openxmlformats.org/drawingml/2006/table">
@@ -3959,7 +4124,7 @@
                       <a:pPr algn="ctr"/>
                       <a:r>
                         <a:rPr lang="en-GB" dirty="0"/>
-                        <a:t>51%</a:t>
+                        <a:t>56%</a:t>
                       </a:r>
                     </a:p>
                   </a:txBody>
@@ -3973,21 +4138,7 @@
                       <a:pPr algn="ctr"/>
                       <a:r>
                         <a:rPr lang="en-GB" dirty="0"/>
-                        <a:t>60%</a:t>
-                      </a:r>
-                    </a:p>
-                  </a:txBody>
-                  <a:tcPr/>
-                </a:tc>
-                <a:tc>
-                  <a:txBody>
-                    <a:bodyPr/>
-                    <a:lstStyle/>
-                    <a:p>
-                      <a:pPr algn="ctr"/>
-                      <a:r>
-                        <a:rPr lang="en-GB" dirty="0"/>
-                        <a:t>63%</a:t>
+                        <a:t>64%</a:t>
                       </a:r>
                     </a:p>
                   </a:txBody>
@@ -4002,6 +4153,20 @@
                       <a:r>
                         <a:rPr lang="en-GB" dirty="0"/>
                         <a:t>67%</a:t>
+                      </a:r>
+                    </a:p>
+                  </a:txBody>
+                  <a:tcPr/>
+                </a:tc>
+                <a:tc>
+                  <a:txBody>
+                    <a:bodyPr/>
+                    <a:lstStyle/>
+                    <a:p>
+                      <a:pPr algn="ctr"/>
+                      <a:r>
+                        <a:rPr lang="en-GB" dirty="0"/>
+                        <a:t>69%</a:t>
                       </a:r>
                     </a:p>
                   </a:txBody>
@@ -4035,7 +4200,97 @@
                       <a:pPr algn="ctr"/>
                       <a:r>
                         <a:rPr lang="en-GB" dirty="0"/>
-                        <a:t>39%</a:t>
+                        <a:t>65%</a:t>
+                      </a:r>
+                    </a:p>
+                  </a:txBody>
+                  <a:tcPr/>
+                </a:tc>
+                <a:tc>
+                  <a:txBody>
+                    <a:bodyPr/>
+                    <a:lstStyle/>
+                    <a:p>
+                      <a:pPr algn="ctr"/>
+                      <a:r>
+                        <a:rPr lang="en-GB" dirty="0"/>
+                        <a:t>67%</a:t>
+                      </a:r>
+                    </a:p>
+                  </a:txBody>
+                  <a:tcPr/>
+                </a:tc>
+                <a:tc>
+                  <a:txBody>
+                    <a:bodyPr/>
+                    <a:lstStyle/>
+                    <a:p>
+                      <a:pPr algn="ctr"/>
+                      <a:r>
+                        <a:rPr lang="en-GB" dirty="0"/>
+                        <a:t>69%</a:t>
+                      </a:r>
+                    </a:p>
+                  </a:txBody>
+                  <a:tcPr/>
+                </a:tc>
+                <a:tc>
+                  <a:txBody>
+                    <a:bodyPr/>
+                    <a:lstStyle/>
+                    <a:p>
+                      <a:pPr algn="ctr"/>
+                      <a:r>
+                        <a:rPr lang="en-GB" dirty="0"/>
+                        <a:t>71%</a:t>
+                      </a:r>
+                    </a:p>
+                  </a:txBody>
+                  <a:tcPr/>
+                </a:tc>
+                <a:extLst>
+                  <a:ext uri="{0D108BD9-81ED-4DB2-BD59-A6C34878D82A}">
+                    <a16:rowId xmlns:a16="http://schemas.microsoft.com/office/drawing/2014/main" val="2104744661"/>
+                  </a:ext>
+                </a:extLst>
+              </a:tr>
+              <a:tr h="370840">
+                <a:tc>
+                  <a:txBody>
+                    <a:bodyPr/>
+                    <a:lstStyle/>
+                    <a:p>
+                      <a:r>
+                        <a:rPr lang="en-GB" dirty="0"/>
+                        <a:t>Multiplayer Perceptron</a:t>
+                      </a:r>
+                    </a:p>
+                  </a:txBody>
+                  <a:tcPr/>
+                </a:tc>
+                <a:tc>
+                  <a:txBody>
+                    <a:bodyPr/>
+                    <a:lstStyle/>
+                    <a:p>
+                      <a:pPr algn="ctr"/>
+                      <a:r>
+                        <a:rPr lang="en-GB" dirty="0"/>
+                        <a:t>43%</a:t>
+                      </a:r>
+                    </a:p>
+                  </a:txBody>
+                  <a:tcPr/>
+                </a:tc>
+                <a:tc>
+                  <a:txBody>
+                    <a:bodyPr/>
+                    <a:lstStyle/>
+                    <a:p>
+                      <a:pPr algn="ctr"/>
+                      <a:r>
+                        <a:rPr lang="en-GB" dirty="0"/>
+                        <a:t>47%</a:t>
                       </a:r>
                     </a:p>
                   </a:txBody>
@@ -4069,23 +4324,9 @@
                   </a:txBody>
                   <a:tcPr/>
                 </a:tc>
-                <a:tc>
-                  <a:txBody>
-                    <a:bodyPr/>
-                    <a:lstStyle/>
-                    <a:p>
-                      <a:pPr algn="ctr"/>
-                      <a:r>
-                        <a:rPr lang="en-GB" dirty="0"/>
-                        <a:t>63%</a:t>
-                      </a:r>
-                    </a:p>
-                  </a:txBody>
-                  <a:tcPr/>
-                </a:tc>
                 <a:extLst>
                   <a:ext uri="{0D108BD9-81ED-4DB2-BD59-A6C34878D82A}">
-                    <a16:rowId xmlns:a16="http://schemas.microsoft.com/office/drawing/2014/main" val="2104744661"/>
+                    <a16:rowId xmlns:a16="http://schemas.microsoft.com/office/drawing/2014/main" val="454753117"/>
                   </a:ext>
                 </a:extLst>
               </a:tr>
@@ -4097,7 +4338,7 @@
                     <a:p>
                       <a:r>
                         <a:rPr lang="en-GB" dirty="0"/>
-                        <a:t>Multiplayer Perceptron</a:t>
+                        <a:t>Random Forest</a:t>
                       </a:r>
                     </a:p>
                   </a:txBody>
@@ -4111,7 +4352,7 @@
                       <a:pPr algn="ctr"/>
                       <a:r>
                         <a:rPr lang="en-GB" dirty="0"/>
-                        <a:t>38%</a:t>
+                        <a:t>48%</a:t>
                       </a:r>
                     </a:p>
                   </a:txBody>
@@ -4125,7 +4366,7 @@
                       <a:pPr algn="ctr"/>
                       <a:r>
                         <a:rPr lang="en-GB" dirty="0"/>
-                        <a:t>47%</a:t>
+                        <a:t>59%</a:t>
                       </a:r>
                     </a:p>
                   </a:txBody>
@@ -4139,7 +4380,7 @@
                       <a:pPr algn="ctr"/>
                       <a:r>
                         <a:rPr lang="en-GB" dirty="0"/>
-                        <a:t>56%</a:t>
+                        <a:t>68%</a:t>
                       </a:r>
                     </a:p>
                   </a:txBody>
@@ -4153,7 +4394,7 @@
                       <a:pPr algn="ctr"/>
                       <a:r>
                         <a:rPr lang="en-GB" dirty="0"/>
-                        <a:t>58%</a:t>
+                        <a:t>67%</a:t>
                       </a:r>
                     </a:p>
                   </a:txBody>
@@ -4161,7 +4402,7 @@
                 </a:tc>
                 <a:extLst>
                   <a:ext uri="{0D108BD9-81ED-4DB2-BD59-A6C34878D82A}">
-                    <a16:rowId xmlns:a16="http://schemas.microsoft.com/office/drawing/2014/main" val="454753117"/>
+                    <a16:rowId xmlns:a16="http://schemas.microsoft.com/office/drawing/2014/main" val="3430546103"/>
                   </a:ext>
                 </a:extLst>
               </a:tr>
@@ -4187,7 +4428,13 @@
   <p:cSld>
     <p:spTree>
       <p:nvGrpSpPr>
-        <p:cNvPr id="1" name=""/>
+        <p:cNvPr id="1" name="">
+          <a:extLst>
+            <a:ext uri="{FF2B5EF4-FFF2-40B4-BE49-F238E27FC236}">
+              <a16:creationId xmlns:a16="http://schemas.microsoft.com/office/drawing/2014/main" id="{E8147702-88AA-4E0B-714F-8F83935A91FD}"/>
+            </a:ext>
+          </a:extLst>
+        </p:cNvPr>
         <p:cNvGrpSpPr/>
         <p:nvPr/>
       </p:nvGrpSpPr>
@@ -4204,7 +4451,7 @@
           <p:cNvPr id="2" name="Title 1">
             <a:extLst>
               <a:ext uri="{FF2B5EF4-FFF2-40B4-BE49-F238E27FC236}">
-                <a16:creationId xmlns:a16="http://schemas.microsoft.com/office/drawing/2014/main" id="{E7CEE577-B605-B897-045E-6E45FD6C3025}"/>
+                <a16:creationId xmlns:a16="http://schemas.microsoft.com/office/drawing/2014/main" id="{D9840F2F-511E-5F6C-DD1A-6F1BFAA8772F}"/>
               </a:ext>
             </a:extLst>
           </p:cNvPr>
@@ -4217,8 +4464,8 @@
         </p:nvSpPr>
         <p:spPr>
           <a:xfrm>
-            <a:off x="838200" y="1214754"/>
-            <a:ext cx="10515600" cy="713105"/>
+            <a:off x="240632" y="1111885"/>
+            <a:ext cx="11430000" cy="831215"/>
           </a:xfrm>
         </p:spPr>
         <p:txBody>
@@ -4229,60 +4476,8 @@
           <a:p>
             <a:r>
               <a:rPr lang="en-GB" sz="4000" b="1" dirty="0"/>
-              <a:t>Next</a:t>
-            </a:r>
-            <a:r>
-              <a:rPr lang="en-GB" b="1" dirty="0"/>
-              <a:t> Steps</a:t>
-            </a:r>
-          </a:p>
-        </p:txBody>
-      </p:sp>
-      <p:sp>
-        <p:nvSpPr>
-          <p:cNvPr id="3" name="Content Placeholder 2">
-            <a:extLst>
-              <a:ext uri="{FF2B5EF4-FFF2-40B4-BE49-F238E27FC236}">
-                <a16:creationId xmlns:a16="http://schemas.microsoft.com/office/drawing/2014/main" id="{7D88ADD5-EE13-B17E-B6D6-48F44DA9CAC9}"/>
-              </a:ext>
-            </a:extLst>
-          </p:cNvPr>
-          <p:cNvSpPr>
-            <a:spLocks noGrp="1"/>
-          </p:cNvSpPr>
-          <p:nvPr>
-            <p:ph idx="1"/>
-          </p:nvPr>
-        </p:nvSpPr>
-        <p:spPr>
-          <a:xfrm>
-            <a:off x="838200" y="1935478"/>
-            <a:ext cx="10515600" cy="3474721"/>
-          </a:xfrm>
-        </p:spPr>
-        <p:txBody>
-          <a:bodyPr/>
-          <a:lstStyle/>
-          <a:p>
-            <a:r>
-              <a:rPr lang="en-GB" dirty="0"/>
-              <a:t>Complete Model evaluation.</a:t>
-            </a:r>
-          </a:p>
-          <a:p>
-            <a:r>
-              <a:rPr lang="en-GB" dirty="0"/>
-              <a:t>Complete Hypothesis tests.</a:t>
-            </a:r>
-          </a:p>
-          <a:p>
-            <a:r>
-              <a:rPr lang="en-GB" dirty="0"/>
-              <a:t>Start work on the final report.</a:t>
-            </a:r>
-          </a:p>
-          <a:p>
-            <a:endParaRPr lang="en-GB" dirty="0"/>
+              <a:t>Model Evaluation Metrics – Logistic Regression</a:t>
+            </a:r>
           </a:p>
         </p:txBody>
       </p:sp>
@@ -4291,7 +4486,7 @@
           <p:cNvPr id="4" name="Slide Number Placeholder 3">
             <a:extLst>
               <a:ext uri="{FF2B5EF4-FFF2-40B4-BE49-F238E27FC236}">
-                <a16:creationId xmlns:a16="http://schemas.microsoft.com/office/drawing/2014/main" id="{FC0A0B74-2926-8942-2295-2998C326C017}"/>
+                <a16:creationId xmlns:a16="http://schemas.microsoft.com/office/drawing/2014/main" id="{72DA36CD-3A23-FC5A-DB33-9A39B14AE355}"/>
               </a:ext>
             </a:extLst>
           </p:cNvPr>
@@ -4315,10 +4510,121 @@
           </a:p>
         </p:txBody>
       </p:sp>
+      <p:sp>
+        <p:nvSpPr>
+          <p:cNvPr id="14" name="TextBox 13">
+            <a:extLst>
+              <a:ext uri="{FF2B5EF4-FFF2-40B4-BE49-F238E27FC236}">
+                <a16:creationId xmlns:a16="http://schemas.microsoft.com/office/drawing/2014/main" id="{7AB141AA-D222-A4A2-2446-4B95B5D3CD2D}"/>
+              </a:ext>
+            </a:extLst>
+          </p:cNvPr>
+          <p:cNvSpPr txBox="1"/>
+          <p:nvPr/>
+        </p:nvSpPr>
+        <p:spPr>
+          <a:xfrm>
+            <a:off x="662940" y="3913304"/>
+            <a:ext cx="10866120" cy="1938992"/>
+          </a:xfrm>
+          <a:prstGeom prst="rect">
+            <a:avLst/>
+          </a:prstGeom>
+          <a:noFill/>
+        </p:spPr>
+        <p:txBody>
+          <a:bodyPr wrap="square" rtlCol="0">
+            <a:spAutoFit/>
+          </a:bodyPr>
+          <a:lstStyle/>
+          <a:p>
+            <a:pPr marL="230400" indent="-230400">
+              <a:buFont typeface="Arial" panose="020B0604020202020204" pitchFamily="34" charset="0"/>
+              <a:buChar char="•"/>
+            </a:pPr>
+            <a:r>
+              <a:rPr lang="en-US" sz="2000" b="1" dirty="0"/>
+              <a:t>Accuracy</a:t>
+            </a:r>
+            <a:r>
+              <a:rPr lang="en-US" sz="2000" dirty="0"/>
+              <a:t> in the Early and Midpoint phases ranges between 75–79%.</a:t>
+            </a:r>
+          </a:p>
+          <a:p>
+            <a:pPr marL="230400" indent="-230400">
+              <a:buFont typeface="Arial" panose="020B0604020202020204" pitchFamily="34" charset="0"/>
+              <a:buChar char="•"/>
+            </a:pPr>
+            <a:r>
+              <a:rPr lang="en-US" sz="2000" dirty="0"/>
+              <a:t>For the </a:t>
+            </a:r>
+            <a:r>
+              <a:rPr lang="en-US" sz="2000" b="1" dirty="0"/>
+              <a:t>non-dropout class</a:t>
+            </a:r>
+            <a:r>
+              <a:rPr lang="en-US" sz="2000" dirty="0"/>
+              <a:t>, F1, precision and recall consistently stay above 80%, with precision peaking at 93% by Midpoint, showing that LR is effective at identifying non-dropouts.</a:t>
+            </a:r>
+          </a:p>
+          <a:p>
+            <a:pPr marL="230400" indent="-230400">
+              <a:buFont typeface="Arial" panose="020B0604020202020204" pitchFamily="34" charset="0"/>
+              <a:buChar char="•"/>
+            </a:pPr>
+            <a:r>
+              <a:rPr lang="en-US" sz="2000" dirty="0"/>
+              <a:t>In contrast, the </a:t>
+            </a:r>
+            <a:r>
+              <a:rPr lang="en-US" sz="2000" b="1" dirty="0"/>
+              <a:t>dropout class </a:t>
+            </a:r>
+            <a:r>
+              <a:rPr lang="en-US" sz="2000" dirty="0"/>
+              <a:t>performs much worse: F1 lags at 51–60%, precision remains low at 43–49%, while recall is relatively stronger at 62–76%, but still falls short compared to the non-dropout class.</a:t>
+            </a:r>
+            <a:endParaRPr lang="en-GB" sz="2000" dirty="0"/>
+          </a:p>
+        </p:txBody>
+      </p:sp>
+      <p:pic>
+        <p:nvPicPr>
+          <p:cNvPr id="7" name="Picture 6">
+            <a:extLst>
+              <a:ext uri="{FF2B5EF4-FFF2-40B4-BE49-F238E27FC236}">
+                <a16:creationId xmlns:a16="http://schemas.microsoft.com/office/drawing/2014/main" id="{BB86C7B2-377A-9CA7-7C2D-01CD97A244D7}"/>
+              </a:ext>
+            </a:extLst>
+          </p:cNvPr>
+          <p:cNvPicPr>
+            <a:picLocks noChangeAspect="1"/>
+          </p:cNvPicPr>
+          <p:nvPr/>
+        </p:nvPicPr>
+        <p:blipFill>
+          <a:blip r:embed="rId2"/>
+          <a:srcRect t="13387" b="8771"/>
+          <a:stretch>
+            <a:fillRect/>
+          </a:stretch>
+        </p:blipFill>
+        <p:spPr>
+          <a:xfrm>
+            <a:off x="2054147" y="1918649"/>
+            <a:ext cx="7097115" cy="1742628"/>
+          </a:xfrm>
+          <a:prstGeom prst="rect">
+            <a:avLst/>
+          </a:prstGeom>
+        </p:spPr>
+      </p:pic>
     </p:spTree>
     <p:extLst>
       <p:ext uri="{BB962C8B-B14F-4D97-AF65-F5344CB8AC3E}">
-        <p14:creationId xmlns:p14="http://schemas.microsoft.com/office/powerpoint/2010/main" val="1658314820"/>
+        <p14:creationId xmlns:p14="http://schemas.microsoft.com/office/powerpoint/2010/main" val="653381205"/>
       </p:ext>
     </p:extLst>
   </p:cSld>
@@ -4336,7 +4642,7 @@
         <p:cNvPr id="1" name="">
           <a:extLst>
             <a:ext uri="{FF2B5EF4-FFF2-40B4-BE49-F238E27FC236}">
-              <a16:creationId xmlns:a16="http://schemas.microsoft.com/office/drawing/2014/main" id="{F9DCF10B-D4E6-53BD-81F9-D26F11175604}"/>
+              <a16:creationId xmlns:a16="http://schemas.microsoft.com/office/drawing/2014/main" id="{E16A8978-162E-4654-3547-E481B661CBB4}"/>
             </a:ext>
           </a:extLst>
         </p:cNvPr>
@@ -4356,7 +4662,7 @@
           <p:cNvPr id="2" name="Title 1">
             <a:extLst>
               <a:ext uri="{FF2B5EF4-FFF2-40B4-BE49-F238E27FC236}">
-                <a16:creationId xmlns:a16="http://schemas.microsoft.com/office/drawing/2014/main" id="{FDB5D353-AA06-66B3-6DCF-6AE8D867E3E7}"/>
+                <a16:creationId xmlns:a16="http://schemas.microsoft.com/office/drawing/2014/main" id="{42C52BE8-D389-6C0D-B851-8761F5F124BE}"/>
               </a:ext>
             </a:extLst>
           </p:cNvPr>
@@ -4369,8 +4675,8 @@
         </p:nvSpPr>
         <p:spPr>
           <a:xfrm>
-            <a:off x="204537" y="1214754"/>
-            <a:ext cx="11149263" cy="713105"/>
+            <a:off x="276726" y="1111885"/>
+            <a:ext cx="11077074" cy="831215"/>
           </a:xfrm>
         </p:spPr>
         <p:txBody>
@@ -4381,189 +4687,8 @@
           <a:p>
             <a:r>
               <a:rPr lang="en-GB" sz="4000" b="1" dirty="0"/>
-              <a:t>Reference</a:t>
-            </a:r>
-            <a:endParaRPr lang="en-GB" b="1" dirty="0"/>
-          </a:p>
-        </p:txBody>
-      </p:sp>
-      <p:sp>
-        <p:nvSpPr>
-          <p:cNvPr id="3" name="Content Placeholder 2">
-            <a:extLst>
-              <a:ext uri="{FF2B5EF4-FFF2-40B4-BE49-F238E27FC236}">
-                <a16:creationId xmlns:a16="http://schemas.microsoft.com/office/drawing/2014/main" id="{92BC6208-3CF5-377D-DD93-81EA852DA9A3}"/>
-              </a:ext>
-            </a:extLst>
-          </p:cNvPr>
-          <p:cNvSpPr>
-            <a:spLocks noGrp="1"/>
-          </p:cNvSpPr>
-          <p:nvPr>
-            <p:ph idx="1"/>
-          </p:nvPr>
-        </p:nvSpPr>
-        <p:spPr>
-          <a:xfrm>
-            <a:off x="348916" y="1935478"/>
-            <a:ext cx="11004884" cy="3815617"/>
-          </a:xfrm>
-        </p:spPr>
-        <p:txBody>
-          <a:bodyPr>
-            <a:normAutofit fontScale="85000" lnSpcReduction="20000"/>
-          </a:bodyPr>
-          <a:lstStyle/>
-          <a:p>
-            <a:pPr marL="0" indent="0">
-              <a:buNone/>
-            </a:pPr>
-            <a:r>
-              <a:rPr lang="en-GB" dirty="0"/>
-              <a:t>[1] H. Waheed, S.-U. Hassan, Naif Radi </a:t>
-            </a:r>
-            <a:r>
-              <a:rPr lang="en-GB" dirty="0" err="1"/>
-              <a:t>Aljohani</a:t>
-            </a:r>
-            <a:r>
-              <a:rPr lang="en-GB" dirty="0"/>
-              <a:t>, J. Hardman, Salem </a:t>
-            </a:r>
-            <a:r>
-              <a:rPr lang="en-GB" dirty="0" err="1"/>
-              <a:t>Alelyani</a:t>
-            </a:r>
-            <a:r>
-              <a:rPr lang="en-GB" dirty="0"/>
-              <a:t>, and R. Nawaz, “Predicting academic performance of students from VLE big data using deep learning models,” </a:t>
-            </a:r>
-            <a:r>
-              <a:rPr lang="en-GB" i="1" dirty="0"/>
-              <a:t>Computers in Human Behavior</a:t>
-            </a:r>
-            <a:r>
-              <a:rPr lang="en-GB" dirty="0"/>
-              <a:t>, vol. 104, pp. 106189–106189, Nov. 2019, </a:t>
-            </a:r>
-            <a:r>
-              <a:rPr lang="en-GB" dirty="0" err="1"/>
-              <a:t>doi</a:t>
-            </a:r>
-            <a:r>
-              <a:rPr lang="en-GB" dirty="0"/>
-              <a:t>: </a:t>
-            </a:r>
-            <a:r>
-              <a:rPr lang="en-GB" dirty="0">
-                <a:hlinkClick r:id="rId2"/>
-              </a:rPr>
-              <a:t>https://doi.org/10.1016/j.chb.2019.106189</a:t>
-            </a:r>
-            <a:r>
-              <a:rPr lang="en-GB" dirty="0"/>
-              <a:t>.</a:t>
-            </a:r>
-          </a:p>
-          <a:p>
-            <a:pPr marL="0" indent="0">
-              <a:buNone/>
-            </a:pPr>
-            <a:endParaRPr lang="en-GB" dirty="0"/>
-          </a:p>
-          <a:p>
-            <a:pPr marL="0" indent="0">
-              <a:buNone/>
-            </a:pPr>
-            <a:r>
-              <a:rPr lang="en-US" dirty="0"/>
-              <a:t>[2] M. Adnan </a:t>
-            </a:r>
-            <a:r>
-              <a:rPr lang="en-US" i="1" dirty="0"/>
-              <a:t>et al.</a:t>
-            </a:r>
-            <a:r>
-              <a:rPr lang="en-US" dirty="0"/>
-              <a:t>, “Predicting at-Risk Students at Different Percentages of Course Length for Early Intervention Using Machine Learning Models,” </a:t>
-            </a:r>
-            <a:r>
-              <a:rPr lang="en-US" i="1" dirty="0"/>
-              <a:t>IEEE Access</a:t>
-            </a:r>
-            <a:r>
-              <a:rPr lang="en-US" dirty="0"/>
-              <a:t>, vol. 9, pp. 7519–7539, 2021, </a:t>
-            </a:r>
-            <a:r>
-              <a:rPr lang="en-US" dirty="0" err="1"/>
-              <a:t>doi</a:t>
-            </a:r>
-            <a:r>
-              <a:rPr lang="en-US" dirty="0"/>
-              <a:t>: </a:t>
-            </a:r>
-            <a:r>
-              <a:rPr lang="en-US" dirty="0">
-                <a:hlinkClick r:id="rId3"/>
-              </a:rPr>
-              <a:t>https://doi.org/10.1109/access.2021.3049446</a:t>
-            </a:r>
-            <a:r>
-              <a:rPr lang="en-US" dirty="0"/>
-              <a:t>.</a:t>
-            </a:r>
-          </a:p>
-          <a:p>
-            <a:pPr marL="0" indent="0">
-              <a:buNone/>
-            </a:pPr>
-            <a:endParaRPr lang="en-US" dirty="0"/>
-          </a:p>
-          <a:p>
-            <a:pPr marL="0" indent="0">
-              <a:buNone/>
-            </a:pPr>
-            <a:r>
-              <a:rPr lang="en-US" dirty="0"/>
-              <a:t>[3] J. Bryson, “University dropout rates reach new high, figures suggest,” </a:t>
-            </a:r>
-            <a:r>
-              <a:rPr lang="en-US" i="1" dirty="0"/>
-              <a:t>BBC News</a:t>
-            </a:r>
-            <a:r>
-              <a:rPr lang="en-US" dirty="0"/>
-              <a:t>, Sep. 28, 2023. </a:t>
-            </a:r>
-            <a:r>
-              <a:rPr lang="en-US" dirty="0">
-                <a:hlinkClick r:id="rId4"/>
-              </a:rPr>
-              <a:t>https://www.bbc.co.uk/news/education-66940041</a:t>
-            </a:r>
-            <a:r>
-              <a:rPr lang="en-US" dirty="0"/>
-              <a:t>.</a:t>
-            </a:r>
-          </a:p>
-          <a:p>
-            <a:pPr marL="0" indent="0">
-              <a:buNone/>
-            </a:pPr>
-            <a:endParaRPr lang="en-US" dirty="0"/>
-          </a:p>
-          <a:p>
-            <a:pPr marL="0" indent="0">
-              <a:buNone/>
-            </a:pPr>
-            <a:endParaRPr lang="en-US" dirty="0"/>
-          </a:p>
-          <a:p>
-            <a:pPr marL="0" indent="0">
-              <a:buNone/>
-            </a:pPr>
-            <a:endParaRPr lang="en-GB" dirty="0"/>
+              <a:t>Model Evaluation Metrics – SVM (RBF)</a:t>
+            </a:r>
           </a:p>
         </p:txBody>
       </p:sp>
@@ -4572,7 +4697,7 @@
           <p:cNvPr id="4" name="Slide Number Placeholder 3">
             <a:extLst>
               <a:ext uri="{FF2B5EF4-FFF2-40B4-BE49-F238E27FC236}">
-                <a16:creationId xmlns:a16="http://schemas.microsoft.com/office/drawing/2014/main" id="{71900C1A-082E-24F7-275D-98FF29816312}"/>
+                <a16:creationId xmlns:a16="http://schemas.microsoft.com/office/drawing/2014/main" id="{02B7EFB7-88D9-B472-6CE8-8B70AED4A0EA}"/>
               </a:ext>
             </a:extLst>
           </p:cNvPr>
@@ -4596,10 +4721,116 @@
           </a:p>
         </p:txBody>
       </p:sp>
+      <p:pic>
+        <p:nvPicPr>
+          <p:cNvPr id="9" name="Picture 8">
+            <a:extLst>
+              <a:ext uri="{FF2B5EF4-FFF2-40B4-BE49-F238E27FC236}">
+                <a16:creationId xmlns:a16="http://schemas.microsoft.com/office/drawing/2014/main" id="{DE1830F3-BDDA-560E-E4F0-B10345B6E7F4}"/>
+              </a:ext>
+            </a:extLst>
+          </p:cNvPr>
+          <p:cNvPicPr>
+            <a:picLocks noChangeAspect="1"/>
+          </p:cNvPicPr>
+          <p:nvPr/>
+        </p:nvPicPr>
+        <p:blipFill>
+          <a:blip r:embed="rId2"/>
+          <a:stretch>
+            <a:fillRect/>
+          </a:stretch>
+        </p:blipFill>
+        <p:spPr>
+          <a:xfrm>
+            <a:off x="2453156" y="1897498"/>
+            <a:ext cx="6935168" cy="1819529"/>
+          </a:xfrm>
+          <a:prstGeom prst="rect">
+            <a:avLst/>
+          </a:prstGeom>
+        </p:spPr>
+      </p:pic>
+      <p:sp>
+        <p:nvSpPr>
+          <p:cNvPr id="11" name="TextBox 10">
+            <a:extLst>
+              <a:ext uri="{FF2B5EF4-FFF2-40B4-BE49-F238E27FC236}">
+                <a16:creationId xmlns:a16="http://schemas.microsoft.com/office/drawing/2014/main" id="{59981017-27EA-F0A4-41CA-B085EDF09D1F}"/>
+              </a:ext>
+            </a:extLst>
+          </p:cNvPr>
+          <p:cNvSpPr txBox="1"/>
+          <p:nvPr/>
+        </p:nvSpPr>
+        <p:spPr>
+          <a:xfrm>
+            <a:off x="626844" y="3717027"/>
+            <a:ext cx="11248323" cy="2246769"/>
+          </a:xfrm>
+          <a:prstGeom prst="rect">
+            <a:avLst/>
+          </a:prstGeom>
+          <a:noFill/>
+        </p:spPr>
+        <p:txBody>
+          <a:bodyPr wrap="square" rtlCol="0">
+            <a:spAutoFit/>
+          </a:bodyPr>
+          <a:lstStyle/>
+          <a:p>
+            <a:pPr marL="230400" indent="-230400">
+              <a:buFont typeface="Arial" panose="020B0604020202020204" pitchFamily="34" charset="0"/>
+              <a:buChar char="•"/>
+            </a:pPr>
+            <a:r>
+              <a:rPr lang="en-US" sz="2000" dirty="0"/>
+              <a:t>Accuracy in both the Early and Midpoint phases remains at 78%, with no improvement despite the larger amount of student data available at Midpoint.</a:t>
+            </a:r>
+          </a:p>
+          <a:p>
+            <a:pPr marL="230400" indent="-230400">
+              <a:buFont typeface="Arial" panose="020B0604020202020204" pitchFamily="34" charset="0"/>
+              <a:buChar char="•"/>
+            </a:pPr>
+            <a:r>
+              <a:rPr lang="en-US" sz="2000" dirty="0"/>
+              <a:t>For </a:t>
+            </a:r>
+            <a:r>
+              <a:rPr lang="en-US" sz="2000" b="1" dirty="0"/>
+              <a:t>non-dropout</a:t>
+            </a:r>
+            <a:r>
+              <a:rPr lang="en-US" sz="2000" dirty="0"/>
+              <a:t> class, F1, precision, and recall all stay above 84%, indicating that SVM, like LR, is effective at identifying non-dropouts with comparable performance.</a:t>
+            </a:r>
+          </a:p>
+          <a:p>
+            <a:pPr marL="230400" indent="-230400">
+              <a:buFont typeface="Arial" panose="020B0604020202020204" pitchFamily="34" charset="0"/>
+              <a:buChar char="•"/>
+            </a:pPr>
+            <a:r>
+              <a:rPr lang="en-US" sz="2000" dirty="0"/>
+              <a:t>The </a:t>
+            </a:r>
+            <a:r>
+              <a:rPr lang="en-US" sz="2000" b="1" dirty="0"/>
+              <a:t>dropout class </a:t>
+            </a:r>
+            <a:r>
+              <a:rPr lang="en-US" sz="2000" dirty="0"/>
+              <a:t>continues to underperform: F1 falls between 48–57%, precision stays low at 46–48%, and recall ranges from 51–70%. Overall, its performance is slightly weaker than LR on the non-dropout class.</a:t>
+            </a:r>
+            <a:endParaRPr lang="en-GB" sz="2000" dirty="0"/>
+          </a:p>
+        </p:txBody>
+      </p:sp>
     </p:spTree>
     <p:extLst>
       <p:ext uri="{BB962C8B-B14F-4D97-AF65-F5344CB8AC3E}">
-        <p14:creationId xmlns:p14="http://schemas.microsoft.com/office/powerpoint/2010/main" val="2221085332"/>
+        <p14:creationId xmlns:p14="http://schemas.microsoft.com/office/powerpoint/2010/main" val="3719682602"/>
       </p:ext>
     </p:extLst>
   </p:cSld>
@@ -4610,6 +4841,972 @@
 </file>
 
 <file path=ppt/slides/slide13.xml><?xml version="1.0" encoding="utf-8"?>
+<p:sld xmlns:a="http://schemas.openxmlformats.org/drawingml/2006/main" xmlns:r="http://schemas.openxmlformats.org/officeDocument/2006/relationships" xmlns:p="http://schemas.openxmlformats.org/presentationml/2006/main">
+  <p:cSld>
+    <p:spTree>
+      <p:nvGrpSpPr>
+        <p:cNvPr id="1" name="">
+          <a:extLst>
+            <a:ext uri="{FF2B5EF4-FFF2-40B4-BE49-F238E27FC236}">
+              <a16:creationId xmlns:a16="http://schemas.microsoft.com/office/drawing/2014/main" id="{B9917F79-EB32-EF52-F844-13BB28D500D1}"/>
+            </a:ext>
+          </a:extLst>
+        </p:cNvPr>
+        <p:cNvGrpSpPr/>
+        <p:nvPr/>
+      </p:nvGrpSpPr>
+      <p:grpSpPr>
+        <a:xfrm>
+          <a:off x="0" y="0"/>
+          <a:ext cx="0" cy="0"/>
+          <a:chOff x="0" y="0"/>
+          <a:chExt cx="0" cy="0"/>
+        </a:xfrm>
+      </p:grpSpPr>
+      <p:sp>
+        <p:nvSpPr>
+          <p:cNvPr id="2" name="Title 1">
+            <a:extLst>
+              <a:ext uri="{FF2B5EF4-FFF2-40B4-BE49-F238E27FC236}">
+                <a16:creationId xmlns:a16="http://schemas.microsoft.com/office/drawing/2014/main" id="{CE54D269-416C-C0A5-0DD2-7FC4DC8269E3}"/>
+              </a:ext>
+            </a:extLst>
+          </p:cNvPr>
+          <p:cNvSpPr>
+            <a:spLocks noGrp="1"/>
+          </p:cNvSpPr>
+          <p:nvPr>
+            <p:ph type="title"/>
+          </p:nvPr>
+        </p:nvSpPr>
+        <p:spPr>
+          <a:xfrm>
+            <a:off x="264695" y="1111885"/>
+            <a:ext cx="11089105" cy="831215"/>
+          </a:xfrm>
+        </p:spPr>
+        <p:txBody>
+          <a:bodyPr>
+            <a:normAutofit/>
+          </a:bodyPr>
+          <a:lstStyle/>
+          <a:p>
+            <a:r>
+              <a:rPr lang="en-GB" sz="4000" b="1" dirty="0"/>
+              <a:t>Model Evaluation Metrics – MLP Classifier</a:t>
+            </a:r>
+          </a:p>
+        </p:txBody>
+      </p:sp>
+      <p:sp>
+        <p:nvSpPr>
+          <p:cNvPr id="4" name="Slide Number Placeholder 3">
+            <a:extLst>
+              <a:ext uri="{FF2B5EF4-FFF2-40B4-BE49-F238E27FC236}">
+                <a16:creationId xmlns:a16="http://schemas.microsoft.com/office/drawing/2014/main" id="{EC14B056-3002-31E0-ED6B-091D51A30E4F}"/>
+              </a:ext>
+            </a:extLst>
+          </p:cNvPr>
+          <p:cNvSpPr>
+            <a:spLocks noGrp="1"/>
+          </p:cNvSpPr>
+          <p:nvPr>
+            <p:ph type="sldNum" sz="quarter" idx="12"/>
+          </p:nvPr>
+        </p:nvSpPr>
+        <p:spPr/>
+        <p:txBody>
+          <a:bodyPr/>
+          <a:lstStyle/>
+          <a:p>
+            <a:fld id="{ECF88CA5-FB5C-4C9F-81AA-71804F63A16C}" type="slidenum">
+              <a:rPr lang="en-US" smtClean="0"/>
+              <a:t>13</a:t>
+            </a:fld>
+            <a:endParaRPr lang="en-US"/>
+          </a:p>
+        </p:txBody>
+      </p:sp>
+      <p:pic>
+        <p:nvPicPr>
+          <p:cNvPr id="8" name="Picture 7">
+            <a:extLst>
+              <a:ext uri="{FF2B5EF4-FFF2-40B4-BE49-F238E27FC236}">
+                <a16:creationId xmlns:a16="http://schemas.microsoft.com/office/drawing/2014/main" id="{7A46EF9E-3DAB-3F18-DCF3-645F95007463}"/>
+              </a:ext>
+            </a:extLst>
+          </p:cNvPr>
+          <p:cNvPicPr>
+            <a:picLocks noChangeAspect="1"/>
+          </p:cNvPicPr>
+          <p:nvPr/>
+        </p:nvPicPr>
+        <p:blipFill>
+          <a:blip r:embed="rId2"/>
+          <a:stretch>
+            <a:fillRect/>
+          </a:stretch>
+        </p:blipFill>
+        <p:spPr>
+          <a:xfrm>
+            <a:off x="2341663" y="1943100"/>
+            <a:ext cx="6935168" cy="1876687"/>
+          </a:xfrm>
+          <a:prstGeom prst="rect">
+            <a:avLst/>
+          </a:prstGeom>
+        </p:spPr>
+      </p:pic>
+      <p:sp>
+        <p:nvSpPr>
+          <p:cNvPr id="9" name="TextBox 8">
+            <a:extLst>
+              <a:ext uri="{FF2B5EF4-FFF2-40B4-BE49-F238E27FC236}">
+                <a16:creationId xmlns:a16="http://schemas.microsoft.com/office/drawing/2014/main" id="{51268658-0ABD-6E21-FF9E-EB53D8498C0D}"/>
+              </a:ext>
+            </a:extLst>
+          </p:cNvPr>
+          <p:cNvSpPr txBox="1"/>
+          <p:nvPr/>
+        </p:nvSpPr>
+        <p:spPr>
+          <a:xfrm>
+            <a:off x="662940" y="3913304"/>
+            <a:ext cx="10866120" cy="1938992"/>
+          </a:xfrm>
+          <a:prstGeom prst="rect">
+            <a:avLst/>
+          </a:prstGeom>
+          <a:noFill/>
+        </p:spPr>
+        <p:txBody>
+          <a:bodyPr wrap="square" rtlCol="0">
+            <a:spAutoFit/>
+          </a:bodyPr>
+          <a:lstStyle/>
+          <a:p>
+            <a:pPr marL="230400" indent="-230400">
+              <a:buFont typeface="Arial" panose="020B0604020202020204" pitchFamily="34" charset="0"/>
+              <a:buChar char="•"/>
+            </a:pPr>
+            <a:r>
+              <a:rPr lang="en-US" sz="2000" dirty="0"/>
+              <a:t>Accuracy in the Early and Midpoint phases falls within 77–80%.</a:t>
+            </a:r>
+          </a:p>
+          <a:p>
+            <a:pPr marL="230400" indent="-230400">
+              <a:buFont typeface="Arial" panose="020B0604020202020204" pitchFamily="34" charset="0"/>
+              <a:buChar char="•"/>
+            </a:pPr>
+            <a:r>
+              <a:rPr lang="en-US" sz="2000" dirty="0"/>
+              <a:t>For the </a:t>
+            </a:r>
+            <a:r>
+              <a:rPr lang="en-US" sz="2000" b="1" dirty="0"/>
+              <a:t>non-dropout</a:t>
+            </a:r>
+            <a:r>
+              <a:rPr lang="en-US" sz="2000" dirty="0"/>
+              <a:t> class, F1, precision, and recall remain consistently above 84%, with MLP performing best at predicting this class compared to other models tested.</a:t>
+            </a:r>
+          </a:p>
+          <a:p>
+            <a:pPr marL="230400" indent="-230400">
+              <a:buFont typeface="Arial" panose="020B0604020202020204" pitchFamily="34" charset="0"/>
+              <a:buChar char="•"/>
+            </a:pPr>
+            <a:r>
+              <a:rPr lang="en-US" sz="2000" dirty="0"/>
+              <a:t>However, for the </a:t>
+            </a:r>
+            <a:r>
+              <a:rPr lang="en-US" sz="2000" b="1" dirty="0"/>
+              <a:t>dropout class</a:t>
+            </a:r>
+            <a:r>
+              <a:rPr lang="en-US" sz="2000" dirty="0"/>
+              <a:t>, MLP performs the worst overall, with F1 between 38–47%, precision at 43–51%, and the lowest recall at 34–43%, showing that it struggles the most in detecting dropouts.</a:t>
+            </a:r>
+            <a:endParaRPr lang="en-GB" sz="2000" dirty="0"/>
+          </a:p>
+        </p:txBody>
+      </p:sp>
+    </p:spTree>
+    <p:extLst>
+      <p:ext uri="{BB962C8B-B14F-4D97-AF65-F5344CB8AC3E}">
+        <p14:creationId xmlns:p14="http://schemas.microsoft.com/office/powerpoint/2010/main" val="899693942"/>
+      </p:ext>
+    </p:extLst>
+  </p:cSld>
+  <p:clrMapOvr>
+    <a:masterClrMapping/>
+  </p:clrMapOvr>
+</p:sld>
+</file>
+
+<file path=ppt/slides/slide14.xml><?xml version="1.0" encoding="utf-8"?>
+<p:sld xmlns:a="http://schemas.openxmlformats.org/drawingml/2006/main" xmlns:r="http://schemas.openxmlformats.org/officeDocument/2006/relationships" xmlns:p="http://schemas.openxmlformats.org/presentationml/2006/main">
+  <p:cSld>
+    <p:spTree>
+      <p:nvGrpSpPr>
+        <p:cNvPr id="1" name="">
+          <a:extLst>
+            <a:ext uri="{FF2B5EF4-FFF2-40B4-BE49-F238E27FC236}">
+              <a16:creationId xmlns:a16="http://schemas.microsoft.com/office/drawing/2014/main" id="{524072D4-230C-0823-A920-12C445BCA9DF}"/>
+            </a:ext>
+          </a:extLst>
+        </p:cNvPr>
+        <p:cNvGrpSpPr/>
+        <p:nvPr/>
+      </p:nvGrpSpPr>
+      <p:grpSpPr>
+        <a:xfrm>
+          <a:off x="0" y="0"/>
+          <a:ext cx="0" cy="0"/>
+          <a:chOff x="0" y="0"/>
+          <a:chExt cx="0" cy="0"/>
+        </a:xfrm>
+      </p:grpSpPr>
+      <p:sp>
+        <p:nvSpPr>
+          <p:cNvPr id="2" name="Title 1">
+            <a:extLst>
+              <a:ext uri="{FF2B5EF4-FFF2-40B4-BE49-F238E27FC236}">
+                <a16:creationId xmlns:a16="http://schemas.microsoft.com/office/drawing/2014/main" id="{7563138F-4EC8-C519-F7CC-061326244104}"/>
+              </a:ext>
+            </a:extLst>
+          </p:cNvPr>
+          <p:cNvSpPr>
+            <a:spLocks noGrp="1"/>
+          </p:cNvSpPr>
+          <p:nvPr>
+            <p:ph type="title"/>
+          </p:nvPr>
+        </p:nvSpPr>
+        <p:spPr>
+          <a:xfrm>
+            <a:off x="264695" y="1111885"/>
+            <a:ext cx="11089105" cy="831215"/>
+          </a:xfrm>
+        </p:spPr>
+        <p:txBody>
+          <a:bodyPr>
+            <a:normAutofit/>
+          </a:bodyPr>
+          <a:lstStyle/>
+          <a:p>
+            <a:r>
+              <a:rPr lang="en-GB" sz="4000" b="1" dirty="0"/>
+              <a:t>Model Evaluation Metrics – Random Forest</a:t>
+            </a:r>
+          </a:p>
+        </p:txBody>
+      </p:sp>
+      <p:sp>
+        <p:nvSpPr>
+          <p:cNvPr id="4" name="Slide Number Placeholder 3">
+            <a:extLst>
+              <a:ext uri="{FF2B5EF4-FFF2-40B4-BE49-F238E27FC236}">
+                <a16:creationId xmlns:a16="http://schemas.microsoft.com/office/drawing/2014/main" id="{38657248-3BAC-124A-E4C2-28919DC935D9}"/>
+              </a:ext>
+            </a:extLst>
+          </p:cNvPr>
+          <p:cNvSpPr>
+            <a:spLocks noGrp="1"/>
+          </p:cNvSpPr>
+          <p:nvPr>
+            <p:ph type="sldNum" sz="quarter" idx="12"/>
+          </p:nvPr>
+        </p:nvSpPr>
+        <p:spPr/>
+        <p:txBody>
+          <a:bodyPr/>
+          <a:lstStyle/>
+          <a:p>
+            <a:fld id="{ECF88CA5-FB5C-4C9F-81AA-71804F63A16C}" type="slidenum">
+              <a:rPr lang="en-US" smtClean="0"/>
+              <a:t>14</a:t>
+            </a:fld>
+            <a:endParaRPr lang="en-US"/>
+          </a:p>
+        </p:txBody>
+      </p:sp>
+      <p:pic>
+        <p:nvPicPr>
+          <p:cNvPr id="5" name="Picture 4">
+            <a:extLst>
+              <a:ext uri="{FF2B5EF4-FFF2-40B4-BE49-F238E27FC236}">
+                <a16:creationId xmlns:a16="http://schemas.microsoft.com/office/drawing/2014/main" id="{65D79452-DB9B-9F75-B1D5-DB781F4D8DCD}"/>
+              </a:ext>
+            </a:extLst>
+          </p:cNvPr>
+          <p:cNvPicPr>
+            <a:picLocks noChangeAspect="1"/>
+          </p:cNvPicPr>
+          <p:nvPr/>
+        </p:nvPicPr>
+        <p:blipFill>
+          <a:blip r:embed="rId2"/>
+          <a:stretch>
+            <a:fillRect/>
+          </a:stretch>
+        </p:blipFill>
+        <p:spPr>
+          <a:xfrm>
+            <a:off x="2360715" y="1879853"/>
+            <a:ext cx="6897063" cy="1781424"/>
+          </a:xfrm>
+          <a:prstGeom prst="rect">
+            <a:avLst/>
+          </a:prstGeom>
+        </p:spPr>
+      </p:pic>
+      <p:sp>
+        <p:nvSpPr>
+          <p:cNvPr id="6" name="TextBox 5">
+            <a:extLst>
+              <a:ext uri="{FF2B5EF4-FFF2-40B4-BE49-F238E27FC236}">
+                <a16:creationId xmlns:a16="http://schemas.microsoft.com/office/drawing/2014/main" id="{2CCF403C-7C3E-08F5-AF99-1B9B58CA6EBC}"/>
+              </a:ext>
+            </a:extLst>
+          </p:cNvPr>
+          <p:cNvSpPr txBox="1"/>
+          <p:nvPr/>
+        </p:nvSpPr>
+        <p:spPr>
+          <a:xfrm>
+            <a:off x="662940" y="3913304"/>
+            <a:ext cx="10866120" cy="1938992"/>
+          </a:xfrm>
+          <a:prstGeom prst="rect">
+            <a:avLst/>
+          </a:prstGeom>
+          <a:noFill/>
+        </p:spPr>
+        <p:txBody>
+          <a:bodyPr wrap="square" rtlCol="0">
+            <a:spAutoFit/>
+          </a:bodyPr>
+          <a:lstStyle/>
+          <a:p>
+            <a:pPr marL="230400" indent="-230400">
+              <a:buFont typeface="Arial" panose="020B0604020202020204" pitchFamily="34" charset="0"/>
+              <a:buChar char="•"/>
+            </a:pPr>
+            <a:r>
+              <a:rPr lang="en-US" sz="2000" dirty="0"/>
+              <a:t>Accuracy in the Early and Midpoint phases stays around 76–77%.</a:t>
+            </a:r>
+          </a:p>
+          <a:p>
+            <a:pPr marL="230400" indent="-230400">
+              <a:buFont typeface="Arial" panose="020B0604020202020204" pitchFamily="34" charset="0"/>
+              <a:buChar char="•"/>
+            </a:pPr>
+            <a:r>
+              <a:rPr lang="en-US" sz="2000" dirty="0"/>
+              <a:t>For the </a:t>
+            </a:r>
+            <a:r>
+              <a:rPr lang="en-US" sz="2000" b="1" dirty="0"/>
+              <a:t>non-dropout</a:t>
+            </a:r>
+            <a:r>
+              <a:rPr lang="en-US" sz="2000" dirty="0"/>
+              <a:t> class, F1, precision, and recall remain above 80%, though recall drops to 76% in the Midpoint and Late phases.</a:t>
+            </a:r>
+          </a:p>
+          <a:p>
+            <a:pPr marL="230400" indent="-230400">
+              <a:buFont typeface="Arial" panose="020B0604020202020204" pitchFamily="34" charset="0"/>
+              <a:buChar char="•"/>
+            </a:pPr>
+            <a:r>
+              <a:rPr lang="en-US" sz="2000" dirty="0"/>
+              <a:t>For the </a:t>
+            </a:r>
+            <a:r>
+              <a:rPr lang="en-US" sz="2000" b="1" dirty="0"/>
+              <a:t>dropout</a:t>
+            </a:r>
+            <a:r>
+              <a:rPr lang="en-US" sz="2000" dirty="0"/>
+              <a:t> class, RF performs on par with LR, achieving F1 scores of 50–60%, precision of 43–47%, and recall between 60–82%. At Midpoint, RF outperforms LR in recall, scoring 82% compared to LR’s 76%.</a:t>
+            </a:r>
+            <a:endParaRPr lang="en-GB" sz="2000" dirty="0"/>
+          </a:p>
+        </p:txBody>
+      </p:sp>
+    </p:spTree>
+    <p:extLst>
+      <p:ext uri="{BB962C8B-B14F-4D97-AF65-F5344CB8AC3E}">
+        <p14:creationId xmlns:p14="http://schemas.microsoft.com/office/powerpoint/2010/main" val="1897959904"/>
+      </p:ext>
+    </p:extLst>
+  </p:cSld>
+  <p:clrMapOvr>
+    <a:masterClrMapping/>
+  </p:clrMapOvr>
+</p:sld>
+</file>
+
+<file path=ppt/slides/slide15.xml><?xml version="1.0" encoding="utf-8"?>
+<p:sld xmlns:a="http://schemas.openxmlformats.org/drawingml/2006/main" xmlns:r="http://schemas.openxmlformats.org/officeDocument/2006/relationships" xmlns:p="http://schemas.openxmlformats.org/presentationml/2006/main">
+  <p:cSld>
+    <p:spTree>
+      <p:nvGrpSpPr>
+        <p:cNvPr id="1" name="">
+          <a:extLst>
+            <a:ext uri="{FF2B5EF4-FFF2-40B4-BE49-F238E27FC236}">
+              <a16:creationId xmlns:a16="http://schemas.microsoft.com/office/drawing/2014/main" id="{85AEF03D-00E4-13DF-EF1A-E538E1E3057A}"/>
+            </a:ext>
+          </a:extLst>
+        </p:cNvPr>
+        <p:cNvGrpSpPr/>
+        <p:nvPr/>
+      </p:nvGrpSpPr>
+      <p:grpSpPr>
+        <a:xfrm>
+          <a:off x="0" y="0"/>
+          <a:ext cx="0" cy="0"/>
+          <a:chOff x="0" y="0"/>
+          <a:chExt cx="0" cy="0"/>
+        </a:xfrm>
+      </p:grpSpPr>
+      <p:sp>
+        <p:nvSpPr>
+          <p:cNvPr id="2" name="Title 1">
+            <a:extLst>
+              <a:ext uri="{FF2B5EF4-FFF2-40B4-BE49-F238E27FC236}">
+                <a16:creationId xmlns:a16="http://schemas.microsoft.com/office/drawing/2014/main" id="{E31BBA41-6DA2-F0C7-5CF3-D785091F9FCA}"/>
+              </a:ext>
+            </a:extLst>
+          </p:cNvPr>
+          <p:cNvSpPr>
+            <a:spLocks noGrp="1"/>
+          </p:cNvSpPr>
+          <p:nvPr>
+            <p:ph type="title"/>
+          </p:nvPr>
+        </p:nvSpPr>
+        <p:spPr>
+          <a:xfrm>
+            <a:off x="487679" y="1111885"/>
+            <a:ext cx="11465781" cy="831215"/>
+          </a:xfrm>
+        </p:spPr>
+        <p:txBody>
+          <a:bodyPr>
+            <a:normAutofit/>
+          </a:bodyPr>
+          <a:lstStyle/>
+          <a:p>
+            <a:r>
+              <a:rPr lang="en-GB" sz="4000" b="1" dirty="0"/>
+              <a:t>Model Evaluation Metrics – Ranking (Dropout class) </a:t>
+            </a:r>
+          </a:p>
+        </p:txBody>
+      </p:sp>
+      <p:sp>
+        <p:nvSpPr>
+          <p:cNvPr id="4" name="Slide Number Placeholder 3">
+            <a:extLst>
+              <a:ext uri="{FF2B5EF4-FFF2-40B4-BE49-F238E27FC236}">
+                <a16:creationId xmlns:a16="http://schemas.microsoft.com/office/drawing/2014/main" id="{24821549-0441-641A-E6C1-CBD5B97B5FC9}"/>
+              </a:ext>
+            </a:extLst>
+          </p:cNvPr>
+          <p:cNvSpPr>
+            <a:spLocks noGrp="1"/>
+          </p:cNvSpPr>
+          <p:nvPr>
+            <p:ph type="sldNum" sz="quarter" idx="12"/>
+          </p:nvPr>
+        </p:nvSpPr>
+        <p:spPr/>
+        <p:txBody>
+          <a:bodyPr/>
+          <a:lstStyle/>
+          <a:p>
+            <a:fld id="{ECF88CA5-FB5C-4C9F-81AA-71804F63A16C}" type="slidenum">
+              <a:rPr lang="en-US" smtClean="0"/>
+              <a:t>15</a:t>
+            </a:fld>
+            <a:endParaRPr lang="en-US"/>
+          </a:p>
+        </p:txBody>
+      </p:sp>
+      <p:sp>
+        <p:nvSpPr>
+          <p:cNvPr id="14" name="TextBox 13">
+            <a:extLst>
+              <a:ext uri="{FF2B5EF4-FFF2-40B4-BE49-F238E27FC236}">
+                <a16:creationId xmlns:a16="http://schemas.microsoft.com/office/drawing/2014/main" id="{0E7CEF12-8538-9A49-564D-CB1943C5A48B}"/>
+              </a:ext>
+            </a:extLst>
+          </p:cNvPr>
+          <p:cNvSpPr txBox="1"/>
+          <p:nvPr/>
+        </p:nvSpPr>
+        <p:spPr>
+          <a:xfrm>
+            <a:off x="487680" y="2084504"/>
+            <a:ext cx="10866120" cy="3262432"/>
+          </a:xfrm>
+          <a:prstGeom prst="rect">
+            <a:avLst/>
+          </a:prstGeom>
+          <a:noFill/>
+        </p:spPr>
+        <p:txBody>
+          <a:bodyPr wrap="square" rtlCol="0">
+            <a:spAutoFit/>
+          </a:bodyPr>
+          <a:lstStyle/>
+          <a:p>
+            <a:pPr marL="457200" indent="-457200">
+              <a:buFont typeface="+mj-lt"/>
+              <a:buAutoNum type="arabicPeriod"/>
+            </a:pPr>
+            <a:r>
+              <a:rPr lang="en-GB" sz="2000" b="1" dirty="0"/>
+              <a:t>Logistic Regression:</a:t>
+            </a:r>
+            <a:br>
+              <a:rPr lang="en-GB" sz="2000" b="1" dirty="0"/>
+            </a:br>
+            <a:r>
+              <a:rPr lang="en-GB" dirty="0"/>
+              <a:t>F1: 51-60, Precision: 43-49%, Recall: 62-76%</a:t>
+            </a:r>
+          </a:p>
+          <a:p>
+            <a:pPr marL="457200" indent="-457200">
+              <a:buFont typeface="+mj-lt"/>
+              <a:buAutoNum type="arabicPeriod"/>
+            </a:pPr>
+            <a:endParaRPr lang="en-GB" dirty="0"/>
+          </a:p>
+          <a:p>
+            <a:pPr marL="457200" indent="-457200">
+              <a:buFont typeface="+mj-lt"/>
+              <a:buAutoNum type="arabicPeriod"/>
+            </a:pPr>
+            <a:r>
+              <a:rPr lang="en-GB" sz="2000" b="1" dirty="0"/>
+              <a:t>Random Forest:</a:t>
+            </a:r>
+            <a:br>
+              <a:rPr lang="en-GB" sz="2000" b="1" dirty="0"/>
+            </a:br>
+            <a:r>
+              <a:rPr lang="en-GB" dirty="0"/>
+              <a:t>F1: 50-60, Precision: 43-47%, Recall: 60-82%</a:t>
+            </a:r>
+          </a:p>
+          <a:p>
+            <a:pPr marL="457200" indent="-457200">
+              <a:buFont typeface="+mj-lt"/>
+              <a:buAutoNum type="arabicPeriod"/>
+            </a:pPr>
+            <a:endParaRPr lang="en-GB" dirty="0"/>
+          </a:p>
+          <a:p>
+            <a:pPr marL="457200" indent="-457200">
+              <a:buFont typeface="+mj-lt"/>
+              <a:buAutoNum type="arabicPeriod"/>
+            </a:pPr>
+            <a:r>
+              <a:rPr lang="en-GB" sz="2000" b="1" dirty="0"/>
+              <a:t>SVM RBF:</a:t>
+            </a:r>
+            <a:br>
+              <a:rPr lang="en-GB" sz="2000" dirty="0"/>
+            </a:br>
+            <a:r>
+              <a:rPr lang="en-GB" dirty="0"/>
+              <a:t>F1: 48-57, Precision: 46-48%, Recall: 51-70%</a:t>
+            </a:r>
+          </a:p>
+          <a:p>
+            <a:pPr marL="457200" indent="-457200">
+              <a:buFont typeface="+mj-lt"/>
+              <a:buAutoNum type="arabicPeriod"/>
+            </a:pPr>
+            <a:endParaRPr lang="en-GB" dirty="0"/>
+          </a:p>
+          <a:p>
+            <a:pPr marL="457200" indent="-457200">
+              <a:buFont typeface="+mj-lt"/>
+              <a:buAutoNum type="arabicPeriod"/>
+            </a:pPr>
+            <a:r>
+              <a:rPr lang="en-GB" sz="2000" b="1" dirty="0"/>
+              <a:t>MLP Classifier:</a:t>
+            </a:r>
+            <a:br>
+              <a:rPr lang="en-GB" sz="2000" b="1" dirty="0"/>
+            </a:br>
+            <a:r>
+              <a:rPr lang="en-GB" dirty="0"/>
+              <a:t>F1: 38-47, Precision: 43-51%, Recall: 34-43%</a:t>
+            </a:r>
+            <a:endParaRPr lang="en-GB" sz="2000" dirty="0"/>
+          </a:p>
+        </p:txBody>
+      </p:sp>
+    </p:spTree>
+    <p:extLst>
+      <p:ext uri="{BB962C8B-B14F-4D97-AF65-F5344CB8AC3E}">
+        <p14:creationId xmlns:p14="http://schemas.microsoft.com/office/powerpoint/2010/main" val="1035516000"/>
+      </p:ext>
+    </p:extLst>
+  </p:cSld>
+  <p:clrMapOvr>
+    <a:masterClrMapping/>
+  </p:clrMapOvr>
+</p:sld>
+</file>
+
+<file path=ppt/slides/slide16.xml><?xml version="1.0" encoding="utf-8"?>
+<p:sld xmlns:a="http://schemas.openxmlformats.org/drawingml/2006/main" xmlns:r="http://schemas.openxmlformats.org/officeDocument/2006/relationships" xmlns:p="http://schemas.openxmlformats.org/presentationml/2006/main">
+  <p:cSld>
+    <p:spTree>
+      <p:nvGrpSpPr>
+        <p:cNvPr id="1" name="">
+          <a:extLst>
+            <a:ext uri="{FF2B5EF4-FFF2-40B4-BE49-F238E27FC236}">
+              <a16:creationId xmlns:a16="http://schemas.microsoft.com/office/drawing/2014/main" id="{5914510C-2000-9A24-FF87-D8DBA9DCDF79}"/>
+            </a:ext>
+          </a:extLst>
+        </p:cNvPr>
+        <p:cNvGrpSpPr/>
+        <p:nvPr/>
+      </p:nvGrpSpPr>
+      <p:grpSpPr>
+        <a:xfrm>
+          <a:off x="0" y="0"/>
+          <a:ext cx="0" cy="0"/>
+          <a:chOff x="0" y="0"/>
+          <a:chExt cx="0" cy="0"/>
+        </a:xfrm>
+      </p:grpSpPr>
+      <p:sp>
+        <p:nvSpPr>
+          <p:cNvPr id="2" name="Title 1">
+            <a:extLst>
+              <a:ext uri="{FF2B5EF4-FFF2-40B4-BE49-F238E27FC236}">
+                <a16:creationId xmlns:a16="http://schemas.microsoft.com/office/drawing/2014/main" id="{BB050513-C936-C2FB-353D-151C9D82B5FC}"/>
+              </a:ext>
+            </a:extLst>
+          </p:cNvPr>
+          <p:cNvSpPr>
+            <a:spLocks noGrp="1"/>
+          </p:cNvSpPr>
+          <p:nvPr>
+            <p:ph type="title"/>
+          </p:nvPr>
+        </p:nvSpPr>
+        <p:spPr>
+          <a:xfrm>
+            <a:off x="185530" y="1111885"/>
+            <a:ext cx="11168270" cy="831215"/>
+          </a:xfrm>
+        </p:spPr>
+        <p:txBody>
+          <a:bodyPr>
+            <a:normAutofit/>
+          </a:bodyPr>
+          <a:lstStyle/>
+          <a:p>
+            <a:r>
+              <a:rPr lang="en-GB" sz="4000" b="1" dirty="0"/>
+              <a:t>Model Evaluation Metrics – SHAP</a:t>
+            </a:r>
+          </a:p>
+        </p:txBody>
+      </p:sp>
+      <p:sp>
+        <p:nvSpPr>
+          <p:cNvPr id="4" name="Slide Number Placeholder 3">
+            <a:extLst>
+              <a:ext uri="{FF2B5EF4-FFF2-40B4-BE49-F238E27FC236}">
+                <a16:creationId xmlns:a16="http://schemas.microsoft.com/office/drawing/2014/main" id="{84811688-F416-A8FC-290E-4A56426BA8F1}"/>
+              </a:ext>
+            </a:extLst>
+          </p:cNvPr>
+          <p:cNvSpPr>
+            <a:spLocks noGrp="1"/>
+          </p:cNvSpPr>
+          <p:nvPr>
+            <p:ph type="sldNum" sz="quarter" idx="12"/>
+          </p:nvPr>
+        </p:nvSpPr>
+        <p:spPr/>
+        <p:txBody>
+          <a:bodyPr/>
+          <a:lstStyle/>
+          <a:p>
+            <a:fld id="{ECF88CA5-FB5C-4C9F-81AA-71804F63A16C}" type="slidenum">
+              <a:rPr lang="en-US" smtClean="0"/>
+              <a:t>16</a:t>
+            </a:fld>
+            <a:endParaRPr lang="en-US"/>
+          </a:p>
+        </p:txBody>
+      </p:sp>
+      <p:sp>
+        <p:nvSpPr>
+          <p:cNvPr id="14" name="TextBox 13">
+            <a:extLst>
+              <a:ext uri="{FF2B5EF4-FFF2-40B4-BE49-F238E27FC236}">
+                <a16:creationId xmlns:a16="http://schemas.microsoft.com/office/drawing/2014/main" id="{EA02883C-B8D5-A904-B212-01410129DDCA}"/>
+              </a:ext>
+            </a:extLst>
+          </p:cNvPr>
+          <p:cNvSpPr txBox="1"/>
+          <p:nvPr/>
+        </p:nvSpPr>
+        <p:spPr>
+          <a:xfrm>
+            <a:off x="487680" y="1943100"/>
+            <a:ext cx="10866120" cy="3477875"/>
+          </a:xfrm>
+          <a:prstGeom prst="rect">
+            <a:avLst/>
+          </a:prstGeom>
+          <a:noFill/>
+        </p:spPr>
+        <p:txBody>
+          <a:bodyPr wrap="square" rtlCol="0">
+            <a:spAutoFit/>
+          </a:bodyPr>
+          <a:lstStyle/>
+          <a:p>
+            <a:r>
+              <a:rPr lang="en-US" sz="2000" dirty="0"/>
+              <a:t>A SHAP (</a:t>
+            </a:r>
+            <a:r>
+              <a:rPr lang="en-US" sz="2000" dirty="0" err="1"/>
+              <a:t>SHapley</a:t>
+            </a:r>
+            <a:r>
+              <a:rPr lang="en-US" sz="2000" dirty="0"/>
+              <a:t> Additive </a:t>
+            </a:r>
+            <a:r>
+              <a:rPr lang="en-US" sz="2000" dirty="0" err="1"/>
+              <a:t>exPlanations</a:t>
+            </a:r>
+            <a:r>
+              <a:rPr lang="en-US" sz="2000" dirty="0"/>
+              <a:t>) analysis was conducted on the Early and Midpoint phases for each model. The top 4 most influential features in each model are </a:t>
+            </a:r>
+            <a:r>
+              <a:rPr lang="en-US" sz="2000" dirty="0" err="1"/>
+              <a:t>summarised</a:t>
+            </a:r>
+            <a:r>
+              <a:rPr lang="en-US" sz="2000" dirty="0"/>
+              <a:t> as follows:</a:t>
+            </a:r>
+          </a:p>
+          <a:p>
+            <a:pPr marL="230400" indent="-230400">
+              <a:buFont typeface="Arial" panose="020B0604020202020204" pitchFamily="34" charset="0"/>
+              <a:buChar char="•"/>
+            </a:pPr>
+            <a:endParaRPr lang="en-US" sz="2000" dirty="0"/>
+          </a:p>
+          <a:p>
+            <a:pPr marL="230400" indent="-230400">
+              <a:buFont typeface="Arial" panose="020B0604020202020204" pitchFamily="34" charset="0"/>
+              <a:buChar char="•"/>
+            </a:pPr>
+            <a:r>
+              <a:rPr lang="en-US" sz="2000" b="1" dirty="0"/>
+              <a:t>Logistic Regression:</a:t>
+            </a:r>
+            <a:r>
+              <a:rPr lang="en-US" sz="2000" dirty="0"/>
+              <a:t> Weighted score, fail rate, GGG code module and studied credits.</a:t>
+            </a:r>
+          </a:p>
+          <a:p>
+            <a:pPr marL="230400" indent="-230400">
+              <a:buFont typeface="Arial" panose="020B0604020202020204" pitchFamily="34" charset="0"/>
+              <a:buChar char="•"/>
+            </a:pPr>
+            <a:r>
+              <a:rPr lang="en-US" sz="2000" b="1" dirty="0"/>
+              <a:t>SVM RBF</a:t>
+            </a:r>
+            <a:r>
+              <a:rPr lang="en-US" sz="2000" dirty="0"/>
+              <a:t>: Fail rate, weighted score, studied credits and date registration.</a:t>
+            </a:r>
+          </a:p>
+          <a:p>
+            <a:pPr marL="230400" indent="-230400">
+              <a:buFont typeface="Arial" panose="020B0604020202020204" pitchFamily="34" charset="0"/>
+              <a:buChar char="•"/>
+            </a:pPr>
+            <a:r>
+              <a:rPr lang="en-US" sz="2000" b="1" dirty="0"/>
+              <a:t>MLP Classifier</a:t>
+            </a:r>
+            <a:r>
+              <a:rPr lang="en-US" sz="2000" dirty="0"/>
+              <a:t>: Weighted score, late rate, fail rate and days active.</a:t>
+            </a:r>
+          </a:p>
+          <a:p>
+            <a:pPr marL="230400" indent="-230400">
+              <a:buFont typeface="Arial" panose="020B0604020202020204" pitchFamily="34" charset="0"/>
+              <a:buChar char="•"/>
+            </a:pPr>
+            <a:r>
+              <a:rPr lang="en-US" sz="2000" b="1" dirty="0"/>
+              <a:t>Random Forest:</a:t>
+            </a:r>
+            <a:r>
+              <a:rPr lang="en-US" sz="2000" dirty="0"/>
+              <a:t> Weighted score, fail rate, late rate and GGG code module.</a:t>
+            </a:r>
+          </a:p>
+          <a:p>
+            <a:pPr marL="230400" indent="-230400">
+              <a:buFont typeface="Arial" panose="020B0604020202020204" pitchFamily="34" charset="0"/>
+              <a:buChar char="•"/>
+            </a:pPr>
+            <a:endParaRPr lang="en-US" sz="2000" dirty="0"/>
+          </a:p>
+          <a:p>
+            <a:r>
+              <a:rPr lang="en-US" sz="2000" dirty="0"/>
+              <a:t>Common across models are the weighted score, fail/late rates, studied credits and days active. Demographic features (age band, gender, disability, etc.) have a low influence in all models.</a:t>
+            </a:r>
+            <a:endParaRPr lang="en-GB" sz="2000" dirty="0"/>
+          </a:p>
+        </p:txBody>
+      </p:sp>
+    </p:spTree>
+    <p:extLst>
+      <p:ext uri="{BB962C8B-B14F-4D97-AF65-F5344CB8AC3E}">
+        <p14:creationId xmlns:p14="http://schemas.microsoft.com/office/powerpoint/2010/main" val="2074208732"/>
+      </p:ext>
+    </p:extLst>
+  </p:cSld>
+  <p:clrMapOvr>
+    <a:masterClrMapping/>
+  </p:clrMapOvr>
+</p:sld>
+</file>
+
+<file path=ppt/slides/slide17.xml><?xml version="1.0" encoding="utf-8"?>
+<p:sld xmlns:a="http://schemas.openxmlformats.org/drawingml/2006/main" xmlns:r="http://schemas.openxmlformats.org/officeDocument/2006/relationships" xmlns:p="http://schemas.openxmlformats.org/presentationml/2006/main">
+  <p:cSld>
+    <p:spTree>
+      <p:nvGrpSpPr>
+        <p:cNvPr id="1" name="">
+          <a:extLst>
+            <a:ext uri="{FF2B5EF4-FFF2-40B4-BE49-F238E27FC236}">
+              <a16:creationId xmlns:a16="http://schemas.microsoft.com/office/drawing/2014/main" id="{EE356E44-2383-8630-ECCE-7750D7A8EB38}"/>
+            </a:ext>
+          </a:extLst>
+        </p:cNvPr>
+        <p:cNvGrpSpPr/>
+        <p:nvPr/>
+      </p:nvGrpSpPr>
+      <p:grpSpPr>
+        <a:xfrm>
+          <a:off x="0" y="0"/>
+          <a:ext cx="0" cy="0"/>
+          <a:chOff x="0" y="0"/>
+          <a:chExt cx="0" cy="0"/>
+        </a:xfrm>
+      </p:grpSpPr>
+      <p:sp>
+        <p:nvSpPr>
+          <p:cNvPr id="2" name="Title 1">
+            <a:extLst>
+              <a:ext uri="{FF2B5EF4-FFF2-40B4-BE49-F238E27FC236}">
+                <a16:creationId xmlns:a16="http://schemas.microsoft.com/office/drawing/2014/main" id="{0EC9C6E2-E6DA-A0B1-E60A-0E0C2ABA3AB7}"/>
+              </a:ext>
+            </a:extLst>
+          </p:cNvPr>
+          <p:cNvSpPr>
+            <a:spLocks noGrp="1"/>
+          </p:cNvSpPr>
+          <p:nvPr>
+            <p:ph type="title"/>
+          </p:nvPr>
+        </p:nvSpPr>
+        <p:spPr>
+          <a:xfrm>
+            <a:off x="0" y="1130969"/>
+            <a:ext cx="12192000" cy="4704348"/>
+          </a:xfrm>
+        </p:spPr>
+        <p:txBody>
+          <a:bodyPr/>
+          <a:lstStyle/>
+          <a:p>
+            <a:pPr algn="ctr"/>
+            <a:r>
+              <a:rPr lang="en-GB" b="1" dirty="0"/>
+              <a:t>Project Limitations</a:t>
+            </a:r>
+          </a:p>
+        </p:txBody>
+      </p:sp>
+      <p:sp>
+        <p:nvSpPr>
+          <p:cNvPr id="4" name="Slide Number Placeholder 3">
+            <a:extLst>
+              <a:ext uri="{FF2B5EF4-FFF2-40B4-BE49-F238E27FC236}">
+                <a16:creationId xmlns:a16="http://schemas.microsoft.com/office/drawing/2014/main" id="{ABF11565-A223-3908-DEAA-E9C427950DD1}"/>
+              </a:ext>
+            </a:extLst>
+          </p:cNvPr>
+          <p:cNvSpPr>
+            <a:spLocks noGrp="1"/>
+          </p:cNvSpPr>
+          <p:nvPr>
+            <p:ph type="sldNum" sz="quarter" idx="12"/>
+          </p:nvPr>
+        </p:nvSpPr>
+        <p:spPr/>
+        <p:txBody>
+          <a:bodyPr/>
+          <a:lstStyle/>
+          <a:p>
+            <a:fld id="{ECF88CA5-FB5C-4C9F-81AA-71804F63A16C}" type="slidenum">
+              <a:rPr lang="en-US" smtClean="0"/>
+              <a:t>17</a:t>
+            </a:fld>
+            <a:endParaRPr lang="en-US"/>
+          </a:p>
+        </p:txBody>
+      </p:sp>
+    </p:spTree>
+    <p:extLst>
+      <p:ext uri="{BB962C8B-B14F-4D97-AF65-F5344CB8AC3E}">
+        <p14:creationId xmlns:p14="http://schemas.microsoft.com/office/powerpoint/2010/main" val="1149168141"/>
+      </p:ext>
+    </p:extLst>
+  </p:cSld>
+  <p:clrMapOvr>
+    <a:masterClrMapping/>
+  </p:clrMapOvr>
+</p:sld>
+</file>
+
+<file path=ppt/slides/slide18.xml><?xml version="1.0" encoding="utf-8"?>
 <p:sld xmlns:a="http://schemas.openxmlformats.org/drawingml/2006/main" xmlns:r="http://schemas.openxmlformats.org/officeDocument/2006/relationships" xmlns:p="http://schemas.openxmlformats.org/presentationml/2006/main">
   <p:cSld>
     <p:spTree>
@@ -4628,7 +5825,13 @@
       </p:grpSpPr>
       <p:sp>
         <p:nvSpPr>
-          <p:cNvPr id="2" name="Title 1"/>
+          <p:cNvPr id="2" name="Title 1">
+            <a:extLst>
+              <a:ext uri="{FF2B5EF4-FFF2-40B4-BE49-F238E27FC236}">
+                <a16:creationId xmlns:a16="http://schemas.microsoft.com/office/drawing/2014/main" id="{E7CEE577-B605-B897-045E-6E45FD6C3025}"/>
+              </a:ext>
+            </a:extLst>
+          </p:cNvPr>
           <p:cNvSpPr>
             <a:spLocks noGrp="1"/>
           </p:cNvSpPr>
@@ -4638,25 +5841,89 @@
         </p:nvSpPr>
         <p:spPr>
           <a:xfrm>
-            <a:off x="-1" y="2766218"/>
-            <a:ext cx="12192001" cy="1325563"/>
+            <a:off x="838200" y="1214754"/>
+            <a:ext cx="10515600" cy="713105"/>
           </a:xfrm>
         </p:spPr>
         <p:txBody>
-          <a:bodyPr/>
-          <a:lstStyle/>
-          <a:p>
-            <a:pPr algn="ctr"/>
-            <a:r>
-              <a:rPr lang="en-US" b="1" dirty="0"/>
-              <a:t>Q&amp;A</a:t>
-            </a:r>
-          </a:p>
-        </p:txBody>
-      </p:sp>
-      <p:sp>
-        <p:nvSpPr>
-          <p:cNvPr id="4" name="Slide Number Placeholder 3"/>
+          <a:bodyPr>
+            <a:normAutofit/>
+          </a:bodyPr>
+          <a:lstStyle/>
+          <a:p>
+            <a:r>
+              <a:rPr lang="en-GB" sz="4000" b="1" dirty="0"/>
+              <a:t>Limitations</a:t>
+            </a:r>
+            <a:endParaRPr lang="en-GB" b="1" dirty="0"/>
+          </a:p>
+        </p:txBody>
+      </p:sp>
+      <p:sp>
+        <p:nvSpPr>
+          <p:cNvPr id="3" name="Content Placeholder 2">
+            <a:extLst>
+              <a:ext uri="{FF2B5EF4-FFF2-40B4-BE49-F238E27FC236}">
+                <a16:creationId xmlns:a16="http://schemas.microsoft.com/office/drawing/2014/main" id="{7D88ADD5-EE13-B17E-B6D6-48F44DA9CAC9}"/>
+              </a:ext>
+            </a:extLst>
+          </p:cNvPr>
+          <p:cNvSpPr>
+            <a:spLocks noGrp="1"/>
+          </p:cNvSpPr>
+          <p:nvPr>
+            <p:ph idx="1"/>
+          </p:nvPr>
+        </p:nvSpPr>
+        <p:spPr>
+          <a:xfrm>
+            <a:off x="838200" y="1935478"/>
+            <a:ext cx="10515600" cy="3851711"/>
+          </a:xfrm>
+        </p:spPr>
+        <p:txBody>
+          <a:bodyPr>
+            <a:normAutofit fontScale="92500" lnSpcReduction="10000"/>
+          </a:bodyPr>
+          <a:lstStyle/>
+          <a:p>
+            <a:r>
+              <a:rPr lang="en-US" dirty="0"/>
+              <a:t>The OULA dataset has significant gaps, lacking key information such as exam data, seminar participation, attendance, financial data (scholarships, bursary support, loans), </a:t>
+            </a:r>
+            <a:r>
+              <a:rPr lang="en-US" dirty="0" err="1"/>
+              <a:t>behavioural</a:t>
+            </a:r>
+            <a:r>
+              <a:rPr lang="en-US" dirty="0"/>
+              <a:t> records (suspensions), and health-related leaves.</a:t>
+            </a:r>
+          </a:p>
+          <a:p>
+            <a:r>
+              <a:rPr lang="en-US" dirty="0"/>
+              <a:t>The dataset is imbalanced, with an 80–20 non-dropout and dropout ratio, alongside further imbalances across features like module code, presentation, region, age band, and education level.</a:t>
+            </a:r>
+          </a:p>
+          <a:p>
+            <a:r>
+              <a:rPr lang="en-US" dirty="0"/>
+              <a:t>Modelling posed challenges for SVMs and MLPs due to the high computational cost of hyperparameter tuning and SHAP analysis, which restricted the search space and increased processing times.</a:t>
+            </a:r>
+            <a:endParaRPr lang="en-GB" dirty="0"/>
+          </a:p>
+        </p:txBody>
+      </p:sp>
+      <p:sp>
+        <p:nvSpPr>
+          <p:cNvPr id="4" name="Slide Number Placeholder 3">
+            <a:extLst>
+              <a:ext uri="{FF2B5EF4-FFF2-40B4-BE49-F238E27FC236}">
+                <a16:creationId xmlns:a16="http://schemas.microsoft.com/office/drawing/2014/main" id="{FC0A0B74-2926-8942-2295-2998C326C017}"/>
+              </a:ext>
+            </a:extLst>
+          </p:cNvPr>
           <p:cNvSpPr>
             <a:spLocks noGrp="1"/>
           </p:cNvSpPr>
@@ -4671,13 +5938,117 @@
           <a:p>
             <a:fld id="{ECF88CA5-FB5C-4C9F-81AA-71804F63A16C}" type="slidenum">
               <a:rPr lang="en-US" smtClean="0"/>
-              <a:t>13</a:t>
+              <a:t>18</a:t>
             </a:fld>
             <a:endParaRPr lang="en-US"/>
           </a:p>
         </p:txBody>
       </p:sp>
     </p:spTree>
+    <p:extLst>
+      <p:ext uri="{BB962C8B-B14F-4D97-AF65-F5344CB8AC3E}">
+        <p14:creationId xmlns:p14="http://schemas.microsoft.com/office/powerpoint/2010/main" val="1658314820"/>
+      </p:ext>
+    </p:extLst>
+  </p:cSld>
+  <p:clrMapOvr>
+    <a:masterClrMapping/>
+  </p:clrMapOvr>
+</p:sld>
+</file>
+
+<file path=ppt/slides/slide19.xml><?xml version="1.0" encoding="utf-8"?>
+<p:sld xmlns:a="http://schemas.openxmlformats.org/drawingml/2006/main" xmlns:r="http://schemas.openxmlformats.org/officeDocument/2006/relationships" xmlns:p="http://schemas.openxmlformats.org/presentationml/2006/main">
+  <p:cSld>
+    <p:spTree>
+      <p:nvGrpSpPr>
+        <p:cNvPr id="1" name="">
+          <a:extLst>
+            <a:ext uri="{FF2B5EF4-FFF2-40B4-BE49-F238E27FC236}">
+              <a16:creationId xmlns:a16="http://schemas.microsoft.com/office/drawing/2014/main" id="{7F1577C4-FE0C-AF40-F1CE-E1D96CA70CDE}"/>
+            </a:ext>
+          </a:extLst>
+        </p:cNvPr>
+        <p:cNvGrpSpPr/>
+        <p:nvPr/>
+      </p:nvGrpSpPr>
+      <p:grpSpPr>
+        <a:xfrm>
+          <a:off x="0" y="0"/>
+          <a:ext cx="0" cy="0"/>
+          <a:chOff x="0" y="0"/>
+          <a:chExt cx="0" cy="0"/>
+        </a:xfrm>
+      </p:grpSpPr>
+      <p:sp>
+        <p:nvSpPr>
+          <p:cNvPr id="2" name="Title 1">
+            <a:extLst>
+              <a:ext uri="{FF2B5EF4-FFF2-40B4-BE49-F238E27FC236}">
+                <a16:creationId xmlns:a16="http://schemas.microsoft.com/office/drawing/2014/main" id="{DCFDF1DE-EEA3-4E98-E355-C92C20175BA8}"/>
+              </a:ext>
+            </a:extLst>
+          </p:cNvPr>
+          <p:cNvSpPr>
+            <a:spLocks noGrp="1"/>
+          </p:cNvSpPr>
+          <p:nvPr>
+            <p:ph type="title"/>
+          </p:nvPr>
+        </p:nvSpPr>
+        <p:spPr>
+          <a:xfrm>
+            <a:off x="0" y="1130969"/>
+            <a:ext cx="12192000" cy="4704348"/>
+          </a:xfrm>
+        </p:spPr>
+        <p:txBody>
+          <a:bodyPr/>
+          <a:lstStyle/>
+          <a:p>
+            <a:pPr algn="ctr"/>
+            <a:r>
+              <a:rPr lang="en-GB" b="1" dirty="0"/>
+              <a:t>Future Works</a:t>
+            </a:r>
+          </a:p>
+        </p:txBody>
+      </p:sp>
+      <p:sp>
+        <p:nvSpPr>
+          <p:cNvPr id="4" name="Slide Number Placeholder 3">
+            <a:extLst>
+              <a:ext uri="{FF2B5EF4-FFF2-40B4-BE49-F238E27FC236}">
+                <a16:creationId xmlns:a16="http://schemas.microsoft.com/office/drawing/2014/main" id="{13469194-3598-CC6B-3053-FB4601304151}"/>
+              </a:ext>
+            </a:extLst>
+          </p:cNvPr>
+          <p:cNvSpPr>
+            <a:spLocks noGrp="1"/>
+          </p:cNvSpPr>
+          <p:nvPr>
+            <p:ph type="sldNum" sz="quarter" idx="12"/>
+          </p:nvPr>
+        </p:nvSpPr>
+        <p:spPr/>
+        <p:txBody>
+          <a:bodyPr/>
+          <a:lstStyle/>
+          <a:p>
+            <a:fld id="{ECF88CA5-FB5C-4C9F-81AA-71804F63A16C}" type="slidenum">
+              <a:rPr lang="en-US" smtClean="0"/>
+              <a:t>19</a:t>
+            </a:fld>
+            <a:endParaRPr lang="en-US"/>
+          </a:p>
+        </p:txBody>
+      </p:sp>
+    </p:spTree>
+    <p:extLst>
+      <p:ext uri="{BB962C8B-B14F-4D97-AF65-F5344CB8AC3E}">
+        <p14:creationId xmlns:p14="http://schemas.microsoft.com/office/powerpoint/2010/main" val="12380241"/>
+      </p:ext>
+    </p:extLst>
   </p:cSld>
   <p:clrMapOvr>
     <a:masterClrMapping/>
@@ -4721,12 +6092,12 @@
         <p:spPr>
           <a:xfrm>
             <a:off x="248729" y="1304027"/>
-            <a:ext cx="11943271" cy="3965805"/>
+            <a:ext cx="11943271" cy="4367903"/>
           </a:xfrm>
         </p:spPr>
         <p:txBody>
           <a:bodyPr vert="horz" lIns="91440" tIns="45720" rIns="91440" bIns="45720" rtlCol="0" anchor="t">
-            <a:normAutofit/>
+            <a:normAutofit fontScale="92500"/>
           </a:bodyPr>
           <a:lstStyle/>
           <a:p>
@@ -4756,13 +6127,19 @@
           <a:p>
             <a:r>
               <a:rPr lang="en-US" dirty="0"/>
-              <a:t>The main objective is to predict student dropout in higher education through machine learning, with the aim of enabling early interventions and improving student retention. </a:t>
+              <a:t>The main objective is to predict student dropout in higher education through machine learning (ML), with the aim of enabling early interventions and improving student retention. </a:t>
             </a:r>
           </a:p>
           <a:p>
             <a:r>
               <a:rPr lang="en-US" dirty="0"/>
               <a:t>This will be formulated as a binary classification task, where the model predicts whether a student is likely to dropout or continue (including failures), ideally making this prediction by the midpoint of the module or earlier.</a:t>
+            </a:r>
+          </a:p>
+          <a:p>
+            <a:r>
+              <a:rPr lang="en-US" dirty="0"/>
+              <a:t>Four ML models were chosen for the student dropout prediction task: Logistic Regression (LR), Support Vector Machine (SVM) RBF Kernel, Multilayer Perceptron (MLP) and Random Forest (RF). </a:t>
             </a:r>
           </a:p>
         </p:txBody>
@@ -4809,7 +6186,504 @@
 </p:sld>
 </file>
 
-<file path=ppt/slides/slide3.xml><?xml version="1.0" encoding="utf-8"?>
+<file path=ppt/slides/slide20.xml><?xml version="1.0" encoding="utf-8"?>
+<p:sld xmlns:a="http://schemas.openxmlformats.org/drawingml/2006/main" xmlns:r="http://schemas.openxmlformats.org/officeDocument/2006/relationships" xmlns:p="http://schemas.openxmlformats.org/presentationml/2006/main">
+  <p:cSld>
+    <p:spTree>
+      <p:nvGrpSpPr>
+        <p:cNvPr id="1" name="">
+          <a:extLst>
+            <a:ext uri="{FF2B5EF4-FFF2-40B4-BE49-F238E27FC236}">
+              <a16:creationId xmlns:a16="http://schemas.microsoft.com/office/drawing/2014/main" id="{5CC977FF-CAA1-16FC-C90E-EF2C9D13E656}"/>
+            </a:ext>
+          </a:extLst>
+        </p:cNvPr>
+        <p:cNvGrpSpPr/>
+        <p:nvPr/>
+      </p:nvGrpSpPr>
+      <p:grpSpPr>
+        <a:xfrm>
+          <a:off x="0" y="0"/>
+          <a:ext cx="0" cy="0"/>
+          <a:chOff x="0" y="0"/>
+          <a:chExt cx="0" cy="0"/>
+        </a:xfrm>
+      </p:grpSpPr>
+      <p:sp>
+        <p:nvSpPr>
+          <p:cNvPr id="2" name="Title 1">
+            <a:extLst>
+              <a:ext uri="{FF2B5EF4-FFF2-40B4-BE49-F238E27FC236}">
+                <a16:creationId xmlns:a16="http://schemas.microsoft.com/office/drawing/2014/main" id="{8C8C4C86-D4B9-D4F7-E371-03CC508AC5B2}"/>
+              </a:ext>
+            </a:extLst>
+          </p:cNvPr>
+          <p:cNvSpPr>
+            <a:spLocks noGrp="1"/>
+          </p:cNvSpPr>
+          <p:nvPr>
+            <p:ph type="title"/>
+          </p:nvPr>
+        </p:nvSpPr>
+        <p:spPr>
+          <a:xfrm>
+            <a:off x="276726" y="1214754"/>
+            <a:ext cx="11077074" cy="713105"/>
+          </a:xfrm>
+        </p:spPr>
+        <p:txBody>
+          <a:bodyPr>
+            <a:normAutofit/>
+          </a:bodyPr>
+          <a:lstStyle/>
+          <a:p>
+            <a:r>
+              <a:rPr lang="en-GB" sz="4000" b="1" dirty="0"/>
+              <a:t>Further Work</a:t>
+            </a:r>
+            <a:endParaRPr lang="en-GB" b="1" dirty="0"/>
+          </a:p>
+        </p:txBody>
+      </p:sp>
+      <p:sp>
+        <p:nvSpPr>
+          <p:cNvPr id="3" name="Content Placeholder 2">
+            <a:extLst>
+              <a:ext uri="{FF2B5EF4-FFF2-40B4-BE49-F238E27FC236}">
+                <a16:creationId xmlns:a16="http://schemas.microsoft.com/office/drawing/2014/main" id="{5B7403BE-DBED-55D8-5244-6AE355977BC3}"/>
+              </a:ext>
+            </a:extLst>
+          </p:cNvPr>
+          <p:cNvSpPr>
+            <a:spLocks noGrp="1"/>
+          </p:cNvSpPr>
+          <p:nvPr>
+            <p:ph idx="1"/>
+          </p:nvPr>
+        </p:nvSpPr>
+        <p:spPr>
+          <a:xfrm>
+            <a:off x="276726" y="1935478"/>
+            <a:ext cx="11077074" cy="3863743"/>
+          </a:xfrm>
+        </p:spPr>
+        <p:txBody>
+          <a:bodyPr>
+            <a:normAutofit/>
+          </a:bodyPr>
+          <a:lstStyle/>
+          <a:p>
+            <a:r>
+              <a:rPr lang="en-US" dirty="0"/>
+              <a:t>Broaden coverage by incorporating data from multiple institutions and online learning platforms to strengthen </a:t>
+            </a:r>
+            <a:r>
+              <a:rPr lang="en-US" dirty="0" err="1"/>
+              <a:t>generalisability</a:t>
+            </a:r>
+            <a:r>
+              <a:rPr lang="en-US" dirty="0"/>
+              <a:t>.</a:t>
+            </a:r>
+          </a:p>
+          <a:p>
+            <a:r>
+              <a:rPr lang="en-US" dirty="0"/>
+              <a:t>For class imbalance, use techniques such as SMOTE </a:t>
+            </a:r>
+            <a:r>
+              <a:rPr lang="en-GB" dirty="0"/>
+              <a:t>(synthetic oversampling) </a:t>
+            </a:r>
+            <a:r>
+              <a:rPr lang="en-US" dirty="0"/>
+              <a:t>or class-weight adjustments to address imbalances in dropout rates and underrepresented demographic/module categories.</a:t>
+            </a:r>
+          </a:p>
+          <a:p>
+            <a:r>
+              <a:rPr lang="en-US" dirty="0"/>
+              <a:t>Develop an application that leverages the best-performing ML model, refined through further tuning and enhanced OULA data, to predict student outcomes in real-time.</a:t>
+            </a:r>
+            <a:endParaRPr lang="en-GB" dirty="0"/>
+          </a:p>
+        </p:txBody>
+      </p:sp>
+      <p:sp>
+        <p:nvSpPr>
+          <p:cNvPr id="4" name="Slide Number Placeholder 3">
+            <a:extLst>
+              <a:ext uri="{FF2B5EF4-FFF2-40B4-BE49-F238E27FC236}">
+                <a16:creationId xmlns:a16="http://schemas.microsoft.com/office/drawing/2014/main" id="{73C276F5-58CE-EAF8-621D-8E89096AD4B6}"/>
+              </a:ext>
+            </a:extLst>
+          </p:cNvPr>
+          <p:cNvSpPr>
+            <a:spLocks noGrp="1"/>
+          </p:cNvSpPr>
+          <p:nvPr>
+            <p:ph type="sldNum" sz="quarter" idx="12"/>
+          </p:nvPr>
+        </p:nvSpPr>
+        <p:spPr/>
+        <p:txBody>
+          <a:bodyPr/>
+          <a:lstStyle/>
+          <a:p>
+            <a:fld id="{ECF88CA5-FB5C-4C9F-81AA-71804F63A16C}" type="slidenum">
+              <a:rPr lang="en-US" smtClean="0"/>
+              <a:t>20</a:t>
+            </a:fld>
+            <a:endParaRPr lang="en-US"/>
+          </a:p>
+        </p:txBody>
+      </p:sp>
+    </p:spTree>
+    <p:extLst>
+      <p:ext uri="{BB962C8B-B14F-4D97-AF65-F5344CB8AC3E}">
+        <p14:creationId xmlns:p14="http://schemas.microsoft.com/office/powerpoint/2010/main" val="2963995971"/>
+      </p:ext>
+    </p:extLst>
+  </p:cSld>
+  <p:clrMapOvr>
+    <a:masterClrMapping/>
+  </p:clrMapOvr>
+</p:sld>
+</file>
+
+<file path=ppt/slides/slide21.xml><?xml version="1.0" encoding="utf-8"?>
+<p:sld xmlns:a="http://schemas.openxmlformats.org/drawingml/2006/main" xmlns:r="http://schemas.openxmlformats.org/officeDocument/2006/relationships" xmlns:p="http://schemas.openxmlformats.org/presentationml/2006/main">
+  <p:cSld>
+    <p:spTree>
+      <p:nvGrpSpPr>
+        <p:cNvPr id="1" name="">
+          <a:extLst>
+            <a:ext uri="{FF2B5EF4-FFF2-40B4-BE49-F238E27FC236}">
+              <a16:creationId xmlns:a16="http://schemas.microsoft.com/office/drawing/2014/main" id="{F9DCF10B-D4E6-53BD-81F9-D26F11175604}"/>
+            </a:ext>
+          </a:extLst>
+        </p:cNvPr>
+        <p:cNvGrpSpPr/>
+        <p:nvPr/>
+      </p:nvGrpSpPr>
+      <p:grpSpPr>
+        <a:xfrm>
+          <a:off x="0" y="0"/>
+          <a:ext cx="0" cy="0"/>
+          <a:chOff x="0" y="0"/>
+          <a:chExt cx="0" cy="0"/>
+        </a:xfrm>
+      </p:grpSpPr>
+      <p:sp>
+        <p:nvSpPr>
+          <p:cNvPr id="2" name="Title 1">
+            <a:extLst>
+              <a:ext uri="{FF2B5EF4-FFF2-40B4-BE49-F238E27FC236}">
+                <a16:creationId xmlns:a16="http://schemas.microsoft.com/office/drawing/2014/main" id="{FDB5D353-AA06-66B3-6DCF-6AE8D867E3E7}"/>
+              </a:ext>
+            </a:extLst>
+          </p:cNvPr>
+          <p:cNvSpPr>
+            <a:spLocks noGrp="1"/>
+          </p:cNvSpPr>
+          <p:nvPr>
+            <p:ph type="title"/>
+          </p:nvPr>
+        </p:nvSpPr>
+        <p:spPr>
+          <a:xfrm>
+            <a:off x="204537" y="1214754"/>
+            <a:ext cx="11149263" cy="713105"/>
+          </a:xfrm>
+        </p:spPr>
+        <p:txBody>
+          <a:bodyPr>
+            <a:normAutofit/>
+          </a:bodyPr>
+          <a:lstStyle/>
+          <a:p>
+            <a:r>
+              <a:rPr lang="en-GB" sz="4000" b="1" dirty="0"/>
+              <a:t>Reference</a:t>
+            </a:r>
+            <a:endParaRPr lang="en-GB" b="1" dirty="0"/>
+          </a:p>
+        </p:txBody>
+      </p:sp>
+      <p:sp>
+        <p:nvSpPr>
+          <p:cNvPr id="3" name="Content Placeholder 2">
+            <a:extLst>
+              <a:ext uri="{FF2B5EF4-FFF2-40B4-BE49-F238E27FC236}">
+                <a16:creationId xmlns:a16="http://schemas.microsoft.com/office/drawing/2014/main" id="{92BC6208-3CF5-377D-DD93-81EA852DA9A3}"/>
+              </a:ext>
+            </a:extLst>
+          </p:cNvPr>
+          <p:cNvSpPr>
+            <a:spLocks noGrp="1"/>
+          </p:cNvSpPr>
+          <p:nvPr>
+            <p:ph idx="1"/>
+          </p:nvPr>
+        </p:nvSpPr>
+        <p:spPr>
+          <a:xfrm>
+            <a:off x="348916" y="1935478"/>
+            <a:ext cx="11004884" cy="3815617"/>
+          </a:xfrm>
+        </p:spPr>
+        <p:txBody>
+          <a:bodyPr>
+            <a:normAutofit fontScale="62500" lnSpcReduction="20000"/>
+          </a:bodyPr>
+          <a:lstStyle/>
+          <a:p>
+            <a:pPr marL="0" indent="0">
+              <a:buNone/>
+            </a:pPr>
+            <a:r>
+              <a:rPr lang="en-GB" dirty="0"/>
+              <a:t>[1] H. Waheed, S.-U. Hassan, Naif Radi </a:t>
+            </a:r>
+            <a:r>
+              <a:rPr lang="en-GB" dirty="0" err="1"/>
+              <a:t>Aljohani</a:t>
+            </a:r>
+            <a:r>
+              <a:rPr lang="en-GB" dirty="0"/>
+              <a:t>, J. Hardman, Salem </a:t>
+            </a:r>
+            <a:r>
+              <a:rPr lang="en-GB" dirty="0" err="1"/>
+              <a:t>Alelyani</a:t>
+            </a:r>
+            <a:r>
+              <a:rPr lang="en-GB" dirty="0"/>
+              <a:t>, and R. Nawaz, “Predicting academic performance of students from VLE big data using deep learning models,” </a:t>
+            </a:r>
+            <a:r>
+              <a:rPr lang="en-GB" i="1" dirty="0"/>
+              <a:t>Computers in Human Behavior</a:t>
+            </a:r>
+            <a:r>
+              <a:rPr lang="en-GB" dirty="0"/>
+              <a:t>, vol. 104, pp. 106189–106189, Nov. 2019, </a:t>
+            </a:r>
+            <a:r>
+              <a:rPr lang="en-GB" dirty="0" err="1"/>
+              <a:t>doi</a:t>
+            </a:r>
+            <a:r>
+              <a:rPr lang="en-GB" dirty="0"/>
+              <a:t>: </a:t>
+            </a:r>
+            <a:r>
+              <a:rPr lang="en-GB" dirty="0">
+                <a:hlinkClick r:id="rId2"/>
+              </a:rPr>
+              <a:t>https://doi.org/10.1016/j.chb.2019.106189</a:t>
+            </a:r>
+            <a:r>
+              <a:rPr lang="en-GB" dirty="0"/>
+              <a:t>.</a:t>
+            </a:r>
+          </a:p>
+          <a:p>
+            <a:pPr marL="0" indent="0">
+              <a:buNone/>
+            </a:pPr>
+            <a:endParaRPr lang="en-GB" dirty="0"/>
+          </a:p>
+          <a:p>
+            <a:pPr marL="0" indent="0">
+              <a:buNone/>
+            </a:pPr>
+            <a:r>
+              <a:rPr lang="en-US" dirty="0"/>
+              <a:t>[2] M. Adnan </a:t>
+            </a:r>
+            <a:r>
+              <a:rPr lang="en-US" i="1" dirty="0"/>
+              <a:t>et al.</a:t>
+            </a:r>
+            <a:r>
+              <a:rPr lang="en-US" dirty="0"/>
+              <a:t>, “Predicting at-Risk Students at Different Percentages of Course Length for Early Intervention Using Machine Learning Models,” </a:t>
+            </a:r>
+            <a:r>
+              <a:rPr lang="en-US" i="1" dirty="0"/>
+              <a:t>IEEE Access</a:t>
+            </a:r>
+            <a:r>
+              <a:rPr lang="en-US" dirty="0"/>
+              <a:t>, vol. 9, pp. 7519–7539, 2021, </a:t>
+            </a:r>
+            <a:r>
+              <a:rPr lang="en-US" dirty="0" err="1"/>
+              <a:t>doi</a:t>
+            </a:r>
+            <a:r>
+              <a:rPr lang="en-US" dirty="0"/>
+              <a:t>: </a:t>
+            </a:r>
+            <a:r>
+              <a:rPr lang="en-US" dirty="0">
+                <a:hlinkClick r:id="rId3"/>
+              </a:rPr>
+              <a:t>https://doi.org/10.1109/access.2021.3049446</a:t>
+            </a:r>
+            <a:r>
+              <a:rPr lang="en-US" dirty="0"/>
+              <a:t>.</a:t>
+            </a:r>
+          </a:p>
+          <a:p>
+            <a:pPr marL="0" indent="0">
+              <a:buNone/>
+            </a:pPr>
+            <a:endParaRPr lang="en-US" dirty="0"/>
+          </a:p>
+          <a:p>
+            <a:pPr marL="0" indent="0">
+              <a:buNone/>
+            </a:pPr>
+            <a:r>
+              <a:rPr lang="en-US" dirty="0"/>
+              <a:t>[3] J. Bryson, “University dropout rates reach new high, figures suggest,” </a:t>
+            </a:r>
+            <a:r>
+              <a:rPr lang="en-US" i="1" dirty="0"/>
+              <a:t>BBC News</a:t>
+            </a:r>
+            <a:r>
+              <a:rPr lang="en-US" dirty="0"/>
+              <a:t>, Sep. 28, 2023. </a:t>
+            </a:r>
+            <a:r>
+              <a:rPr lang="en-US" dirty="0">
+                <a:hlinkClick r:id="rId4"/>
+              </a:rPr>
+              <a:t>https://www.bbc.co.uk/news/education-66940041</a:t>
+            </a:r>
+            <a:r>
+              <a:rPr lang="en-US" dirty="0"/>
+              <a:t>.</a:t>
+            </a:r>
+          </a:p>
+          <a:p>
+            <a:pPr marL="0" indent="0">
+              <a:buNone/>
+            </a:pPr>
+            <a:endParaRPr lang="en-US" dirty="0"/>
+          </a:p>
+          <a:p>
+            <a:pPr marL="0" indent="0">
+              <a:buNone/>
+            </a:pPr>
+            <a:r>
+              <a:rPr lang="en-US" dirty="0"/>
+              <a:t>[4] G. </a:t>
+            </a:r>
+            <a:r>
+              <a:rPr lang="en-US" dirty="0" err="1"/>
+              <a:t>Crosling</a:t>
+            </a:r>
+            <a:r>
+              <a:rPr lang="en-US" dirty="0"/>
+              <a:t>, M. Heagney, and L. Thomas, “Improving student retention in higher education: Improving teaching and learning,” Australian Universities’ Review, vol. 51, no. 2, pp. 9–18, 2009. [Online]. Available: </a:t>
+            </a:r>
+            <a:r>
+              <a:rPr lang="en-US" dirty="0">
+                <a:hlinkClick r:id="rId5"/>
+              </a:rPr>
+              <a:t>https://files.</a:t>
+            </a:r>
+            <a:r>
+              <a:rPr lang="en-GB" dirty="0">
+                <a:hlinkClick r:id="rId5"/>
+              </a:rPr>
+              <a:t>eric.ed.gov/</a:t>
+            </a:r>
+            <a:r>
+              <a:rPr lang="en-GB" dirty="0" err="1">
+                <a:hlinkClick r:id="rId5"/>
+              </a:rPr>
+              <a:t>fulltext</a:t>
+            </a:r>
+            <a:r>
+              <a:rPr lang="en-GB" dirty="0">
+                <a:hlinkClick r:id="rId5"/>
+              </a:rPr>
+              <a:t>/EJ864028.pdf</a:t>
+            </a:r>
+            <a:r>
+              <a:rPr lang="en-GB" dirty="0"/>
+              <a:t>.</a:t>
+            </a:r>
+          </a:p>
+          <a:p>
+            <a:pPr marL="0" indent="0">
+              <a:buNone/>
+            </a:pPr>
+            <a:endParaRPr lang="en-US" dirty="0"/>
+          </a:p>
+          <a:p>
+            <a:pPr marL="0" indent="0">
+              <a:buNone/>
+            </a:pPr>
+            <a:endParaRPr lang="en-US" dirty="0"/>
+          </a:p>
+          <a:p>
+            <a:pPr marL="0" indent="0">
+              <a:buNone/>
+            </a:pPr>
+            <a:endParaRPr lang="en-GB" dirty="0"/>
+          </a:p>
+        </p:txBody>
+      </p:sp>
+      <p:sp>
+        <p:nvSpPr>
+          <p:cNvPr id="4" name="Slide Number Placeholder 3">
+            <a:extLst>
+              <a:ext uri="{FF2B5EF4-FFF2-40B4-BE49-F238E27FC236}">
+                <a16:creationId xmlns:a16="http://schemas.microsoft.com/office/drawing/2014/main" id="{71900C1A-082E-24F7-275D-98FF29816312}"/>
+              </a:ext>
+            </a:extLst>
+          </p:cNvPr>
+          <p:cNvSpPr>
+            <a:spLocks noGrp="1"/>
+          </p:cNvSpPr>
+          <p:nvPr>
+            <p:ph type="sldNum" sz="quarter" idx="12"/>
+          </p:nvPr>
+        </p:nvSpPr>
+        <p:spPr/>
+        <p:txBody>
+          <a:bodyPr/>
+          <a:lstStyle/>
+          <a:p>
+            <a:fld id="{ECF88CA5-FB5C-4C9F-81AA-71804F63A16C}" type="slidenum">
+              <a:rPr lang="en-US" smtClean="0"/>
+              <a:t>21</a:t>
+            </a:fld>
+            <a:endParaRPr lang="en-US"/>
+          </a:p>
+        </p:txBody>
+      </p:sp>
+    </p:spTree>
+    <p:extLst>
+      <p:ext uri="{BB962C8B-B14F-4D97-AF65-F5344CB8AC3E}">
+        <p14:creationId xmlns:p14="http://schemas.microsoft.com/office/powerpoint/2010/main" val="2221085332"/>
+      </p:ext>
+    </p:extLst>
+  </p:cSld>
+  <p:clrMapOvr>
+    <a:masterClrMapping/>
+  </p:clrMapOvr>
+</p:sld>
+</file>
+
+<file path=ppt/slides/slide22.xml><?xml version="1.0" encoding="utf-8"?>
 <p:sld xmlns:a="http://schemas.openxmlformats.org/drawingml/2006/main" xmlns:r="http://schemas.openxmlformats.org/officeDocument/2006/relationships" xmlns:p="http://schemas.openxmlformats.org/presentationml/2006/main">
   <p:cSld>
     <p:spTree>
@@ -4833,117 +6707,23 @@
             <a:spLocks noGrp="1"/>
           </p:cNvSpPr>
           <p:nvPr>
-            <p:ph type="ctrTitle"/>
+            <p:ph type="title"/>
           </p:nvPr>
         </p:nvSpPr>
         <p:spPr>
           <a:xfrm>
-            <a:off x="0" y="1174289"/>
-            <a:ext cx="3525253" cy="762342"/>
+            <a:off x="-1" y="2766218"/>
+            <a:ext cx="12192001" cy="1325563"/>
           </a:xfrm>
         </p:spPr>
         <p:txBody>
-          <a:bodyPr>
-            <a:normAutofit/>
-          </a:bodyPr>
-          <a:lstStyle/>
-          <a:p>
-            <a:r>
-              <a:rPr lang="en-US" sz="4000" b="1" dirty="0"/>
-              <a:t>Methodology</a:t>
-            </a:r>
-          </a:p>
-        </p:txBody>
-      </p:sp>
-      <p:sp>
-        <p:nvSpPr>
-          <p:cNvPr id="3" name="Subtitle 2"/>
-          <p:cNvSpPr>
-            <a:spLocks noGrp="1"/>
-          </p:cNvSpPr>
-          <p:nvPr>
-            <p:ph type="subTitle" idx="1"/>
-          </p:nvPr>
-        </p:nvSpPr>
-        <p:spPr>
-          <a:xfrm>
-            <a:off x="344465" y="1844040"/>
-            <a:ext cx="11847535" cy="3839671"/>
-          </a:xfrm>
-        </p:spPr>
-        <p:txBody>
-          <a:bodyPr>
-            <a:noAutofit/>
-          </a:bodyPr>
-          <a:lstStyle/>
-          <a:p>
-            <a:pPr algn="l"/>
+          <a:bodyPr/>
+          <a:lstStyle/>
+          <a:p>
+            <a:pPr algn="ctr"/>
             <a:r>
               <a:rPr lang="en-US" b="1" dirty="0"/>
-              <a:t>Dataset:</a:t>
-            </a:r>
-            <a:r>
-              <a:rPr lang="en-US" dirty="0"/>
-              <a:t> OULA dataset (assessments, VLE, demographics) structure and key features.</a:t>
-            </a:r>
-          </a:p>
-          <a:p>
-            <a:pPr algn="l"/>
-            <a:r>
-              <a:rPr lang="en-US" b="1" dirty="0"/>
-              <a:t>Preprocessing &amp; Feature Engineering: </a:t>
-            </a:r>
-            <a:r>
-              <a:rPr lang="en-US" dirty="0"/>
-              <a:t>Merge tables into one dataset, segment into four phases (early, midpoint, late and full), clean and prepare data.</a:t>
-            </a:r>
-          </a:p>
-          <a:p>
-            <a:pPr algn="l"/>
-            <a:r>
-              <a:rPr lang="en-US" b="1" dirty="0"/>
-              <a:t>Processing: </a:t>
-            </a:r>
-            <a:r>
-              <a:rPr lang="en-US" dirty="0"/>
-              <a:t>Handle missing values, remove duplicates, impute data, create train/test splits, scale and encode features.</a:t>
-            </a:r>
-          </a:p>
-          <a:p>
-            <a:pPr algn="l"/>
-            <a:r>
-              <a:rPr lang="en-US" b="1" dirty="0"/>
-              <a:t>Exploratory Data Analysis: </a:t>
-            </a:r>
-            <a:r>
-              <a:rPr lang="en-US" dirty="0"/>
-              <a:t>Detailed feature insights.</a:t>
-            </a:r>
-          </a:p>
-          <a:p>
-            <a:pPr algn="l"/>
-            <a:r>
-              <a:rPr lang="en-US" b="1" dirty="0"/>
-              <a:t>Modelling: </a:t>
-            </a:r>
-            <a:r>
-              <a:rPr lang="en-US" dirty="0" err="1"/>
-              <a:t>Initialise</a:t>
-            </a:r>
-            <a:r>
-              <a:rPr lang="en-US" dirty="0"/>
-              <a:t>, tune, execute, and evaluate ML models; pipeline setup and hyperparameter tuning.</a:t>
-            </a:r>
-          </a:p>
-          <a:p>
-            <a:pPr algn="l"/>
-            <a:r>
-              <a:rPr lang="en-US" b="1" dirty="0"/>
-              <a:t>Results: </a:t>
-            </a:r>
-            <a:r>
-              <a:rPr lang="en-US" dirty="0"/>
-              <a:t>Hypothesis testing outcomes and model evaluation.</a:t>
+              <a:t>Q&amp;A</a:t>
             </a:r>
           </a:p>
         </p:txBody>
@@ -4965,7 +6745,7 @@
           <a:p>
             <a:fld id="{ECF88CA5-FB5C-4C9F-81AA-71804F63A16C}" type="slidenum">
               <a:rPr lang="en-US" smtClean="0"/>
-              <a:t>3</a:t>
+              <a:t>22</a:t>
             </a:fld>
             <a:endParaRPr lang="en-US"/>
           </a:p>
@@ -4979,7 +6759,276 @@
 </p:sld>
 </file>
 
+<file path=ppt/slides/slide3.xml><?xml version="1.0" encoding="utf-8"?>
+<p:sld xmlns:a="http://schemas.openxmlformats.org/drawingml/2006/main" xmlns:r="http://schemas.openxmlformats.org/officeDocument/2006/relationships" xmlns:p="http://schemas.openxmlformats.org/presentationml/2006/main">
+  <p:cSld>
+    <p:spTree>
+      <p:nvGrpSpPr>
+        <p:cNvPr id="1" name="">
+          <a:extLst>
+            <a:ext uri="{FF2B5EF4-FFF2-40B4-BE49-F238E27FC236}">
+              <a16:creationId xmlns:a16="http://schemas.microsoft.com/office/drawing/2014/main" id="{6E941C7C-5BBA-7835-FD87-6EE7D18EB60F}"/>
+            </a:ext>
+          </a:extLst>
+        </p:cNvPr>
+        <p:cNvGrpSpPr/>
+        <p:nvPr/>
+      </p:nvGrpSpPr>
+      <p:grpSpPr>
+        <a:xfrm>
+          <a:off x="0" y="0"/>
+          <a:ext cx="0" cy="0"/>
+          <a:chOff x="0" y="0"/>
+          <a:chExt cx="0" cy="0"/>
+        </a:xfrm>
+      </p:grpSpPr>
+      <p:sp>
+        <p:nvSpPr>
+          <p:cNvPr id="2" name="Title 1">
+            <a:extLst>
+              <a:ext uri="{FF2B5EF4-FFF2-40B4-BE49-F238E27FC236}">
+                <a16:creationId xmlns:a16="http://schemas.microsoft.com/office/drawing/2014/main" id="{D00C636F-1E09-C668-DC8A-E083090A963E}"/>
+              </a:ext>
+            </a:extLst>
+          </p:cNvPr>
+          <p:cNvSpPr>
+            <a:spLocks noGrp="1"/>
+          </p:cNvSpPr>
+          <p:nvPr>
+            <p:ph type="title"/>
+          </p:nvPr>
+        </p:nvSpPr>
+        <p:spPr>
+          <a:xfrm>
+            <a:off x="0" y="1130969"/>
+            <a:ext cx="12192000" cy="4704348"/>
+          </a:xfrm>
+        </p:spPr>
+        <p:txBody>
+          <a:bodyPr/>
+          <a:lstStyle/>
+          <a:p>
+            <a:pPr algn="ctr"/>
+            <a:r>
+              <a:rPr lang="en-GB" b="1" dirty="0"/>
+              <a:t>Methodology &amp; Motivation</a:t>
+            </a:r>
+          </a:p>
+        </p:txBody>
+      </p:sp>
+      <p:sp>
+        <p:nvSpPr>
+          <p:cNvPr id="4" name="Slide Number Placeholder 3">
+            <a:extLst>
+              <a:ext uri="{FF2B5EF4-FFF2-40B4-BE49-F238E27FC236}">
+                <a16:creationId xmlns:a16="http://schemas.microsoft.com/office/drawing/2014/main" id="{C5BDCFFE-842C-ECE6-36B7-83DB8A0689A6}"/>
+              </a:ext>
+            </a:extLst>
+          </p:cNvPr>
+          <p:cNvSpPr>
+            <a:spLocks noGrp="1"/>
+          </p:cNvSpPr>
+          <p:nvPr>
+            <p:ph type="sldNum" sz="quarter" idx="12"/>
+          </p:nvPr>
+        </p:nvSpPr>
+        <p:spPr/>
+        <p:txBody>
+          <a:bodyPr/>
+          <a:lstStyle/>
+          <a:p>
+            <a:fld id="{ECF88CA5-FB5C-4C9F-81AA-71804F63A16C}" type="slidenum">
+              <a:rPr lang="en-US" smtClean="0"/>
+              <a:t>3</a:t>
+            </a:fld>
+            <a:endParaRPr lang="en-US"/>
+          </a:p>
+        </p:txBody>
+      </p:sp>
+    </p:spTree>
+    <p:extLst>
+      <p:ext uri="{BB962C8B-B14F-4D97-AF65-F5344CB8AC3E}">
+        <p14:creationId xmlns:p14="http://schemas.microsoft.com/office/powerpoint/2010/main" val="2861683200"/>
+      </p:ext>
+    </p:extLst>
+  </p:cSld>
+  <p:clrMapOvr>
+    <a:masterClrMapping/>
+  </p:clrMapOvr>
+</p:sld>
+</file>
+
 <file path=ppt/slides/slide4.xml><?xml version="1.0" encoding="utf-8"?>
+<p:sld xmlns:a="http://schemas.openxmlformats.org/drawingml/2006/main" xmlns:r="http://schemas.openxmlformats.org/officeDocument/2006/relationships" xmlns:p="http://schemas.openxmlformats.org/presentationml/2006/main">
+  <p:cSld>
+    <p:spTree>
+      <p:nvGrpSpPr>
+        <p:cNvPr id="1" name=""/>
+        <p:cNvGrpSpPr/>
+        <p:nvPr/>
+      </p:nvGrpSpPr>
+      <p:grpSpPr>
+        <a:xfrm>
+          <a:off x="0" y="0"/>
+          <a:ext cx="0" cy="0"/>
+          <a:chOff x="0" y="0"/>
+          <a:chExt cx="0" cy="0"/>
+        </a:xfrm>
+      </p:grpSpPr>
+      <p:sp>
+        <p:nvSpPr>
+          <p:cNvPr id="2" name="Title 1"/>
+          <p:cNvSpPr>
+            <a:spLocks noGrp="1"/>
+          </p:cNvSpPr>
+          <p:nvPr>
+            <p:ph type="ctrTitle"/>
+          </p:nvPr>
+        </p:nvSpPr>
+        <p:spPr>
+          <a:xfrm>
+            <a:off x="0" y="1174289"/>
+            <a:ext cx="3525253" cy="762342"/>
+          </a:xfrm>
+        </p:spPr>
+        <p:txBody>
+          <a:bodyPr>
+            <a:normAutofit/>
+          </a:bodyPr>
+          <a:lstStyle/>
+          <a:p>
+            <a:r>
+              <a:rPr lang="en-US" sz="4000" b="1" dirty="0"/>
+              <a:t>Methodology</a:t>
+            </a:r>
+          </a:p>
+        </p:txBody>
+      </p:sp>
+      <p:sp>
+        <p:nvSpPr>
+          <p:cNvPr id="3" name="Subtitle 2"/>
+          <p:cNvSpPr>
+            <a:spLocks noGrp="1"/>
+          </p:cNvSpPr>
+          <p:nvPr>
+            <p:ph type="subTitle" idx="1"/>
+          </p:nvPr>
+        </p:nvSpPr>
+        <p:spPr>
+          <a:xfrm>
+            <a:off x="344465" y="1844040"/>
+            <a:ext cx="11847535" cy="3839671"/>
+          </a:xfrm>
+        </p:spPr>
+        <p:txBody>
+          <a:bodyPr>
+            <a:noAutofit/>
+          </a:bodyPr>
+          <a:lstStyle/>
+          <a:p>
+            <a:pPr algn="l"/>
+            <a:r>
+              <a:rPr lang="en-US" b="1" dirty="0"/>
+              <a:t>Dataset Analysis:</a:t>
+            </a:r>
+            <a:r>
+              <a:rPr lang="en-US" dirty="0"/>
+              <a:t> Understand the OULA dataset (assessments, VLE, demographics) structure and key features.</a:t>
+            </a:r>
+          </a:p>
+          <a:p>
+            <a:pPr algn="l"/>
+            <a:r>
+              <a:rPr lang="en-US" b="1" dirty="0"/>
+              <a:t>Preprocessing &amp; Feature Engineering: </a:t>
+            </a:r>
+            <a:r>
+              <a:rPr lang="en-US" dirty="0"/>
+              <a:t>Merge tables into one dataset, segment into four phases (early, midpoint, late and full), clean and prepare data.</a:t>
+            </a:r>
+          </a:p>
+          <a:p>
+            <a:pPr algn="l"/>
+            <a:r>
+              <a:rPr lang="en-US" b="1" dirty="0"/>
+              <a:t>Processing: </a:t>
+            </a:r>
+            <a:r>
+              <a:rPr lang="en-US" dirty="0"/>
+              <a:t>Handle missing values, remove duplicates, impute data, create train/test splits, scale and encode features.</a:t>
+            </a:r>
+          </a:p>
+          <a:p>
+            <a:pPr algn="l"/>
+            <a:r>
+              <a:rPr lang="en-US" b="1" dirty="0"/>
+              <a:t>Exploratory Data Analysis: </a:t>
+            </a:r>
+            <a:r>
+              <a:rPr lang="en-US" dirty="0"/>
+              <a:t>Detailed feature insights.</a:t>
+            </a:r>
+          </a:p>
+          <a:p>
+            <a:pPr algn="l"/>
+            <a:r>
+              <a:rPr lang="en-US" b="1" dirty="0"/>
+              <a:t>Modelling: </a:t>
+            </a:r>
+            <a:r>
+              <a:rPr lang="en-US" dirty="0" err="1"/>
+              <a:t>Initialise</a:t>
+            </a:r>
+            <a:r>
+              <a:rPr lang="en-US" dirty="0"/>
+              <a:t>, tune, execute, and evaluate ML models; pipeline setup and hyperparameter tuning.</a:t>
+            </a:r>
+          </a:p>
+          <a:p>
+            <a:pPr algn="l"/>
+            <a:r>
+              <a:rPr lang="en-US" b="1" dirty="0"/>
+              <a:t>Results: </a:t>
+            </a:r>
+            <a:r>
+              <a:rPr lang="en-US" dirty="0"/>
+              <a:t>Hypothesis testing outcomes and model evaluation.</a:t>
+            </a:r>
+          </a:p>
+        </p:txBody>
+      </p:sp>
+      <p:sp>
+        <p:nvSpPr>
+          <p:cNvPr id="4" name="Slide Number Placeholder 3"/>
+          <p:cNvSpPr>
+            <a:spLocks noGrp="1"/>
+          </p:cNvSpPr>
+          <p:nvPr>
+            <p:ph type="sldNum" sz="quarter" idx="12"/>
+          </p:nvPr>
+        </p:nvSpPr>
+        <p:spPr/>
+        <p:txBody>
+          <a:bodyPr/>
+          <a:lstStyle/>
+          <a:p>
+            <a:fld id="{ECF88CA5-FB5C-4C9F-81AA-71804F63A16C}" type="slidenum">
+              <a:rPr lang="en-US" smtClean="0"/>
+              <a:t>4</a:t>
+            </a:fld>
+            <a:endParaRPr lang="en-US"/>
+          </a:p>
+        </p:txBody>
+      </p:sp>
+    </p:spTree>
+  </p:cSld>
+  <p:clrMapOvr>
+    <a:masterClrMapping/>
+  </p:clrMapOvr>
+</p:sld>
+</file>
+
+<file path=ppt/slides/slide5.xml><?xml version="1.0" encoding="utf-8"?>
 <p:sld xmlns:a="http://schemas.openxmlformats.org/drawingml/2006/main" xmlns:r="http://schemas.openxmlformats.org/officeDocument/2006/relationships" xmlns:p="http://schemas.openxmlformats.org/presentationml/2006/main">
   <p:cSld>
     <p:spTree>
@@ -5110,7 +7159,7 @@
           <a:p>
             <a:fld id="{ECF88CA5-FB5C-4C9F-81AA-71804F63A16C}" type="slidenum">
               <a:rPr lang="en-US" smtClean="0"/>
-              <a:t>4</a:t>
+              <a:t>5</a:t>
             </a:fld>
             <a:endParaRPr lang="en-US"/>
           </a:p>
@@ -5131,7 +7180,7 @@
           <p:nvPr/>
         </p:nvPicPr>
         <p:blipFill>
-          <a:blip r:embed="rId2">
+          <a:blip r:embed="rId2" cstate="print">
             <a:extLst>
               <a:ext uri="{28A0092B-C50C-407E-A947-70E740481C1C}">
                 <a14:useLocalDpi xmlns:a14="http://schemas.microsoft.com/office/drawing/2010/main" val="0"/>
@@ -5165,7 +7214,7 @@
 </p:sld>
 </file>
 
-<file path=ppt/slides/slide5.xml><?xml version="1.0" encoding="utf-8"?>
+<file path=ppt/slides/slide6.xml><?xml version="1.0" encoding="utf-8"?>
 <p:sld xmlns:a="http://schemas.openxmlformats.org/drawingml/2006/main" xmlns:r="http://schemas.openxmlformats.org/officeDocument/2006/relationships" xmlns:p="http://schemas.openxmlformats.org/presentationml/2006/main">
   <p:cSld>
     <p:spTree>
@@ -5257,7 +7306,15 @@
             </a:pPr>
             <a:r>
               <a:rPr lang="en-US" sz="2600" dirty="0"/>
-              <a:t>Dataset has a 20/80 dropout to non-dropout ratio, so class weights were set to 'balanced' to improve minority class detection.</a:t>
+              <a:t>Dataset has a </a:t>
+            </a:r>
+            <a:r>
+              <a:rPr lang="en-US" sz="2600" b="1" dirty="0"/>
+              <a:t>20/80</a:t>
+            </a:r>
+            <a:r>
+              <a:rPr lang="en-US" sz="2600" dirty="0"/>
+              <a:t> dropout to non-dropout ratio, so class weights were set to 'balanced' to improve minority class detection.</a:t>
             </a:r>
           </a:p>
           <a:p>
@@ -5271,7 +7328,7 @@
             </a:r>
             <a:r>
               <a:rPr lang="en-US" sz="2600" dirty="0"/>
-              <a:t> with 5-fold cross-validation was used for hyperparameter tuning to ensure stable and accurate results.* </a:t>
+              <a:t> with 5-fold cross-validation was used for hyperparameter tuning to ensure stable and accurate results.</a:t>
             </a:r>
           </a:p>
           <a:p>
@@ -5309,7 +7366,7 @@
           <a:p>
             <a:fld id="{ECF88CA5-FB5C-4C9F-81AA-71804F63A16C}" type="slidenum">
               <a:rPr lang="en-US" smtClean="0"/>
-              <a:t>5</a:t>
+              <a:t>6</a:t>
             </a:fld>
             <a:endParaRPr lang="en-US"/>
           </a:p>
@@ -5328,7 +7385,7 @@
 </p:sld>
 </file>
 
-<file path=ppt/slides/slide6.xml><?xml version="1.0" encoding="utf-8"?>
+<file path=ppt/slides/slide7.xml><?xml version="1.0" encoding="utf-8"?>
 <p:sld xmlns:a="http://schemas.openxmlformats.org/drawingml/2006/main" xmlns:r="http://schemas.openxmlformats.org/officeDocument/2006/relationships" xmlns:p="http://schemas.openxmlformats.org/presentationml/2006/main">
   <p:cSld>
     <p:spTree>
@@ -5415,7 +7472,7 @@
           <a:p>
             <a:fld id="{ECF88CA5-FB5C-4C9F-81AA-71804F63A16C}" type="slidenum">
               <a:rPr lang="en-US" smtClean="0"/>
-              <a:t>6</a:t>
+              <a:t>7</a:t>
             </a:fld>
             <a:endParaRPr lang="en-US"/>
           </a:p>
@@ -5446,7 +7503,7 @@
         </p:spPr>
         <p:txBody>
           <a:bodyPr vert="horz" lIns="91440" tIns="45720" rIns="91440" bIns="45720" rtlCol="0" anchor="t">
-            <a:normAutofit fontScale="92500" lnSpcReduction="10000"/>
+            <a:normAutofit fontScale="92500" lnSpcReduction="20000"/>
           </a:bodyPr>
           <a:lstStyle>
             <a:lvl1pPr marL="228600" indent="-228600" algn="l" defTabSz="914400" rtl="0" eaLnBrk="1" latinLnBrk="0" hangingPunct="1">
@@ -5615,13 +7672,19 @@
           <a:p>
             <a:r>
               <a:rPr lang="en-US" dirty="0"/>
-              <a:t>Student dropout is a major concern in higher education, affecting both students’ academic progress and institutional stability. </a:t>
+              <a:t>Student dropout is a major concern in higher education, affecting both students’ academic progress and institutional stability [4]. </a:t>
             </a:r>
           </a:p>
           <a:p>
             <a:r>
               <a:rPr lang="en-US" dirty="0"/>
-              <a:t>In the UK, data from the Student Loans Company shows that students who took loans but did not complete their degrees rose from 32,491 in 2018–19 to 41,630 in 2022–23, a 28% increase. Factors such as mental health challenges, financial strain, academic pressure, social isolation, and limited institutional support contribute to early withdrawal [3], highlighting the need for systems that identify vulnerable students and provide </a:t>
+              <a:t>In the UK, data from the Student Loans Company shows that students who took loans but did not complete their degrees rose from 32,491 in 2018–19 to 41,630 in 2022–23, a 28% increase [3]. </a:t>
+            </a:r>
+          </a:p>
+          <a:p>
+            <a:r>
+              <a:rPr lang="en-US" dirty="0"/>
+              <a:t>Factors such as mental health challenges, financial strain, academic pressure, social isolation, and limited institutional support contribute to early withdrawal [3], highlighting the need for systems that identify vulnerable students and provide </a:t>
             </a:r>
             <a:r>
               <a:rPr lang="en-US" dirty="0" err="1"/>
@@ -5653,7 +7716,7 @@
 </p:sld>
 </file>
 
-<file path=ppt/slides/slide7.xml><?xml version="1.0" encoding="utf-8"?>
+<file path=ppt/slides/slide8.xml><?xml version="1.0" encoding="utf-8"?>
 <p:sld xmlns:a="http://schemas.openxmlformats.org/drawingml/2006/main" xmlns:r="http://schemas.openxmlformats.org/officeDocument/2006/relationships" xmlns:p="http://schemas.openxmlformats.org/presentationml/2006/main">
   <p:cSld>
     <p:spTree>
@@ -5675,7 +7738,7 @@
           <p:cNvPr id="2" name="Title 1">
             <a:extLst>
               <a:ext uri="{FF2B5EF4-FFF2-40B4-BE49-F238E27FC236}">
-                <a16:creationId xmlns:a16="http://schemas.microsoft.com/office/drawing/2014/main" id="{C05224E0-163D-00AB-B83D-18CD69E79139}"/>
+                <a16:creationId xmlns:a16="http://schemas.microsoft.com/office/drawing/2014/main" id="{38C2E06D-C442-8912-7CF3-B16B15537CF9}"/>
               </a:ext>
             </a:extLst>
           </p:cNvPr>
@@ -5686,37 +7749,21 @@
             <p:ph type="title"/>
           </p:nvPr>
         </p:nvSpPr>
-        <p:spPr/>
+        <p:spPr>
+          <a:xfrm>
+            <a:off x="0" y="1130969"/>
+            <a:ext cx="12192000" cy="4704348"/>
+          </a:xfrm>
+        </p:spPr>
         <p:txBody>
           <a:bodyPr/>
           <a:lstStyle/>
           <a:p>
-            <a:endParaRPr lang="en-GB"/>
-          </a:p>
-        </p:txBody>
-      </p:sp>
-      <p:sp>
-        <p:nvSpPr>
-          <p:cNvPr id="3" name="Content Placeholder 2">
-            <a:extLst>
-              <a:ext uri="{FF2B5EF4-FFF2-40B4-BE49-F238E27FC236}">
-                <a16:creationId xmlns:a16="http://schemas.microsoft.com/office/drawing/2014/main" id="{DE8502F2-8357-EACC-7FCB-7A2D0AB1110E}"/>
-              </a:ext>
-            </a:extLst>
-          </p:cNvPr>
-          <p:cNvSpPr>
-            <a:spLocks noGrp="1"/>
-          </p:cNvSpPr>
-          <p:nvPr>
-            <p:ph idx="1"/>
-          </p:nvPr>
-        </p:nvSpPr>
-        <p:spPr/>
-        <p:txBody>
-          <a:bodyPr/>
-          <a:lstStyle/>
-          <a:p>
-            <a:endParaRPr lang="en-GB"/>
+            <a:pPr algn="ctr"/>
+            <a:r>
+              <a:rPr lang="en-GB" b="1" dirty="0"/>
+              <a:t>Results &amp; Findings</a:t>
+            </a:r>
           </a:p>
         </p:txBody>
       </p:sp>
@@ -5725,107 +7772,7 @@
           <p:cNvPr id="4" name="Slide Number Placeholder 3">
             <a:extLst>
               <a:ext uri="{FF2B5EF4-FFF2-40B4-BE49-F238E27FC236}">
-                <a16:creationId xmlns:a16="http://schemas.microsoft.com/office/drawing/2014/main" id="{BBE6A5F1-871B-9171-F475-D1EAF7D54DAA}"/>
-              </a:ext>
-            </a:extLst>
-          </p:cNvPr>
-          <p:cNvSpPr>
-            <a:spLocks noGrp="1"/>
-          </p:cNvSpPr>
-          <p:nvPr>
-            <p:ph type="sldNum" sz="quarter" idx="12"/>
-          </p:nvPr>
-        </p:nvSpPr>
-        <p:spPr/>
-        <p:txBody>
-          <a:bodyPr/>
-          <a:lstStyle/>
-          <a:p>
-            <a:fld id="{ECF88CA5-FB5C-4C9F-81AA-71804F63A16C}" type="slidenum">
-              <a:rPr lang="en-US" smtClean="0"/>
-              <a:t>7</a:t>
-            </a:fld>
-            <a:endParaRPr lang="en-US"/>
-          </a:p>
-        </p:txBody>
-      </p:sp>
-    </p:spTree>
-    <p:extLst>
-      <p:ext uri="{BB962C8B-B14F-4D97-AF65-F5344CB8AC3E}">
-        <p14:creationId xmlns:p14="http://schemas.microsoft.com/office/powerpoint/2010/main" val="88742420"/>
-      </p:ext>
-    </p:extLst>
-  </p:cSld>
-  <p:clrMapOvr>
-    <a:masterClrMapping/>
-  </p:clrMapOvr>
-</p:sld>
-</file>
-
-<file path=ppt/slides/slide8.xml><?xml version="1.0" encoding="utf-8"?>
-<p:sld xmlns:a="http://schemas.openxmlformats.org/drawingml/2006/main" xmlns:r="http://schemas.openxmlformats.org/officeDocument/2006/relationships" xmlns:p="http://schemas.openxmlformats.org/presentationml/2006/main">
-  <p:cSld>
-    <p:spTree>
-      <p:nvGrpSpPr>
-        <p:cNvPr id="1" name="">
-          <a:extLst>
-            <a:ext uri="{FF2B5EF4-FFF2-40B4-BE49-F238E27FC236}">
-              <a16:creationId xmlns:a16="http://schemas.microsoft.com/office/drawing/2014/main" id="{E16A8978-162E-4654-3547-E481B661CBB4}"/>
-            </a:ext>
-          </a:extLst>
-        </p:cNvPr>
-        <p:cNvGrpSpPr/>
-        <p:nvPr/>
-      </p:nvGrpSpPr>
-      <p:grpSpPr>
-        <a:xfrm>
-          <a:off x="0" y="0"/>
-          <a:ext cx="0" cy="0"/>
-          <a:chOff x="0" y="0"/>
-          <a:chExt cx="0" cy="0"/>
-        </a:xfrm>
-      </p:grpSpPr>
-      <p:sp>
-        <p:nvSpPr>
-          <p:cNvPr id="2" name="Title 1">
-            <a:extLst>
-              <a:ext uri="{FF2B5EF4-FFF2-40B4-BE49-F238E27FC236}">
-                <a16:creationId xmlns:a16="http://schemas.microsoft.com/office/drawing/2014/main" id="{42C52BE8-D389-6C0D-B851-8761F5F124BE}"/>
-              </a:ext>
-            </a:extLst>
-          </p:cNvPr>
-          <p:cNvSpPr>
-            <a:spLocks noGrp="1"/>
-          </p:cNvSpPr>
-          <p:nvPr>
-            <p:ph type="title"/>
-          </p:nvPr>
-        </p:nvSpPr>
-        <p:spPr>
-          <a:xfrm>
-            <a:off x="838200" y="1111885"/>
-            <a:ext cx="10515600" cy="831215"/>
-          </a:xfrm>
-        </p:spPr>
-        <p:txBody>
-          <a:bodyPr>
-            <a:normAutofit/>
-          </a:bodyPr>
-          <a:lstStyle/>
-          <a:p>
-            <a:r>
-              <a:rPr lang="en-GB" sz="4000" b="1" dirty="0"/>
-              <a:t>Model Accuracy Scores Across Phases</a:t>
-            </a:r>
-          </a:p>
-        </p:txBody>
-      </p:sp>
-      <p:sp>
-        <p:nvSpPr>
-          <p:cNvPr id="4" name="Slide Number Placeholder 3">
-            <a:extLst>
-              <a:ext uri="{FF2B5EF4-FFF2-40B4-BE49-F238E27FC236}">
-                <a16:creationId xmlns:a16="http://schemas.microsoft.com/office/drawing/2014/main" id="{02B7EFB7-88D9-B472-6CE8-8B70AED4A0EA}"/>
+                <a16:creationId xmlns:a16="http://schemas.microsoft.com/office/drawing/2014/main" id="{9E1ECBF6-D809-64C7-EB46-9C6F7158A942}"/>
               </a:ext>
             </a:extLst>
           </p:cNvPr>
@@ -5849,442 +7796,10 @@
           </a:p>
         </p:txBody>
       </p:sp>
-      <p:graphicFrame>
-        <p:nvGraphicFramePr>
-          <p:cNvPr id="10" name="Content Placeholder 9">
-            <a:extLst>
-              <a:ext uri="{FF2B5EF4-FFF2-40B4-BE49-F238E27FC236}">
-                <a16:creationId xmlns:a16="http://schemas.microsoft.com/office/drawing/2014/main" id="{61028B87-71FF-9A17-C92C-9594C133ECC0}"/>
-              </a:ext>
-            </a:extLst>
-          </p:cNvPr>
-          <p:cNvGraphicFramePr>
-            <a:graphicFrameLocks noGrp="1"/>
-          </p:cNvGraphicFramePr>
-          <p:nvPr>
-            <p:ph idx="1"/>
-          </p:nvPr>
-        </p:nvGraphicFramePr>
-        <p:xfrm>
-          <a:off x="838200" y="1833880"/>
-          <a:ext cx="10515600" cy="1513840"/>
-        </p:xfrm>
-        <a:graphic>
-          <a:graphicData uri="http://schemas.openxmlformats.org/drawingml/2006/table">
-            <a:tbl>
-              <a:tblPr firstRow="1" bandRow="1">
-                <a:tableStyleId>{5C22544A-7EE6-4342-B048-85BDC9FD1C3A}</a:tableStyleId>
-              </a:tblPr>
-              <a:tblGrid>
-                <a:gridCol w="2712720">
-                  <a:extLst>
-                    <a:ext uri="{9D8B030D-6E8A-4147-A177-3AD203B41FA5}">
-                      <a16:colId xmlns:a16="http://schemas.microsoft.com/office/drawing/2014/main" val="1921292116"/>
-                    </a:ext>
-                  </a:extLst>
-                </a:gridCol>
-                <a:gridCol w="1943100">
-                  <a:extLst>
-                    <a:ext uri="{9D8B030D-6E8A-4147-A177-3AD203B41FA5}">
-                      <a16:colId xmlns:a16="http://schemas.microsoft.com/office/drawing/2014/main" val="588760132"/>
-                    </a:ext>
-                  </a:extLst>
-                </a:gridCol>
-                <a:gridCol w="1874520">
-                  <a:extLst>
-                    <a:ext uri="{9D8B030D-6E8A-4147-A177-3AD203B41FA5}">
-                      <a16:colId xmlns:a16="http://schemas.microsoft.com/office/drawing/2014/main" val="2584963815"/>
-                    </a:ext>
-                  </a:extLst>
-                </a:gridCol>
-                <a:gridCol w="1935480">
-                  <a:extLst>
-                    <a:ext uri="{9D8B030D-6E8A-4147-A177-3AD203B41FA5}">
-                      <a16:colId xmlns:a16="http://schemas.microsoft.com/office/drawing/2014/main" val="1860058179"/>
-                    </a:ext>
-                  </a:extLst>
-                </a:gridCol>
-                <a:gridCol w="2049780">
-                  <a:extLst>
-                    <a:ext uri="{9D8B030D-6E8A-4147-A177-3AD203B41FA5}">
-                      <a16:colId xmlns:a16="http://schemas.microsoft.com/office/drawing/2014/main" val="2280133371"/>
-                    </a:ext>
-                  </a:extLst>
-                </a:gridCol>
-              </a:tblGrid>
-              <a:tr h="370840">
-                <a:tc>
-                  <a:txBody>
-                    <a:bodyPr/>
-                    <a:lstStyle/>
-                    <a:p>
-                      <a:pPr algn="ctr"/>
-                      <a:r>
-                        <a:rPr lang="en-GB" dirty="0"/>
-                        <a:t>Model</a:t>
-                      </a:r>
-                    </a:p>
-                  </a:txBody>
-                  <a:tcPr/>
-                </a:tc>
-                <a:tc>
-                  <a:txBody>
-                    <a:bodyPr/>
-                    <a:lstStyle/>
-                    <a:p>
-                      <a:pPr algn="ctr"/>
-                      <a:r>
-                        <a:rPr lang="en-GB" dirty="0"/>
-                        <a:t>Early</a:t>
-                      </a:r>
-                    </a:p>
-                  </a:txBody>
-                  <a:tcPr/>
-                </a:tc>
-                <a:tc>
-                  <a:txBody>
-                    <a:bodyPr/>
-                    <a:lstStyle/>
-                    <a:p>
-                      <a:pPr algn="ctr"/>
-                      <a:r>
-                        <a:rPr lang="en-GB" dirty="0"/>
-                        <a:t>Midpoint</a:t>
-                      </a:r>
-                    </a:p>
-                  </a:txBody>
-                  <a:tcPr/>
-                </a:tc>
-                <a:tc>
-                  <a:txBody>
-                    <a:bodyPr/>
-                    <a:lstStyle/>
-                    <a:p>
-                      <a:pPr algn="ctr"/>
-                      <a:r>
-                        <a:rPr lang="en-GB" dirty="0"/>
-                        <a:t>Late</a:t>
-                      </a:r>
-                    </a:p>
-                  </a:txBody>
-                  <a:tcPr/>
-                </a:tc>
-                <a:tc>
-                  <a:txBody>
-                    <a:bodyPr/>
-                    <a:lstStyle/>
-                    <a:p>
-                      <a:pPr algn="ctr"/>
-                      <a:r>
-                        <a:rPr lang="en-GB" dirty="0"/>
-                        <a:t>Full</a:t>
-                      </a:r>
-                    </a:p>
-                  </a:txBody>
-                  <a:tcPr/>
-                </a:tc>
-                <a:extLst>
-                  <a:ext uri="{0D108BD9-81ED-4DB2-BD59-A6C34878D82A}">
-                    <a16:rowId xmlns:a16="http://schemas.microsoft.com/office/drawing/2014/main" val="1121749780"/>
-                  </a:ext>
-                </a:extLst>
-              </a:tr>
-              <a:tr h="401320">
-                <a:tc>
-                  <a:txBody>
-                    <a:bodyPr/>
-                    <a:lstStyle/>
-                    <a:p>
-                      <a:r>
-                        <a:rPr lang="en-GB" dirty="0"/>
-                        <a:t>Logistic Regression</a:t>
-                      </a:r>
-                    </a:p>
-                  </a:txBody>
-                  <a:tcPr/>
-                </a:tc>
-                <a:tc>
-                  <a:txBody>
-                    <a:bodyPr/>
-                    <a:lstStyle/>
-                    <a:p>
-                      <a:pPr algn="ctr"/>
-                      <a:r>
-                        <a:rPr lang="en-GB" dirty="0"/>
-                        <a:t>75%</a:t>
-                      </a:r>
-                    </a:p>
-                  </a:txBody>
-                  <a:tcPr/>
-                </a:tc>
-                <a:tc>
-                  <a:txBody>
-                    <a:bodyPr/>
-                    <a:lstStyle/>
-                    <a:p>
-                      <a:pPr algn="ctr"/>
-                      <a:r>
-                        <a:rPr lang="en-GB" dirty="0"/>
-                        <a:t>79%</a:t>
-                      </a:r>
-                    </a:p>
-                  </a:txBody>
-                  <a:tcPr/>
-                </a:tc>
-                <a:tc>
-                  <a:txBody>
-                    <a:bodyPr/>
-                    <a:lstStyle/>
-                    <a:p>
-                      <a:pPr algn="ctr"/>
-                      <a:r>
-                        <a:rPr lang="en-GB" dirty="0"/>
-                        <a:t>80%</a:t>
-                      </a:r>
-                    </a:p>
-                  </a:txBody>
-                  <a:tcPr/>
-                </a:tc>
-                <a:tc>
-                  <a:txBody>
-                    <a:bodyPr/>
-                    <a:lstStyle/>
-                    <a:p>
-                      <a:pPr algn="ctr"/>
-                      <a:r>
-                        <a:rPr lang="en-GB" dirty="0"/>
-                        <a:t>82%</a:t>
-                      </a:r>
-                    </a:p>
-                  </a:txBody>
-                  <a:tcPr/>
-                </a:tc>
-                <a:extLst>
-                  <a:ext uri="{0D108BD9-81ED-4DB2-BD59-A6C34878D82A}">
-                    <a16:rowId xmlns:a16="http://schemas.microsoft.com/office/drawing/2014/main" val="4200736597"/>
-                  </a:ext>
-                </a:extLst>
-              </a:tr>
-              <a:tr h="370840">
-                <a:tc>
-                  <a:txBody>
-                    <a:bodyPr/>
-                    <a:lstStyle/>
-                    <a:p>
-                      <a:r>
-                        <a:rPr lang="en-GB" dirty="0"/>
-                        <a:t>Support Vector Machine</a:t>
-                      </a:r>
-                    </a:p>
-                  </a:txBody>
-                  <a:tcPr/>
-                </a:tc>
-                <a:tc>
-                  <a:txBody>
-                    <a:bodyPr/>
-                    <a:lstStyle/>
-                    <a:p>
-                      <a:pPr algn="ctr"/>
-                      <a:r>
-                        <a:rPr lang="en-GB" dirty="0"/>
-                        <a:t>82%</a:t>
-                      </a:r>
-                    </a:p>
-                  </a:txBody>
-                  <a:tcPr/>
-                </a:tc>
-                <a:tc>
-                  <a:txBody>
-                    <a:bodyPr/>
-                    <a:lstStyle/>
-                    <a:p>
-                      <a:pPr algn="ctr"/>
-                      <a:r>
-                        <a:rPr lang="en-GB" dirty="0"/>
-                        <a:t>83%</a:t>
-                      </a:r>
-                    </a:p>
-                  </a:txBody>
-                  <a:tcPr/>
-                </a:tc>
-                <a:tc>
-                  <a:txBody>
-                    <a:bodyPr/>
-                    <a:lstStyle/>
-                    <a:p>
-                      <a:pPr algn="ctr"/>
-                      <a:r>
-                        <a:rPr lang="en-GB" dirty="0"/>
-                        <a:t>84%</a:t>
-                      </a:r>
-                    </a:p>
-                  </a:txBody>
-                  <a:tcPr/>
-                </a:tc>
-                <a:tc>
-                  <a:txBody>
-                    <a:bodyPr/>
-                    <a:lstStyle/>
-                    <a:p>
-                      <a:pPr algn="ctr"/>
-                      <a:r>
-                        <a:rPr lang="en-GB" dirty="0"/>
-                        <a:t>86%</a:t>
-                      </a:r>
-                    </a:p>
-                  </a:txBody>
-                  <a:tcPr/>
-                </a:tc>
-                <a:extLst>
-                  <a:ext uri="{0D108BD9-81ED-4DB2-BD59-A6C34878D82A}">
-                    <a16:rowId xmlns:a16="http://schemas.microsoft.com/office/drawing/2014/main" val="2104744661"/>
-                  </a:ext>
-                </a:extLst>
-              </a:tr>
-              <a:tr h="370840">
-                <a:tc>
-                  <a:txBody>
-                    <a:bodyPr/>
-                    <a:lstStyle/>
-                    <a:p>
-                      <a:r>
-                        <a:rPr lang="en-GB" dirty="0"/>
-                        <a:t>Multiplayer Perceptron</a:t>
-                      </a:r>
-                    </a:p>
-                  </a:txBody>
-                  <a:tcPr/>
-                </a:tc>
-                <a:tc>
-                  <a:txBody>
-                    <a:bodyPr/>
-                    <a:lstStyle/>
-                    <a:p>
-                      <a:pPr algn="ctr"/>
-                      <a:r>
-                        <a:rPr lang="en-GB" dirty="0"/>
-                        <a:t>77%</a:t>
-                      </a:r>
-                    </a:p>
-                  </a:txBody>
-                  <a:tcPr/>
-                </a:tc>
-                <a:tc>
-                  <a:txBody>
-                    <a:bodyPr/>
-                    <a:lstStyle/>
-                    <a:p>
-                      <a:pPr algn="ctr"/>
-                      <a:r>
-                        <a:rPr lang="en-GB" dirty="0"/>
-                        <a:t>80%</a:t>
-                      </a:r>
-                    </a:p>
-                  </a:txBody>
-                  <a:tcPr/>
-                </a:tc>
-                <a:tc>
-                  <a:txBody>
-                    <a:bodyPr/>
-                    <a:lstStyle/>
-                    <a:p>
-                      <a:pPr algn="ctr"/>
-                      <a:r>
-                        <a:rPr lang="en-GB" dirty="0"/>
-                        <a:t>82%</a:t>
-                      </a:r>
-                    </a:p>
-                  </a:txBody>
-                  <a:tcPr/>
-                </a:tc>
-                <a:tc>
-                  <a:txBody>
-                    <a:bodyPr/>
-                    <a:lstStyle/>
-                    <a:p>
-                      <a:pPr algn="ctr"/>
-                      <a:r>
-                        <a:rPr lang="en-GB" dirty="0"/>
-                        <a:t>83%</a:t>
-                      </a:r>
-                    </a:p>
-                  </a:txBody>
-                  <a:tcPr/>
-                </a:tc>
-                <a:extLst>
-                  <a:ext uri="{0D108BD9-81ED-4DB2-BD59-A6C34878D82A}">
-                    <a16:rowId xmlns:a16="http://schemas.microsoft.com/office/drawing/2014/main" val="454753117"/>
-                  </a:ext>
-                </a:extLst>
-              </a:tr>
-            </a:tbl>
-          </a:graphicData>
-        </a:graphic>
-      </p:graphicFrame>
-      <p:sp>
-        <p:nvSpPr>
-          <p:cNvPr id="14" name="TextBox 13">
-            <a:extLst>
-              <a:ext uri="{FF2B5EF4-FFF2-40B4-BE49-F238E27FC236}">
-                <a16:creationId xmlns:a16="http://schemas.microsoft.com/office/drawing/2014/main" id="{1C7B3AFE-BDA7-34E8-EB01-04F42B6116F1}"/>
-              </a:ext>
-            </a:extLst>
-          </p:cNvPr>
-          <p:cNvSpPr txBox="1"/>
-          <p:nvPr/>
-        </p:nvSpPr>
-        <p:spPr>
-          <a:xfrm>
-            <a:off x="723900" y="3566795"/>
-            <a:ext cx="10866120" cy="1938992"/>
-          </a:xfrm>
-          <a:prstGeom prst="rect">
-            <a:avLst/>
-          </a:prstGeom>
-          <a:noFill/>
-        </p:spPr>
-        <p:txBody>
-          <a:bodyPr wrap="square" rtlCol="0">
-            <a:spAutoFit/>
-          </a:bodyPr>
-          <a:lstStyle/>
-          <a:p>
-            <a:pPr marL="230400" indent="-230400">
-              <a:buFont typeface="Arial" panose="020B0604020202020204" pitchFamily="34" charset="0"/>
-              <a:buChar char="•"/>
-            </a:pPr>
-            <a:r>
-              <a:rPr lang="en-US" sz="2000" dirty="0"/>
-              <a:t>SVM consistently achieves the highest accuracy across all phases, followed by the MLP classifier and then LR. </a:t>
-            </a:r>
-          </a:p>
-          <a:p>
-            <a:pPr marL="230400" indent="-230400">
-              <a:buFont typeface="Arial" panose="020B0604020202020204" pitchFamily="34" charset="0"/>
-              <a:buChar char="•"/>
-            </a:pPr>
-            <a:r>
-              <a:rPr lang="en-US" sz="2000" dirty="0"/>
-              <a:t>However, accuracy alone is not a reliable metric for evaluating dropout prediction due to the class imbalance in the dataset, which biases results toward the majority class (non-dropouts).</a:t>
-            </a:r>
-          </a:p>
-          <a:p>
-            <a:pPr marL="230400" indent="-230400">
-              <a:buFont typeface="Arial" panose="020B0604020202020204" pitchFamily="34" charset="0"/>
-              <a:buChar char="•"/>
-            </a:pPr>
-            <a:r>
-              <a:rPr lang="en-US" sz="2000" dirty="0"/>
-              <a:t>To better assess model performance on the minority class (dropouts), we focus on the precision and recall scores.</a:t>
-            </a:r>
-            <a:endParaRPr lang="en-GB" sz="2000" dirty="0"/>
-          </a:p>
-        </p:txBody>
-      </p:sp>
     </p:spTree>
     <p:extLst>
       <p:ext uri="{BB962C8B-B14F-4D97-AF65-F5344CB8AC3E}">
-        <p14:creationId xmlns:p14="http://schemas.microsoft.com/office/powerpoint/2010/main" val="3719682602"/>
+        <p14:creationId xmlns:p14="http://schemas.microsoft.com/office/powerpoint/2010/main" val="522651291"/>
       </p:ext>
     </p:extLst>
   </p:cSld>
@@ -6316,7 +7831,7 @@
           <p:cNvPr id="2" name="Title 1">
             <a:extLst>
               <a:ext uri="{FF2B5EF4-FFF2-40B4-BE49-F238E27FC236}">
-                <a16:creationId xmlns:a16="http://schemas.microsoft.com/office/drawing/2014/main" id="{DCDB68AE-3BB1-AE5D-AA23-AC79C9B5BB1E}"/>
+                <a16:creationId xmlns:a16="http://schemas.microsoft.com/office/drawing/2014/main" id="{1E6BE49B-8215-5999-6764-A5AB11913D5A}"/>
               </a:ext>
             </a:extLst>
           </p:cNvPr>
@@ -6329,19 +7844,99 @@
         </p:nvSpPr>
         <p:spPr>
           <a:xfrm>
-            <a:off x="838200" y="1111885"/>
-            <a:ext cx="10515600" cy="831215"/>
+            <a:off x="324853" y="1108972"/>
+            <a:ext cx="11028947" cy="716653"/>
           </a:xfrm>
         </p:spPr>
         <p:txBody>
+          <a:bodyPr/>
+          <a:lstStyle/>
+          <a:p>
+            <a:r>
+              <a:rPr lang="en-GB" b="1" dirty="0"/>
+              <a:t>Hypothesis Tests and Results</a:t>
+            </a:r>
+          </a:p>
+        </p:txBody>
+      </p:sp>
+      <p:sp>
+        <p:nvSpPr>
+          <p:cNvPr id="3" name="Content Placeholder 2">
+            <a:extLst>
+              <a:ext uri="{FF2B5EF4-FFF2-40B4-BE49-F238E27FC236}">
+                <a16:creationId xmlns:a16="http://schemas.microsoft.com/office/drawing/2014/main" id="{6B62E942-F32A-825F-1DC1-FEC0909FBDE4}"/>
+              </a:ext>
+            </a:extLst>
+          </p:cNvPr>
+          <p:cNvSpPr>
+            <a:spLocks noGrp="1"/>
+          </p:cNvSpPr>
+          <p:nvPr>
+            <p:ph idx="1"/>
+          </p:nvPr>
+        </p:nvSpPr>
+        <p:spPr>
+          <a:xfrm>
+            <a:off x="324853" y="1732547"/>
+            <a:ext cx="11742821" cy="4444416"/>
+          </a:xfrm>
+        </p:spPr>
+        <p:txBody>
           <a:bodyPr>
-            <a:normAutofit/>
+            <a:normAutofit fontScale="92500" lnSpcReduction="10000"/>
           </a:bodyPr>
           <a:lstStyle/>
           <a:p>
-            <a:r>
-              <a:rPr lang="en-GB" sz="4000" b="1" dirty="0"/>
-              <a:t>Model Accuracy Scores Across Phases</a:t>
+            <a:pPr marL="0" indent="0">
+              <a:buNone/>
+            </a:pPr>
+            <a:r>
+              <a:rPr lang="en-US" dirty="0"/>
+              <a:t>Four hypothesis tests were carried out on the OULA dataset, with the key descriptions and findings outlined below</a:t>
+            </a:r>
+            <a:r>
+              <a:rPr lang="en-GB" dirty="0"/>
+              <a:t>:</a:t>
+            </a:r>
+          </a:p>
+          <a:p>
+            <a:r>
+              <a:rPr lang="en-GB" b="1" dirty="0"/>
+              <a:t>Engagement:</a:t>
+            </a:r>
+            <a:r>
+              <a:rPr lang="en-GB" dirty="0"/>
+              <a:t> Very small p-value (~8.82 × 10⁻¹⁴⁰) confirms low early engagement is strongly linked to higher dropout risk.</a:t>
+            </a:r>
+          </a:p>
+          <a:p>
+            <a:r>
+              <a:rPr lang="en-GB" b="1" dirty="0"/>
+              <a:t>Assessment Performance:</a:t>
+            </a:r>
+            <a:r>
+              <a:rPr lang="en-GB" dirty="0"/>
+              <a:t> Mann–Whitney U test (U = 22,891,409, p &lt; 0.001) shows dropouts score significantly lower, supporting the link between weak early performance and dropout.</a:t>
+            </a:r>
+          </a:p>
+          <a:p>
+            <a:r>
+              <a:rPr lang="en-GB" b="1" dirty="0"/>
+              <a:t>Demographics:</a:t>
+            </a:r>
+            <a:r>
+              <a:rPr lang="en-GB" dirty="0"/>
+              <a:t> Chi-Square tests found dropout differences by education, region, IMD band, and disability, but not age.</a:t>
+            </a:r>
+          </a:p>
+          <a:p>
+            <a:r>
+              <a:rPr lang="en-GB" b="1" dirty="0"/>
+              <a:t>Re-enrolment:</a:t>
+            </a:r>
+            <a:r>
+              <a:rPr lang="en-GB" dirty="0"/>
+              <a:t> Mann–Whitney U test (U = 40,818,054, p = 1.10 × 10⁻⁷) shows multiple previous attempts increase dropout risk.</a:t>
             </a:r>
           </a:p>
         </p:txBody>
@@ -6351,7 +7946,7 @@
           <p:cNvPr id="4" name="Slide Number Placeholder 3">
             <a:extLst>
               <a:ext uri="{FF2B5EF4-FFF2-40B4-BE49-F238E27FC236}">
-                <a16:creationId xmlns:a16="http://schemas.microsoft.com/office/drawing/2014/main" id="{D21CAC78-E7A3-9A5D-F261-6888B9A3DD0F}"/>
+                <a16:creationId xmlns:a16="http://schemas.microsoft.com/office/drawing/2014/main" id="{46F15A4F-2098-04EB-D226-704B32F6FF49}"/>
               </a:ext>
             </a:extLst>
           </p:cNvPr>
@@ -6375,447 +7970,10 @@
           </a:p>
         </p:txBody>
       </p:sp>
-      <p:graphicFrame>
-        <p:nvGraphicFramePr>
-          <p:cNvPr id="10" name="Content Placeholder 9">
-            <a:extLst>
-              <a:ext uri="{FF2B5EF4-FFF2-40B4-BE49-F238E27FC236}">
-                <a16:creationId xmlns:a16="http://schemas.microsoft.com/office/drawing/2014/main" id="{F9F0A6CB-F6FA-8901-49D0-53326C964C6F}"/>
-              </a:ext>
-            </a:extLst>
-          </p:cNvPr>
-          <p:cNvGraphicFramePr>
-            <a:graphicFrameLocks noGrp="1"/>
-          </p:cNvGraphicFramePr>
-          <p:nvPr>
-            <p:ph idx="1"/>
-            <p:extLst>
-              <p:ext uri="{D42A27DB-BD31-4B8C-83A1-F6EECF244321}">
-                <p14:modId xmlns:p14="http://schemas.microsoft.com/office/powerpoint/2010/main" val="191142630"/>
-              </p:ext>
-            </p:extLst>
-          </p:nvPr>
-        </p:nvGraphicFramePr>
-        <p:xfrm>
-          <a:off x="838200" y="1833880"/>
-          <a:ext cx="10515600" cy="1513840"/>
-        </p:xfrm>
-        <a:graphic>
-          <a:graphicData uri="http://schemas.openxmlformats.org/drawingml/2006/table">
-            <a:tbl>
-              <a:tblPr firstRow="1" bandRow="1">
-                <a:tableStyleId>{5C22544A-7EE6-4342-B048-85BDC9FD1C3A}</a:tableStyleId>
-              </a:tblPr>
-              <a:tblGrid>
-                <a:gridCol w="2712720">
-                  <a:extLst>
-                    <a:ext uri="{9D8B030D-6E8A-4147-A177-3AD203B41FA5}">
-                      <a16:colId xmlns:a16="http://schemas.microsoft.com/office/drawing/2014/main" val="1921292116"/>
-                    </a:ext>
-                  </a:extLst>
-                </a:gridCol>
-                <a:gridCol w="1943100">
-                  <a:extLst>
-                    <a:ext uri="{9D8B030D-6E8A-4147-A177-3AD203B41FA5}">
-                      <a16:colId xmlns:a16="http://schemas.microsoft.com/office/drawing/2014/main" val="588760132"/>
-                    </a:ext>
-                  </a:extLst>
-                </a:gridCol>
-                <a:gridCol w="1874520">
-                  <a:extLst>
-                    <a:ext uri="{9D8B030D-6E8A-4147-A177-3AD203B41FA5}">
-                      <a16:colId xmlns:a16="http://schemas.microsoft.com/office/drawing/2014/main" val="2584963815"/>
-                    </a:ext>
-                  </a:extLst>
-                </a:gridCol>
-                <a:gridCol w="1935480">
-                  <a:extLst>
-                    <a:ext uri="{9D8B030D-6E8A-4147-A177-3AD203B41FA5}">
-                      <a16:colId xmlns:a16="http://schemas.microsoft.com/office/drawing/2014/main" val="1860058179"/>
-                    </a:ext>
-                  </a:extLst>
-                </a:gridCol>
-                <a:gridCol w="2049780">
-                  <a:extLst>
-                    <a:ext uri="{9D8B030D-6E8A-4147-A177-3AD203B41FA5}">
-                      <a16:colId xmlns:a16="http://schemas.microsoft.com/office/drawing/2014/main" val="2280133371"/>
-                    </a:ext>
-                  </a:extLst>
-                </a:gridCol>
-              </a:tblGrid>
-              <a:tr h="370840">
-                <a:tc>
-                  <a:txBody>
-                    <a:bodyPr/>
-                    <a:lstStyle/>
-                    <a:p>
-                      <a:pPr algn="ctr"/>
-                      <a:r>
-                        <a:rPr lang="en-GB" dirty="0"/>
-                        <a:t>Model</a:t>
-                      </a:r>
-                    </a:p>
-                  </a:txBody>
-                  <a:tcPr/>
-                </a:tc>
-                <a:tc>
-                  <a:txBody>
-                    <a:bodyPr/>
-                    <a:lstStyle/>
-                    <a:p>
-                      <a:pPr algn="ctr"/>
-                      <a:r>
-                        <a:rPr lang="en-GB" dirty="0"/>
-                        <a:t>Early</a:t>
-                      </a:r>
-                    </a:p>
-                  </a:txBody>
-                  <a:tcPr/>
-                </a:tc>
-                <a:tc>
-                  <a:txBody>
-                    <a:bodyPr/>
-                    <a:lstStyle/>
-                    <a:p>
-                      <a:pPr algn="ctr"/>
-                      <a:r>
-                        <a:rPr lang="en-GB" dirty="0"/>
-                        <a:t>Midpoint</a:t>
-                      </a:r>
-                    </a:p>
-                  </a:txBody>
-                  <a:tcPr/>
-                </a:tc>
-                <a:tc>
-                  <a:txBody>
-                    <a:bodyPr/>
-                    <a:lstStyle/>
-                    <a:p>
-                      <a:pPr algn="ctr"/>
-                      <a:r>
-                        <a:rPr lang="en-GB" dirty="0"/>
-                        <a:t>Late</a:t>
-                      </a:r>
-                    </a:p>
-                  </a:txBody>
-                  <a:tcPr/>
-                </a:tc>
-                <a:tc>
-                  <a:txBody>
-                    <a:bodyPr/>
-                    <a:lstStyle/>
-                    <a:p>
-                      <a:pPr algn="ctr"/>
-                      <a:r>
-                        <a:rPr lang="en-GB" dirty="0"/>
-                        <a:t>Full</a:t>
-                      </a:r>
-                    </a:p>
-                  </a:txBody>
-                  <a:tcPr/>
-                </a:tc>
-                <a:extLst>
-                  <a:ext uri="{0D108BD9-81ED-4DB2-BD59-A6C34878D82A}">
-                    <a16:rowId xmlns:a16="http://schemas.microsoft.com/office/drawing/2014/main" val="1121749780"/>
-                  </a:ext>
-                </a:extLst>
-              </a:tr>
-              <a:tr h="401320">
-                <a:tc>
-                  <a:txBody>
-                    <a:bodyPr/>
-                    <a:lstStyle/>
-                    <a:p>
-                      <a:r>
-                        <a:rPr lang="en-GB" dirty="0"/>
-                        <a:t>Logistic Regression</a:t>
-                      </a:r>
-                    </a:p>
-                  </a:txBody>
-                  <a:tcPr/>
-                </a:tc>
-                <a:tc>
-                  <a:txBody>
-                    <a:bodyPr/>
-                    <a:lstStyle/>
-                    <a:p>
-                      <a:pPr algn="ctr"/>
-                      <a:r>
-                        <a:rPr lang="en-GB" dirty="0"/>
-                        <a:t>75%</a:t>
-                      </a:r>
-                    </a:p>
-                  </a:txBody>
-                  <a:tcPr/>
-                </a:tc>
-                <a:tc>
-                  <a:txBody>
-                    <a:bodyPr/>
-                    <a:lstStyle/>
-                    <a:p>
-                      <a:pPr algn="ctr"/>
-                      <a:r>
-                        <a:rPr lang="en-GB" dirty="0"/>
-                        <a:t>79%</a:t>
-                      </a:r>
-                    </a:p>
-                  </a:txBody>
-                  <a:tcPr/>
-                </a:tc>
-                <a:tc>
-                  <a:txBody>
-                    <a:bodyPr/>
-                    <a:lstStyle/>
-                    <a:p>
-                      <a:pPr algn="ctr"/>
-                      <a:r>
-                        <a:rPr lang="en-GB" dirty="0"/>
-                        <a:t>80%</a:t>
-                      </a:r>
-                    </a:p>
-                  </a:txBody>
-                  <a:tcPr/>
-                </a:tc>
-                <a:tc>
-                  <a:txBody>
-                    <a:bodyPr/>
-                    <a:lstStyle/>
-                    <a:p>
-                      <a:pPr algn="ctr"/>
-                      <a:r>
-                        <a:rPr lang="en-GB" dirty="0"/>
-                        <a:t>82%</a:t>
-                      </a:r>
-                    </a:p>
-                  </a:txBody>
-                  <a:tcPr/>
-                </a:tc>
-                <a:extLst>
-                  <a:ext uri="{0D108BD9-81ED-4DB2-BD59-A6C34878D82A}">
-                    <a16:rowId xmlns:a16="http://schemas.microsoft.com/office/drawing/2014/main" val="4200736597"/>
-                  </a:ext>
-                </a:extLst>
-              </a:tr>
-              <a:tr h="370840">
-                <a:tc>
-                  <a:txBody>
-                    <a:bodyPr/>
-                    <a:lstStyle/>
-                    <a:p>
-                      <a:r>
-                        <a:rPr lang="en-GB" dirty="0"/>
-                        <a:t>Support Vector Machine</a:t>
-                      </a:r>
-                    </a:p>
-                  </a:txBody>
-                  <a:tcPr/>
-                </a:tc>
-                <a:tc>
-                  <a:txBody>
-                    <a:bodyPr/>
-                    <a:lstStyle/>
-                    <a:p>
-                      <a:pPr algn="ctr"/>
-                      <a:r>
-                        <a:rPr lang="en-GB" dirty="0"/>
-                        <a:t>82%</a:t>
-                      </a:r>
-                    </a:p>
-                  </a:txBody>
-                  <a:tcPr/>
-                </a:tc>
-                <a:tc>
-                  <a:txBody>
-                    <a:bodyPr/>
-                    <a:lstStyle/>
-                    <a:p>
-                      <a:pPr algn="ctr"/>
-                      <a:r>
-                        <a:rPr lang="en-GB" dirty="0"/>
-                        <a:t>83%</a:t>
-                      </a:r>
-                    </a:p>
-                  </a:txBody>
-                  <a:tcPr/>
-                </a:tc>
-                <a:tc>
-                  <a:txBody>
-                    <a:bodyPr/>
-                    <a:lstStyle/>
-                    <a:p>
-                      <a:pPr algn="ctr"/>
-                      <a:r>
-                        <a:rPr lang="en-GB" dirty="0"/>
-                        <a:t>84%</a:t>
-                      </a:r>
-                    </a:p>
-                  </a:txBody>
-                  <a:tcPr/>
-                </a:tc>
-                <a:tc>
-                  <a:txBody>
-                    <a:bodyPr/>
-                    <a:lstStyle/>
-                    <a:p>
-                      <a:pPr algn="ctr"/>
-                      <a:r>
-                        <a:rPr lang="en-GB" dirty="0"/>
-                        <a:t>86%</a:t>
-                      </a:r>
-                    </a:p>
-                  </a:txBody>
-                  <a:tcPr/>
-                </a:tc>
-                <a:extLst>
-                  <a:ext uri="{0D108BD9-81ED-4DB2-BD59-A6C34878D82A}">
-                    <a16:rowId xmlns:a16="http://schemas.microsoft.com/office/drawing/2014/main" val="2104744661"/>
-                  </a:ext>
-                </a:extLst>
-              </a:tr>
-              <a:tr h="370840">
-                <a:tc>
-                  <a:txBody>
-                    <a:bodyPr/>
-                    <a:lstStyle/>
-                    <a:p>
-                      <a:r>
-                        <a:rPr lang="en-GB" dirty="0"/>
-                        <a:t>Multiplayer Perceptron</a:t>
-                      </a:r>
-                    </a:p>
-                  </a:txBody>
-                  <a:tcPr/>
-                </a:tc>
-                <a:tc>
-                  <a:txBody>
-                    <a:bodyPr/>
-                    <a:lstStyle/>
-                    <a:p>
-                      <a:pPr algn="ctr"/>
-                      <a:r>
-                        <a:rPr lang="en-GB" dirty="0"/>
-                        <a:t>77%</a:t>
-                      </a:r>
-                    </a:p>
-                  </a:txBody>
-                  <a:tcPr/>
-                </a:tc>
-                <a:tc>
-                  <a:txBody>
-                    <a:bodyPr/>
-                    <a:lstStyle/>
-                    <a:p>
-                      <a:pPr algn="ctr"/>
-                      <a:r>
-                        <a:rPr lang="en-GB" dirty="0"/>
-                        <a:t>80%</a:t>
-                      </a:r>
-                    </a:p>
-                  </a:txBody>
-                  <a:tcPr/>
-                </a:tc>
-                <a:tc>
-                  <a:txBody>
-                    <a:bodyPr/>
-                    <a:lstStyle/>
-                    <a:p>
-                      <a:pPr algn="ctr"/>
-                      <a:r>
-                        <a:rPr lang="en-GB" dirty="0"/>
-                        <a:t>82%</a:t>
-                      </a:r>
-                    </a:p>
-                  </a:txBody>
-                  <a:tcPr/>
-                </a:tc>
-                <a:tc>
-                  <a:txBody>
-                    <a:bodyPr/>
-                    <a:lstStyle/>
-                    <a:p>
-                      <a:pPr algn="ctr"/>
-                      <a:r>
-                        <a:rPr lang="en-GB" dirty="0"/>
-                        <a:t>83%</a:t>
-                      </a:r>
-                    </a:p>
-                  </a:txBody>
-                  <a:tcPr/>
-                </a:tc>
-                <a:extLst>
-                  <a:ext uri="{0D108BD9-81ED-4DB2-BD59-A6C34878D82A}">
-                    <a16:rowId xmlns:a16="http://schemas.microsoft.com/office/drawing/2014/main" val="454753117"/>
-                  </a:ext>
-                </a:extLst>
-              </a:tr>
-            </a:tbl>
-          </a:graphicData>
-        </a:graphic>
-      </p:graphicFrame>
-      <p:sp>
-        <p:nvSpPr>
-          <p:cNvPr id="14" name="TextBox 13">
-            <a:extLst>
-              <a:ext uri="{FF2B5EF4-FFF2-40B4-BE49-F238E27FC236}">
-                <a16:creationId xmlns:a16="http://schemas.microsoft.com/office/drawing/2014/main" id="{E3734DE5-0D80-514C-E534-30D02F62D844}"/>
-              </a:ext>
-            </a:extLst>
-          </p:cNvPr>
-          <p:cNvSpPr txBox="1"/>
-          <p:nvPr/>
-        </p:nvSpPr>
-        <p:spPr>
-          <a:xfrm>
-            <a:off x="723900" y="3566795"/>
-            <a:ext cx="10866120" cy="1938992"/>
-          </a:xfrm>
-          <a:prstGeom prst="rect">
-            <a:avLst/>
-          </a:prstGeom>
-          <a:noFill/>
-        </p:spPr>
-        <p:txBody>
-          <a:bodyPr wrap="square" rtlCol="0">
-            <a:spAutoFit/>
-          </a:bodyPr>
-          <a:lstStyle/>
-          <a:p>
-            <a:pPr marL="230400" indent="-230400">
-              <a:buFont typeface="Arial" panose="020B0604020202020204" pitchFamily="34" charset="0"/>
-              <a:buChar char="•"/>
-            </a:pPr>
-            <a:r>
-              <a:rPr lang="en-US" sz="2000" dirty="0"/>
-              <a:t>SVM consistently achieves the highest accuracy across all phases, followed by the MLP classifier and then LR. </a:t>
-            </a:r>
-          </a:p>
-          <a:p>
-            <a:pPr marL="230400" indent="-230400">
-              <a:buFont typeface="Arial" panose="020B0604020202020204" pitchFamily="34" charset="0"/>
-              <a:buChar char="•"/>
-            </a:pPr>
-            <a:r>
-              <a:rPr lang="en-US" sz="2000" dirty="0"/>
-              <a:t>However, accuracy alone is not a reliable metric for evaluating dropout prediction due to the class imbalance in the dataset, which biases results toward the majority class (non-dropouts).</a:t>
-            </a:r>
-          </a:p>
-          <a:p>
-            <a:pPr marL="230400" indent="-230400">
-              <a:buFont typeface="Arial" panose="020B0604020202020204" pitchFamily="34" charset="0"/>
-              <a:buChar char="•"/>
-            </a:pPr>
-            <a:r>
-              <a:rPr lang="en-US" sz="2000" dirty="0"/>
-              <a:t>To better assess model performance on the minority class (dropouts), we focus on the precision and recall scores.</a:t>
-            </a:r>
-            <a:endParaRPr lang="en-GB" sz="2000" dirty="0"/>
-          </a:p>
-        </p:txBody>
-      </p:sp>
     </p:spTree>
     <p:extLst>
       <p:ext uri="{BB962C8B-B14F-4D97-AF65-F5344CB8AC3E}">
-        <p14:creationId xmlns:p14="http://schemas.microsoft.com/office/powerpoint/2010/main" val="2919091754"/>
+        <p14:creationId xmlns:p14="http://schemas.microsoft.com/office/powerpoint/2010/main" val="2079853093"/>
       </p:ext>
     </p:extLst>
   </p:cSld>

</xml_diff>